<commit_message>
Updated second quarter of slides.
</commit_message>
<xml_diff>
--- a/examples/presentations/Practical Algorithm Analysis for Oracle Developers - Collaborate - 2019_281_Heller.pptx
+++ b/examples/presentations/Practical Algorithm Analysis for Oracle Developers - Collaborate - 2019_281_Heller.pptx
@@ -7,7 +7,7 @@
     <p:sldMasterId id="2147483668" r:id="rId3"/>
   </p:sldMasterIdLst>
   <p:notesMasterIdLst>
-    <p:notesMasterId r:id="rId55"/>
+    <p:notesMasterId r:id="rId61"/>
   </p:notesMasterIdLst>
   <p:sldIdLst>
     <p:sldId id="304" r:id="rId4"/>
@@ -28,39 +28,45 @@
     <p:sldId id="289" r:id="rId19"/>
     <p:sldId id="291" r:id="rId20"/>
     <p:sldId id="290" r:id="rId21"/>
-    <p:sldId id="294" r:id="rId22"/>
-    <p:sldId id="295" r:id="rId23"/>
-    <p:sldId id="297" r:id="rId24"/>
-    <p:sldId id="296" r:id="rId25"/>
-    <p:sldId id="263" r:id="rId26"/>
-    <p:sldId id="264" r:id="rId27"/>
-    <p:sldId id="265" r:id="rId28"/>
-    <p:sldId id="298" r:id="rId29"/>
-    <p:sldId id="278" r:id="rId30"/>
-    <p:sldId id="299" r:id="rId31"/>
-    <p:sldId id="302" r:id="rId32"/>
-    <p:sldId id="301" r:id="rId33"/>
-    <p:sldId id="300" r:id="rId34"/>
-    <p:sldId id="303" r:id="rId35"/>
-    <p:sldId id="266" r:id="rId36"/>
-    <p:sldId id="267" r:id="rId37"/>
-    <p:sldId id="269" r:id="rId38"/>
-    <p:sldId id="270" r:id="rId39"/>
-    <p:sldId id="306" r:id="rId40"/>
-    <p:sldId id="308" r:id="rId41"/>
-    <p:sldId id="307" r:id="rId42"/>
-    <p:sldId id="280" r:id="rId43"/>
-    <p:sldId id="309" r:id="rId44"/>
-    <p:sldId id="310" r:id="rId45"/>
-    <p:sldId id="272" r:id="rId46"/>
-    <p:sldId id="273" r:id="rId47"/>
-    <p:sldId id="274" r:id="rId48"/>
-    <p:sldId id="275" r:id="rId49"/>
-    <p:sldId id="276" r:id="rId50"/>
-    <p:sldId id="281" r:id="rId51"/>
-    <p:sldId id="277" r:id="rId52"/>
-    <p:sldId id="311" r:id="rId53"/>
-    <p:sldId id="305" r:id="rId54"/>
+    <p:sldId id="314" r:id="rId22"/>
+    <p:sldId id="319" r:id="rId23"/>
+    <p:sldId id="318" r:id="rId24"/>
+    <p:sldId id="317" r:id="rId25"/>
+    <p:sldId id="316" r:id="rId26"/>
+    <p:sldId id="294" r:id="rId27"/>
+    <p:sldId id="315" r:id="rId28"/>
+    <p:sldId id="295" r:id="rId29"/>
+    <p:sldId id="297" r:id="rId30"/>
+    <p:sldId id="296" r:id="rId31"/>
+    <p:sldId id="263" r:id="rId32"/>
+    <p:sldId id="264" r:id="rId33"/>
+    <p:sldId id="265" r:id="rId34"/>
+    <p:sldId id="298" r:id="rId35"/>
+    <p:sldId id="278" r:id="rId36"/>
+    <p:sldId id="299" r:id="rId37"/>
+    <p:sldId id="302" r:id="rId38"/>
+    <p:sldId id="301" r:id="rId39"/>
+    <p:sldId id="300" r:id="rId40"/>
+    <p:sldId id="303" r:id="rId41"/>
+    <p:sldId id="266" r:id="rId42"/>
+    <p:sldId id="267" r:id="rId43"/>
+    <p:sldId id="269" r:id="rId44"/>
+    <p:sldId id="270" r:id="rId45"/>
+    <p:sldId id="306" r:id="rId46"/>
+    <p:sldId id="308" r:id="rId47"/>
+    <p:sldId id="307" r:id="rId48"/>
+    <p:sldId id="280" r:id="rId49"/>
+    <p:sldId id="309" r:id="rId50"/>
+    <p:sldId id="310" r:id="rId51"/>
+    <p:sldId id="272" r:id="rId52"/>
+    <p:sldId id="273" r:id="rId53"/>
+    <p:sldId id="274" r:id="rId54"/>
+    <p:sldId id="275" r:id="rId55"/>
+    <p:sldId id="276" r:id="rId56"/>
+    <p:sldId id="281" r:id="rId57"/>
+    <p:sldId id="277" r:id="rId58"/>
+    <p:sldId id="311" r:id="rId59"/>
+    <p:sldId id="305" r:id="rId60"/>
   </p:sldIdLst>
   <p:sldSz cx="9144000" cy="5143500" type="screen16x9"/>
   <p:notesSz cx="6858000" cy="9144000"/>
@@ -1372,6 +1378,52 @@
           <a:bodyPr/>
           <a:lstStyle/>
           <a:p>
+            <a:pPr marL="171450" indent="-171450">
+              <a:buFont typeface="Arial" charset="0"/>
+              <a:buChar char="•"/>
+            </a:pPr>
+            <a:r>
+              <a:rPr lang="en-US" b="1" baseline="0" dirty="0" smtClean="0"/>
+              <a:t>Match:</a:t>
+            </a:r>
+            <a:r>
+              <a:rPr lang="en-US" baseline="0" dirty="0" smtClean="0"/>
+              <a:t> I built two test cases for sequence cache size and bulk collect limit.  Notice how the theory and practice almost perfectly line up.</a:t>
+            </a:r>
+          </a:p>
+          <a:p>
+            <a:pPr marL="171450" indent="-171450">
+              <a:buFont typeface="Arial" charset="0"/>
+              <a:buChar char="•"/>
+            </a:pPr>
+            <a:r>
+              <a:rPr lang="en-US" b="1" baseline="0" dirty="0" smtClean="0"/>
+              <a:t>Plot it:</a:t>
+            </a:r>
+            <a:r>
+              <a:rPr lang="en-US" baseline="0" dirty="0" smtClean="0"/>
+              <a:t> It's important to build a test case with a huge number of points to avoid biases.  If I randomly picked some different limit sizes, and re-ran a few times, I could prove anything I wanted to.  But when the numbers are plotted out it becomes obvious what the trend is.</a:t>
+            </a:r>
+          </a:p>
+          <a:p>
+            <a:pPr marL="171450" indent="-171450">
+              <a:buFont typeface="Arial" charset="0"/>
+              <a:buChar char="•"/>
+            </a:pPr>
+            <a:r>
+              <a:rPr lang="en-US" b="1" baseline="0" dirty="0" smtClean="0"/>
+              <a:t>Asymptote:</a:t>
+            </a:r>
+            <a:r>
+              <a:rPr lang="en-US" baseline="0" dirty="0" smtClean="0"/>
+              <a:t> Notice the asymptotes at the bottom of the </a:t>
+            </a:r>
+          </a:p>
+          <a:p>
+            <a:r>
+              <a:rPr lang="en-US" baseline="0" dirty="0" smtClean="0"/>
+              <a:t> </a:t>
+            </a:r>
             <a:endParaRPr lang="en-US" dirty="0"/>
           </a:p>
         </p:txBody>
@@ -1393,16 +1445,16 @@
           <a:p>
             <a:fld id="{5A6616C6-9DE0-4865-BC75-EB7C5EE0BF49}" type="slidenum">
               <a:rPr lang="en-US" smtClean="0"/>
-              <a:t>17</a:t>
+              <a:t>16</a:t>
             </a:fld>
-            <a:endParaRPr lang="en-US" dirty="0"/>
+            <a:endParaRPr lang="en-US"/>
           </a:p>
         </p:txBody>
       </p:sp>
     </p:spTree>
     <p:extLst>
       <p:ext uri="{BB962C8B-B14F-4D97-AF65-F5344CB8AC3E}">
-        <p14:creationId xmlns:p14="http://schemas.microsoft.com/office/powerpoint/2010/main" val="3577064392"/>
+        <p14:creationId xmlns:p14="http://schemas.microsoft.com/office/powerpoint/2010/main" val="4169957529"/>
       </p:ext>
     </p:extLst>
   </p:cSld>
@@ -1456,6 +1508,14 @@
           <a:bodyPr/>
           <a:lstStyle/>
           <a:p>
+            <a:r>
+              <a:rPr lang="en-US" dirty="0" smtClean="0"/>
+              <a:t>This boring function was not even show</a:t>
+            </a:r>
+            <a:r>
+              <a:rPr lang="en-US" baseline="0" dirty="0" smtClean="0"/>
+              <a:t> in the comparison graph earlier.</a:t>
+            </a:r>
             <a:endParaRPr lang="en-US" dirty="0"/>
           </a:p>
         </p:txBody>
@@ -1477,7 +1537,7 @@
           <a:p>
             <a:fld id="{5A6616C6-9DE0-4865-BC75-EB7C5EE0BF49}" type="slidenum">
               <a:rPr lang="en-US" smtClean="0"/>
-              <a:t>18</a:t>
+              <a:t>17</a:t>
             </a:fld>
             <a:endParaRPr lang="en-US" dirty="0"/>
           </a:p>
@@ -1486,7 +1546,7 @@
     </p:spTree>
     <p:extLst>
       <p:ext uri="{BB962C8B-B14F-4D97-AF65-F5344CB8AC3E}">
-        <p14:creationId xmlns:p14="http://schemas.microsoft.com/office/powerpoint/2010/main" val="3025345395"/>
+        <p14:creationId xmlns:p14="http://schemas.microsoft.com/office/powerpoint/2010/main" val="3577064392"/>
       </p:ext>
     </p:extLst>
   </p:cSld>
@@ -1540,44 +1600,45 @@
           <a:bodyPr/>
           <a:lstStyle/>
           <a:p>
-            <a:pPr marL="0" marR="0" indent="0" algn="l" defTabSz="914378" rtl="0" eaLnBrk="1" fontAlgn="auto" latinLnBrk="0" hangingPunct="1">
-              <a:lnSpc>
-                <a:spcPct val="100000"/>
-              </a:lnSpc>
-              <a:spcBef>
-                <a:spcPts val="0"/>
-              </a:spcBef>
-              <a:spcAft>
-                <a:spcPts val="0"/>
-              </a:spcAft>
-              <a:buClrTx/>
-              <a:buSzTx/>
-              <a:buFontTx/>
-              <a:buNone/>
-              <a:tabLst/>
-              <a:defRPr/>
+            <a:pPr marL="171450" indent="-171450">
+              <a:buFont typeface="Arial" charset="0"/>
+              <a:buChar char="•"/>
             </a:pPr>
             <a:r>
               <a:rPr lang="en-US" dirty="0" smtClean="0"/>
-              <a:t>(By </a:t>
-            </a:r>
-            <a:r>
-              <a:rPr lang="en-US" dirty="0" smtClean="0"/>
-              <a:t>Jorge </a:t>
-            </a:r>
-            <a:r>
-              <a:rPr lang="en-US" dirty="0" err="1" smtClean="0"/>
-              <a:t>Stolfi</a:t>
-            </a:r>
-            <a:r>
-              <a:rPr lang="en-US" dirty="0" smtClean="0"/>
-              <a:t> - Own work, Public Domain, https://</a:t>
-            </a:r>
-            <a:r>
-              <a:rPr lang="en-US" dirty="0" smtClean="0"/>
-              <a:t>commons.wikimedia.org/w/index.php?curid=6601264)</a:t>
-            </a:r>
-            <a:endParaRPr lang="en-US" dirty="0" smtClean="0"/>
+              <a:t>Constant time</a:t>
+            </a:r>
+            <a:r>
+              <a:rPr lang="en-US" baseline="0" dirty="0" smtClean="0"/>
+              <a:t> means the run time does not depend on the size of the data - which is a great thing when it's possible.</a:t>
+            </a:r>
+          </a:p>
+          <a:p>
+            <a:pPr marL="171450" indent="-171450">
+              <a:buFont typeface="Arial" charset="0"/>
+              <a:buChar char="•"/>
+            </a:pPr>
+            <a:r>
+              <a:rPr lang="en-US" baseline="0" dirty="0" smtClean="0"/>
+              <a:t>This happens with lots of operations, mostly with DDL.  It might happen with INSERT VALUES, unless the table has indexes that require extra work, or if the table is a cluster.</a:t>
+            </a:r>
+          </a:p>
+          <a:p>
+            <a:pPr marL="171450" indent="-171450">
+              <a:buFont typeface="Arial" charset="0"/>
+              <a:buChar char="•"/>
+            </a:pPr>
+            <a:r>
+              <a:rPr lang="en-US" baseline="0" dirty="0" smtClean="0"/>
+              <a:t>O(1) *could* happen for hashing in theory, but in practice it won't occur.  This affects partitioning, hash clusters, and joins.</a:t>
+            </a:r>
+          </a:p>
+          <a:p>
+            <a:pPr marL="171450" indent="-171450">
+              <a:buFont typeface="Arial" charset="0"/>
+              <a:buChar char="•"/>
+            </a:pPr>
+            <a:endParaRPr lang="en-US" dirty="0"/>
           </a:p>
         </p:txBody>
       </p:sp>
@@ -1598,16 +1659,16 @@
           <a:p>
             <a:fld id="{5A6616C6-9DE0-4865-BC75-EB7C5EE0BF49}" type="slidenum">
               <a:rPr lang="en-US" smtClean="0"/>
-              <a:t>19</a:t>
+              <a:t>18</a:t>
             </a:fld>
-            <a:endParaRPr lang="en-US"/>
+            <a:endParaRPr lang="en-US" dirty="0"/>
           </a:p>
         </p:txBody>
       </p:sp>
     </p:spTree>
     <p:extLst>
       <p:ext uri="{BB962C8B-B14F-4D97-AF65-F5344CB8AC3E}">
-        <p14:creationId xmlns:p14="http://schemas.microsoft.com/office/powerpoint/2010/main" val="1412735394"/>
+        <p14:creationId xmlns:p14="http://schemas.microsoft.com/office/powerpoint/2010/main" val="3025345395"/>
       </p:ext>
     </p:extLst>
   </p:cSld>
@@ -1661,40 +1722,39 @@
           <a:bodyPr/>
           <a:lstStyle/>
           <a:p>
-            <a:r>
-              <a:rPr lang="en-US" sz="1200" kern="1200" dirty="0" smtClean="0">
-                <a:solidFill>
-                  <a:schemeClr val="tx1"/>
-                </a:solidFill>
-                <a:effectLst/>
-                <a:latin typeface="+mn-lt"/>
-                <a:ea typeface="+mn-ea"/>
-                <a:cs typeface="+mn-cs"/>
-              </a:rPr>
-              <a:t>See this Stack Overflow answer, where I try and fail to create a useful constant-time index using hash clusters: </a:t>
-            </a:r>
-            <a:r>
-              <a:rPr lang="en-US" sz="1200" u="sng" kern="1200" dirty="0" smtClean="0">
-                <a:solidFill>
-                  <a:schemeClr val="tx1"/>
-                </a:solidFill>
-                <a:effectLst/>
-                <a:latin typeface="+mn-lt"/>
-                <a:ea typeface="+mn-ea"/>
-                <a:cs typeface="+mn-cs"/>
-                <a:hlinkClick r:id="rId3"/>
-              </a:rPr>
-              <a:t>https://stackoverflow.com/questions/32071259/constant-time-index-for-string-column-on-oracle-database</a:t>
-            </a:r>
-            <a:endParaRPr lang="en-US" sz="1200" u="sng" kern="1200" dirty="0" smtClean="0">
-              <a:solidFill>
-                <a:schemeClr val="tx1"/>
-              </a:solidFill>
-              <a:effectLst/>
-              <a:latin typeface="+mn-lt"/>
-              <a:ea typeface="+mn-ea"/>
-              <a:cs typeface="+mn-cs"/>
-            </a:endParaRPr>
+            <a:pPr marL="171450" indent="-171450">
+              <a:buFont typeface="Arial" charset="0"/>
+              <a:buChar char="•"/>
+            </a:pPr>
+            <a:r>
+              <a:rPr lang="en-US" dirty="0" smtClean="0"/>
+              <a:t>Hashing</a:t>
+            </a:r>
+            <a:r>
+              <a:rPr lang="en-US" baseline="0" dirty="0" smtClean="0"/>
+              <a:t> is conceptually simple and generic - we take an input and we map it to an output.</a:t>
+            </a:r>
+          </a:p>
+          <a:p>
+            <a:pPr marL="171450" indent="-171450">
+              <a:buFont typeface="Arial" charset="0"/>
+              <a:buChar char="•"/>
+            </a:pPr>
+            <a:r>
+              <a:rPr lang="en-US" baseline="0" dirty="0" smtClean="0"/>
+              <a:t>Hashing is a core database operation and is used frequently.  It's great for grouping data (like for GROUP BY, DISTINCT, hash partitioning), comparing (for joining, hash clusters), and hiding data (password hashes, de-identifying).</a:t>
+            </a:r>
+          </a:p>
+          <a:p>
+            <a:pPr marL="171450" indent="-171450">
+              <a:buFont typeface="Arial" charset="0"/>
+              <a:buChar char="•"/>
+            </a:pPr>
+            <a:r>
+              <a:rPr lang="en-US" baseline="0" dirty="0" smtClean="0"/>
+              <a:t>Oracle has several built-in hash functions, such as ORA_HASH, STANDARD_HASH, DBMS_CRYPTO, DBMS_SQLHASH, and probably others.</a:t>
+            </a:r>
+            <a:endParaRPr lang="en-US" dirty="0"/>
           </a:p>
         </p:txBody>
       </p:sp>
@@ -1715,7 +1775,7 @@
           <a:p>
             <a:fld id="{5A6616C6-9DE0-4865-BC75-EB7C5EE0BF49}" type="slidenum">
               <a:rPr lang="en-US" smtClean="0"/>
-              <a:t>21</a:t>
+              <a:t>19</a:t>
             </a:fld>
             <a:endParaRPr lang="en-US"/>
           </a:p>
@@ -1724,7 +1784,7 @@
     </p:spTree>
     <p:extLst>
       <p:ext uri="{BB962C8B-B14F-4D97-AF65-F5344CB8AC3E}">
-        <p14:creationId xmlns:p14="http://schemas.microsoft.com/office/powerpoint/2010/main" val="1699038351"/>
+        <p14:creationId xmlns:p14="http://schemas.microsoft.com/office/powerpoint/2010/main" val="3517856152"/>
       </p:ext>
     </p:extLst>
   </p:cSld>
@@ -1778,7 +1838,96 @@
           <a:bodyPr/>
           <a:lstStyle/>
           <a:p>
-            <a:pPr marL="0" marR="0" indent="0" algn="l" defTabSz="914400" rtl="0" eaLnBrk="1" fontAlgn="auto" latinLnBrk="0" hangingPunct="1">
+            <a:pPr marL="171450" marR="0" indent="-171450" algn="l" defTabSz="914378" rtl="0" eaLnBrk="1" fontAlgn="auto" latinLnBrk="0" hangingPunct="1">
+              <a:lnSpc>
+                <a:spcPct val="100000"/>
+              </a:lnSpc>
+              <a:spcBef>
+                <a:spcPts val="0"/>
+              </a:spcBef>
+              <a:spcAft>
+                <a:spcPts val="0"/>
+              </a:spcAft>
+              <a:buClrTx/>
+              <a:buSzTx/>
+              <a:buFont typeface="Arial" charset="0"/>
+              <a:buChar char="•"/>
+              <a:tabLst/>
+              <a:defRPr/>
+            </a:pPr>
+            <a:r>
+              <a:rPr lang="en-US" baseline="0" dirty="0" smtClean="0"/>
+              <a:t>There are many hash properties and there's not enough time to go over all of them.  Three of the most popular types of hashes are displayed here.</a:t>
+            </a:r>
+          </a:p>
+          <a:p>
+            <a:pPr marL="171450" marR="0" indent="-171450" algn="l" defTabSz="914378" rtl="0" eaLnBrk="1" fontAlgn="auto" latinLnBrk="0" hangingPunct="1">
+              <a:lnSpc>
+                <a:spcPct val="100000"/>
+              </a:lnSpc>
+              <a:spcBef>
+                <a:spcPts val="0"/>
+              </a:spcBef>
+              <a:spcAft>
+                <a:spcPts val="0"/>
+              </a:spcAft>
+              <a:buClrTx/>
+              <a:buSzTx/>
+              <a:buFont typeface="Arial" charset="0"/>
+              <a:buChar char="•"/>
+              <a:tabLst/>
+              <a:defRPr/>
+            </a:pPr>
+            <a:r>
+              <a:rPr lang="en-US" baseline="0" dirty="0" smtClean="0"/>
+              <a:t>The minimal perfect hash is an unrealistic goal.  In practice you will never achieve a hash that good, unless you know all of the values ahead of time and spend a huge amount of processing time.</a:t>
+            </a:r>
+          </a:p>
+          <a:p>
+            <a:pPr marL="171450" marR="0" indent="-171450" algn="l" defTabSz="914378" rtl="0" eaLnBrk="1" fontAlgn="auto" latinLnBrk="0" hangingPunct="1">
+              <a:lnSpc>
+                <a:spcPct val="100000"/>
+              </a:lnSpc>
+              <a:spcBef>
+                <a:spcPts val="0"/>
+              </a:spcBef>
+              <a:spcAft>
+                <a:spcPts val="0"/>
+              </a:spcAft>
+              <a:buClrTx/>
+              <a:buSzTx/>
+              <a:buFont typeface="Arial" charset="0"/>
+              <a:buChar char="•"/>
+              <a:tabLst/>
+              <a:defRPr/>
+            </a:pPr>
+            <a:r>
+              <a:rPr lang="en-US" baseline="0" dirty="0" smtClean="0"/>
+              <a:t>In practice, we have to choose between a </a:t>
+            </a:r>
+          </a:p>
+          <a:p>
+            <a:pPr marL="171450" marR="0" indent="-171450" algn="l" defTabSz="914378" rtl="0" eaLnBrk="1" fontAlgn="auto" latinLnBrk="0" hangingPunct="1">
+              <a:lnSpc>
+                <a:spcPct val="100000"/>
+              </a:lnSpc>
+              <a:spcBef>
+                <a:spcPts val="0"/>
+              </a:spcBef>
+              <a:spcAft>
+                <a:spcPts val="0"/>
+              </a:spcAft>
+              <a:buClrTx/>
+              <a:buSzTx/>
+              <a:buFont typeface="Arial" charset="0"/>
+              <a:buChar char="•"/>
+              <a:tabLst/>
+              <a:defRPr/>
+            </a:pPr>
+            <a:endParaRPr lang="en-US" dirty="0" smtClean="0"/>
+          </a:p>
+          <a:p>
+            <a:pPr marL="0" marR="0" indent="0" algn="l" defTabSz="914378" rtl="0" eaLnBrk="1" fontAlgn="auto" latinLnBrk="0" hangingPunct="1">
               <a:lnSpc>
                 <a:spcPct val="100000"/>
               </a:lnSpc>
@@ -1796,100 +1945,26 @@
               <a:defRPr/>
             </a:pPr>
             <a:r>
-              <a:rPr lang="en-US" sz="1200" kern="1200" dirty="0" smtClean="0">
-                <a:solidFill>
-                  <a:schemeClr val="tx1"/>
-                </a:solidFill>
-                <a:effectLst/>
-                <a:latin typeface="+mn-lt"/>
-                <a:ea typeface="+mn-ea"/>
-                <a:cs typeface="+mn-cs"/>
-              </a:rPr>
-              <a:t>Binary search algorithm image created by </a:t>
-            </a:r>
-            <a:r>
-              <a:rPr lang="en-US" sz="1200" u="sng" kern="1200" dirty="0" smtClean="0">
-                <a:solidFill>
-                  <a:schemeClr val="tx1"/>
-                </a:solidFill>
-                <a:effectLst/>
-                <a:latin typeface="+mn-lt"/>
-                <a:ea typeface="+mn-ea"/>
-                <a:cs typeface="+mn-cs"/>
-                <a:hlinkClick r:id="rId3"/>
-              </a:rPr>
-              <a:t>Chris Martin</a:t>
-            </a:r>
-            <a:r>
-              <a:rPr lang="en-US" sz="1200" kern="1200" dirty="0" smtClean="0">
-                <a:solidFill>
-                  <a:schemeClr val="tx1"/>
-                </a:solidFill>
-                <a:effectLst/>
-                <a:latin typeface="+mn-lt"/>
-                <a:ea typeface="+mn-ea"/>
-                <a:cs typeface="+mn-cs"/>
-              </a:rPr>
-              <a:t> and is in the public domain.</a:t>
-            </a:r>
-          </a:p>
-          <a:p>
-            <a:pPr marL="0" marR="0" indent="0" algn="l" defTabSz="914400" rtl="0" eaLnBrk="1" fontAlgn="auto" latinLnBrk="0" hangingPunct="1">
-              <a:lnSpc>
-                <a:spcPct val="100000"/>
-              </a:lnSpc>
-              <a:spcBef>
-                <a:spcPts val="0"/>
-              </a:spcBef>
-              <a:spcAft>
-                <a:spcPts val="0"/>
-              </a:spcAft>
-              <a:buClrTx/>
-              <a:buSzTx/>
-              <a:buFontTx/>
-              <a:buNone/>
-              <a:tabLst/>
-              <a:defRPr/>
-            </a:pPr>
-            <a:r>
-              <a:rPr lang="en-US" dirty="0" smtClean="0"/>
-              <a:t>Binary Search Depiction</a:t>
-            </a:r>
-            <a:r>
-              <a:rPr lang="en-US" baseline="0" dirty="0" smtClean="0"/>
-              <a:t> by </a:t>
+              <a:rPr lang="en-US" dirty="0" smtClean="0"/>
+              <a:t>(Images by </a:t>
+            </a:r>
+            <a:r>
+              <a:rPr lang="en-US" dirty="0" smtClean="0"/>
+              <a:t>Jorge </a:t>
             </a:r>
             <a:r>
               <a:rPr lang="en-US" dirty="0" err="1" smtClean="0"/>
-              <a:t>AlwaysAngry</a:t>
-            </a:r>
-            <a:r>
-              <a:rPr lang="en-US" dirty="0" smtClean="0"/>
-              <a:t> is licensed under the </a:t>
-            </a:r>
-            <a:r>
-              <a:rPr lang="en-US" dirty="0" smtClean="0">
-                <a:hlinkClick r:id="rId4" tooltip="w:en:Creative Commons"/>
-              </a:rPr>
-              <a:t>Creative Commons</a:t>
-            </a:r>
-            <a:r>
-              <a:rPr lang="en-US" dirty="0" smtClean="0"/>
-              <a:t> </a:t>
-            </a:r>
-            <a:r>
-              <a:rPr lang="en-US" dirty="0" smtClean="0">
-                <a:hlinkClick r:id="rId5"/>
-              </a:rPr>
-              <a:t>Attribution-Share Alike 4.0 International</a:t>
-            </a:r>
-            <a:r>
-              <a:rPr lang="en-US" dirty="0" smtClean="0"/>
-              <a:t> license. </a:t>
-            </a:r>
-          </a:p>
-          <a:p>
-            <a:endParaRPr lang="en-US" dirty="0"/>
+              <a:t>Stolfi</a:t>
+            </a:r>
+            <a:r>
+              <a:rPr lang="en-US" dirty="0" smtClean="0"/>
+              <a:t> - Own work, Public Domain, https://</a:t>
+            </a:r>
+            <a:r>
+              <a:rPr lang="en-US" dirty="0" smtClean="0"/>
+              <a:t>commons.wikimedia.org/w/index.php?curid=6601264)</a:t>
+            </a:r>
+            <a:endParaRPr lang="en-US" dirty="0" smtClean="0"/>
           </a:p>
         </p:txBody>
       </p:sp>
@@ -1919,7 +1994,7 @@
     </p:spTree>
     <p:extLst>
       <p:ext uri="{BB962C8B-B14F-4D97-AF65-F5344CB8AC3E}">
-        <p14:creationId xmlns:p14="http://schemas.microsoft.com/office/powerpoint/2010/main" val="1040973754"/>
+        <p14:creationId xmlns:p14="http://schemas.microsoft.com/office/powerpoint/2010/main" val="1412735394"/>
       </p:ext>
     </p:extLst>
   </p:cSld>
@@ -2090,14 +2165,39 @@
           <a:lstStyle/>
           <a:p>
             <a:r>
-              <a:rPr lang="en-US" dirty="0" smtClean="0"/>
-              <a:t>We're still only talking about accessing</a:t>
-            </a:r>
-            <a:r>
-              <a:rPr lang="en-US" baseline="0" dirty="0" smtClean="0"/>
-              <a:t> a single value.</a:t>
-            </a:r>
-            <a:endParaRPr lang="en-US" dirty="0"/>
+              <a:rPr lang="en-US" sz="1200" kern="1200" dirty="0" smtClean="0">
+                <a:solidFill>
+                  <a:schemeClr val="tx1"/>
+                </a:solidFill>
+                <a:effectLst/>
+                <a:latin typeface="+mn-lt"/>
+                <a:ea typeface="+mn-ea"/>
+                <a:cs typeface="+mn-cs"/>
+              </a:rPr>
+              <a:t>See this Stack Overflow answer, where I try and fail to create a useful constant-time index using hash clusters: </a:t>
+            </a:r>
+            <a:r>
+              <a:rPr lang="en-US" sz="1200" u="sng" kern="1200" dirty="0" smtClean="0">
+                <a:solidFill>
+                  <a:schemeClr val="tx1"/>
+                </a:solidFill>
+                <a:effectLst/>
+                <a:latin typeface="+mn-lt"/>
+                <a:ea typeface="+mn-ea"/>
+                <a:cs typeface="+mn-cs"/>
+                <a:hlinkClick r:id="rId3"/>
+              </a:rPr>
+              <a:t>https://stackoverflow.com/questions/32071259/constant-time-index-for-string-column-on-oracle-database</a:t>
+            </a:r>
+            <a:endParaRPr lang="en-US" sz="1200" u="sng" kern="1200" dirty="0" smtClean="0">
+              <a:solidFill>
+                <a:schemeClr val="tx1"/>
+              </a:solidFill>
+              <a:effectLst/>
+              <a:latin typeface="+mn-lt"/>
+              <a:ea typeface="+mn-ea"/>
+              <a:cs typeface="+mn-cs"/>
+            </a:endParaRPr>
           </a:p>
         </p:txBody>
       </p:sp>
@@ -2118,7 +2218,7 @@
           <a:p>
             <a:fld id="{5A6616C6-9DE0-4865-BC75-EB7C5EE0BF49}" type="slidenum">
               <a:rPr lang="en-US" smtClean="0"/>
-              <a:t>26</a:t>
+              <a:t>27</a:t>
             </a:fld>
             <a:endParaRPr lang="en-US"/>
           </a:p>
@@ -2127,7 +2227,7 @@
     </p:spTree>
     <p:extLst>
       <p:ext uri="{BB962C8B-B14F-4D97-AF65-F5344CB8AC3E}">
-        <p14:creationId xmlns:p14="http://schemas.microsoft.com/office/powerpoint/2010/main" val="3230797625"/>
+        <p14:creationId xmlns:p14="http://schemas.microsoft.com/office/powerpoint/2010/main" val="1699038351"/>
       </p:ext>
     </p:extLst>
   </p:cSld>
@@ -2181,157 +2281,117 @@
           <a:bodyPr/>
           <a:lstStyle/>
           <a:p>
-            <a:r>
-              <a:rPr lang="en-US" dirty="0" smtClean="0"/>
-              <a:t>Index</a:t>
-            </a:r>
-            <a:r>
-              <a:rPr lang="en-US" baseline="0" dirty="0" smtClean="0"/>
-              <a:t> height does not grow fast in practice.</a:t>
-            </a:r>
-          </a:p>
-          <a:p>
-            <a:endParaRPr lang="en-US" baseline="0" dirty="0" smtClean="0"/>
-          </a:p>
-          <a:p>
-            <a:r>
-              <a:rPr lang="en-US" baseline="0" dirty="0" smtClean="0"/>
-              <a:t>Generated by this query (run against the 350 databases I have access to)</a:t>
-            </a:r>
-          </a:p>
-          <a:p>
-            <a:r>
-              <a:rPr lang="en-US" sz="1200" b="0" i="0" u="none" strike="noStrike" kern="1200" baseline="0" dirty="0" smtClean="0">
+            <a:pPr marL="0" marR="0" indent="0" algn="l" defTabSz="914400" rtl="0" eaLnBrk="1" fontAlgn="auto" latinLnBrk="0" hangingPunct="1">
+              <a:lnSpc>
+                <a:spcPct val="100000"/>
+              </a:lnSpc>
+              <a:spcBef>
+                <a:spcPts val="0"/>
+              </a:spcBef>
+              <a:spcAft>
+                <a:spcPts val="0"/>
+              </a:spcAft>
+              <a:buClrTx/>
+              <a:buSzTx/>
+              <a:buFontTx/>
+              <a:buNone/>
+              <a:tabLst/>
+              <a:defRPr/>
+            </a:pPr>
+            <a:r>
+              <a:rPr lang="en-US" sz="1200" kern="1200" dirty="0" smtClean="0">
                 <a:solidFill>
                   <a:schemeClr val="tx1"/>
                 </a:solidFill>
+                <a:effectLst/>
                 <a:latin typeface="+mn-lt"/>
                 <a:ea typeface="+mn-ea"/>
                 <a:cs typeface="+mn-cs"/>
               </a:rPr>
-              <a:t>select </a:t>
-            </a:r>
-            <a:r>
-              <a:rPr lang="en-US" sz="1200" b="0" i="0" u="none" strike="noStrike" kern="1200" baseline="0" dirty="0" err="1" smtClean="0">
+              <a:t>Binary search algorithm image created by </a:t>
+            </a:r>
+            <a:r>
+              <a:rPr lang="en-US" sz="1200" u="sng" kern="1200" dirty="0" smtClean="0">
                 <a:solidFill>
                   <a:schemeClr val="tx1"/>
                 </a:solidFill>
+                <a:effectLst/>
                 <a:latin typeface="+mn-lt"/>
                 <a:ea typeface="+mn-ea"/>
                 <a:cs typeface="+mn-cs"/>
-              </a:rPr>
-              <a:t>blevel</a:t>
-            </a:r>
-            <a:r>
-              <a:rPr lang="en-US" sz="1200" b="0" i="0" u="none" strike="noStrike" kern="1200" baseline="0" dirty="0" smtClean="0">
+                <a:hlinkClick r:id="rId3"/>
+              </a:rPr>
+              <a:t>Chris Martin</a:t>
+            </a:r>
+            <a:r>
+              <a:rPr lang="en-US" sz="1200" kern="1200" dirty="0" smtClean="0">
                 <a:solidFill>
                   <a:schemeClr val="tx1"/>
                 </a:solidFill>
+                <a:effectLst/>
                 <a:latin typeface="+mn-lt"/>
                 <a:ea typeface="+mn-ea"/>
                 <a:cs typeface="+mn-cs"/>
               </a:rPr>
-              <a:t>, count(*) count</a:t>
-            </a:r>
-          </a:p>
-          <a:p>
-            <a:r>
-              <a:rPr lang="en-US" sz="1200" b="0" i="0" u="none" strike="noStrike" kern="1200" baseline="0" dirty="0" smtClean="0">
-                <a:solidFill>
-                  <a:schemeClr val="tx1"/>
-                </a:solidFill>
-                <a:latin typeface="+mn-lt"/>
-                <a:ea typeface="+mn-ea"/>
-                <a:cs typeface="+mn-cs"/>
-              </a:rPr>
-              <a:t>from </a:t>
-            </a:r>
-            <a:r>
-              <a:rPr lang="en-US" sz="1200" b="0" i="0" u="none" strike="noStrike" kern="1200" baseline="0" dirty="0" err="1" smtClean="0">
-                <a:solidFill>
-                  <a:schemeClr val="tx1"/>
-                </a:solidFill>
-                <a:latin typeface="+mn-lt"/>
-                <a:ea typeface="+mn-ea"/>
-                <a:cs typeface="+mn-cs"/>
-              </a:rPr>
-              <a:t>dba_indexes</a:t>
-            </a:r>
-            <a:endParaRPr lang="en-US" sz="1200" b="0" i="0" u="none" strike="noStrike" kern="1200" baseline="0" dirty="0" smtClean="0">
-              <a:solidFill>
-                <a:schemeClr val="tx1"/>
-              </a:solidFill>
-              <a:latin typeface="+mn-lt"/>
-              <a:ea typeface="+mn-ea"/>
-              <a:cs typeface="+mn-cs"/>
-            </a:endParaRPr>
-          </a:p>
-          <a:p>
-            <a:r>
-              <a:rPr lang="en-US" sz="1200" b="0" i="0" u="none" strike="noStrike" kern="1200" baseline="0" dirty="0" smtClean="0">
-                <a:solidFill>
-                  <a:schemeClr val="tx1"/>
-                </a:solidFill>
-                <a:latin typeface="+mn-lt"/>
-                <a:ea typeface="+mn-ea"/>
-                <a:cs typeface="+mn-cs"/>
-              </a:rPr>
-              <a:t>group by </a:t>
-            </a:r>
-            <a:r>
-              <a:rPr lang="en-US" sz="1200" b="0" i="0" u="none" strike="noStrike" kern="1200" baseline="0" dirty="0" err="1" smtClean="0">
-                <a:solidFill>
-                  <a:schemeClr val="tx1"/>
-                </a:solidFill>
-                <a:latin typeface="+mn-lt"/>
-                <a:ea typeface="+mn-ea"/>
-                <a:cs typeface="+mn-cs"/>
-              </a:rPr>
-              <a:t>blevel</a:t>
-            </a:r>
-            <a:endParaRPr lang="en-US" sz="1200" b="0" i="0" u="none" strike="noStrike" kern="1200" baseline="0" dirty="0" smtClean="0">
-              <a:solidFill>
-                <a:schemeClr val="tx1"/>
-              </a:solidFill>
-              <a:latin typeface="+mn-lt"/>
-              <a:ea typeface="+mn-ea"/>
-              <a:cs typeface="+mn-cs"/>
-            </a:endParaRPr>
-          </a:p>
-          <a:p>
-            <a:r>
-              <a:rPr lang="en-US" sz="1200" b="0" i="0" u="none" strike="noStrike" kern="1200" baseline="0" dirty="0" smtClean="0">
-                <a:solidFill>
-                  <a:schemeClr val="tx1"/>
-                </a:solidFill>
-                <a:latin typeface="+mn-lt"/>
-                <a:ea typeface="+mn-ea"/>
-                <a:cs typeface="+mn-cs"/>
-              </a:rPr>
-              <a:t>order by </a:t>
-            </a:r>
-            <a:r>
-              <a:rPr lang="en-US" sz="1200" b="0" i="0" u="none" strike="noStrike" kern="1200" baseline="0" dirty="0" err="1" smtClean="0">
-                <a:solidFill>
-                  <a:schemeClr val="tx1"/>
-                </a:solidFill>
-                <a:latin typeface="+mn-lt"/>
-                <a:ea typeface="+mn-ea"/>
-                <a:cs typeface="+mn-cs"/>
-              </a:rPr>
-              <a:t>blevel</a:t>
-            </a:r>
-            <a:r>
-              <a:rPr lang="en-US" sz="1200" b="0" i="0" u="none" strike="noStrike" kern="1200" baseline="0" dirty="0" smtClean="0">
-                <a:solidFill>
-                  <a:schemeClr val="tx1"/>
-                </a:solidFill>
-                <a:latin typeface="+mn-lt"/>
-                <a:ea typeface="+mn-ea"/>
-                <a:cs typeface="+mn-cs"/>
-              </a:rPr>
-              <a:t> nulls first;</a:t>
-            </a:r>
+              <a:t> and is in the public domain.</a:t>
+            </a:r>
+          </a:p>
+          <a:p>
+            <a:pPr marL="0" marR="0" indent="0" algn="l" defTabSz="914400" rtl="0" eaLnBrk="1" fontAlgn="auto" latinLnBrk="0" hangingPunct="1">
+              <a:lnSpc>
+                <a:spcPct val="100000"/>
+              </a:lnSpc>
+              <a:spcBef>
+                <a:spcPts val="0"/>
+              </a:spcBef>
+              <a:spcAft>
+                <a:spcPts val="0"/>
+              </a:spcAft>
+              <a:buClrTx/>
+              <a:buSzTx/>
+              <a:buFontTx/>
+              <a:buNone/>
+              <a:tabLst/>
+              <a:defRPr/>
+            </a:pPr>
+            <a:r>
+              <a:rPr lang="en-US" dirty="0" smtClean="0"/>
+              <a:t>Binary Search Depiction</a:t>
+            </a:r>
+            <a:r>
+              <a:rPr lang="en-US" baseline="0" dirty="0" smtClean="0"/>
+              <a:t> by </a:t>
+            </a:r>
+            <a:r>
+              <a:rPr lang="en-US" dirty="0" err="1" smtClean="0"/>
+              <a:t>AlwaysAngry</a:t>
+            </a:r>
+            <a:r>
+              <a:rPr lang="en-US" dirty="0" smtClean="0"/>
+              <a:t> is licensed under the </a:t>
+            </a:r>
+            <a:r>
+              <a:rPr lang="en-US" dirty="0" smtClean="0">
+                <a:hlinkClick r:id="rId4" tooltip="w:en:Creative Commons"/>
+              </a:rPr>
+              <a:t>Creative Commons</a:t>
+            </a:r>
+            <a:r>
+              <a:rPr lang="en-US" dirty="0" smtClean="0"/>
+              <a:t> </a:t>
+            </a:r>
+            <a:r>
+              <a:rPr lang="en-US" dirty="0" smtClean="0">
+                <a:hlinkClick r:id="rId5"/>
+              </a:rPr>
+              <a:t>Attribution-Share Alike 4.0 International</a:t>
+            </a:r>
+            <a:r>
+              <a:rPr lang="en-US" dirty="0" smtClean="0"/>
+              <a:t> license. </a:t>
+            </a:r>
+          </a:p>
+          <a:p>
             <a:endParaRPr lang="en-US" dirty="0"/>
           </a:p>
         </p:txBody>
@@ -2353,7 +2413,7 @@
           <a:p>
             <a:fld id="{5A6616C6-9DE0-4865-BC75-EB7C5EE0BF49}" type="slidenum">
               <a:rPr lang="en-US" smtClean="0"/>
-              <a:t>28</a:t>
+              <a:t>30</a:t>
             </a:fld>
             <a:endParaRPr lang="en-US"/>
           </a:p>
@@ -2362,7 +2422,7 @@
     </p:spTree>
     <p:extLst>
       <p:ext uri="{BB962C8B-B14F-4D97-AF65-F5344CB8AC3E}">
-        <p14:creationId xmlns:p14="http://schemas.microsoft.com/office/powerpoint/2010/main" val="1306290819"/>
+        <p14:creationId xmlns:p14="http://schemas.microsoft.com/office/powerpoint/2010/main" val="1040973754"/>
       </p:ext>
     </p:extLst>
   </p:cSld>
@@ -2417,66 +2477,12 @@
           <a:lstStyle/>
           <a:p>
             <a:r>
-              <a:rPr lang="en-US" sz="1200" kern="1200" dirty="0" smtClean="0">
-                <a:solidFill>
-                  <a:schemeClr val="tx1"/>
-                </a:solidFill>
-                <a:effectLst/>
-                <a:latin typeface="+mn-lt"/>
-                <a:ea typeface="+mn-ea"/>
-                <a:cs typeface="+mn-cs"/>
-              </a:rPr>
-              <a:t>Amdahl’s law as a graph.  Based on </a:t>
-            </a:r>
-            <a:r>
-              <a:rPr lang="en-US" sz="1200" u="sng" kern="1200" dirty="0" smtClean="0">
-                <a:solidFill>
-                  <a:schemeClr val="tx1"/>
-                </a:solidFill>
-                <a:effectLst/>
-                <a:latin typeface="+mn-lt"/>
-                <a:ea typeface="+mn-ea"/>
-                <a:cs typeface="+mn-cs"/>
-                <a:hlinkClick r:id="rId3"/>
-              </a:rPr>
-              <a:t>“Amdahl’s Law”</a:t>
-            </a:r>
-            <a:r>
-              <a:rPr lang="en-US" sz="1200" kern="1200" dirty="0" smtClean="0">
-                <a:solidFill>
-                  <a:schemeClr val="tx1"/>
-                </a:solidFill>
-                <a:effectLst/>
-                <a:latin typeface="+mn-lt"/>
-                <a:ea typeface="+mn-ea"/>
-                <a:cs typeface="+mn-cs"/>
-              </a:rPr>
-              <a:t> by Daniels220, licensed under </a:t>
-            </a:r>
-            <a:r>
-              <a:rPr lang="en-US" sz="1200" u="sng" kern="1200" dirty="0" smtClean="0">
-                <a:solidFill>
-                  <a:schemeClr val="tx1"/>
-                </a:solidFill>
-                <a:effectLst/>
-                <a:latin typeface="+mn-lt"/>
-                <a:ea typeface="+mn-ea"/>
-                <a:cs typeface="+mn-cs"/>
-                <a:hlinkClick r:id="rId4"/>
-              </a:rPr>
-              <a:t>CC BY-SA</a:t>
-            </a:r>
-            <a:r>
-              <a:rPr lang="en-US" sz="1200" kern="1200" dirty="0" smtClean="0">
-                <a:solidFill>
-                  <a:schemeClr val="tx1"/>
-                </a:solidFill>
-                <a:effectLst/>
-                <a:latin typeface="+mn-lt"/>
-                <a:ea typeface="+mn-ea"/>
-                <a:cs typeface="+mn-cs"/>
-              </a:rPr>
-              <a:t>.</a:t>
+              <a:rPr lang="en-US" dirty="0" smtClean="0"/>
+              <a:t>We're still only talking about accessing</a:t>
+            </a:r>
+            <a:r>
+              <a:rPr lang="en-US" baseline="0" dirty="0" smtClean="0"/>
+              <a:t> a single value.</a:t>
             </a:r>
             <a:endParaRPr lang="en-US" dirty="0"/>
           </a:p>
@@ -2499,7 +2505,7 @@
           <a:p>
             <a:fld id="{5A6616C6-9DE0-4865-BC75-EB7C5EE0BF49}" type="slidenum">
               <a:rPr lang="en-US" smtClean="0"/>
-              <a:t>29</a:t>
+              <a:t>32</a:t>
             </a:fld>
             <a:endParaRPr lang="en-US"/>
           </a:p>
@@ -2508,7 +2514,7 @@
     </p:spTree>
     <p:extLst>
       <p:ext uri="{BB962C8B-B14F-4D97-AF65-F5344CB8AC3E}">
-        <p14:creationId xmlns:p14="http://schemas.microsoft.com/office/powerpoint/2010/main" val="3996148136"/>
+        <p14:creationId xmlns:p14="http://schemas.microsoft.com/office/powerpoint/2010/main" val="3230797625"/>
       </p:ext>
     </p:extLst>
   </p:cSld>
@@ -2564,11 +2570,11 @@
           <a:p>
             <a:r>
               <a:rPr lang="en-US" dirty="0" smtClean="0"/>
-              <a:t>These</a:t>
+              <a:t>Index</a:t>
             </a:r>
             <a:r>
               <a:rPr lang="en-US" baseline="0" dirty="0" smtClean="0"/>
-              <a:t> pictures compare different ways to read a table in parallel.  The top, colorful chart shows reading one-partition-at-a-time.  The bottom, boring chart shows reading a table with a single SQL statement.</a:t>
+              <a:t> height does not grow fast in practice.</a:t>
             </a:r>
           </a:p>
           <a:p>
@@ -2577,16 +2583,141 @@
           <a:p>
             <a:r>
               <a:rPr lang="en-US" baseline="0" dirty="0" smtClean="0"/>
-              <a:t>In this case, boring is good.  The boring chart has very few edges, which means it's getting the most parallelism possible.  If we want to improve performance by X we need to have X threads running at every possible moment.</a:t>
-            </a:r>
-          </a:p>
-          <a:p>
-            <a:endParaRPr lang="en-US" baseline="0" dirty="0" smtClean="0"/>
-          </a:p>
-          <a:p>
-            <a:r>
-              <a:rPr lang="en-US" baseline="0" dirty="0" smtClean="0"/>
-              <a:t>We must have tools to measure and visualize utilization or we'd never know what's missing.</a:t>
+              <a:t>Generated by this query (run against the 350 databases I have access to)</a:t>
+            </a:r>
+          </a:p>
+          <a:p>
+            <a:r>
+              <a:rPr lang="en-US" sz="1200" b="0" i="0" u="none" strike="noStrike" kern="1200" baseline="0" dirty="0" smtClean="0">
+                <a:solidFill>
+                  <a:schemeClr val="tx1"/>
+                </a:solidFill>
+                <a:latin typeface="+mn-lt"/>
+                <a:ea typeface="+mn-ea"/>
+                <a:cs typeface="+mn-cs"/>
+              </a:rPr>
+              <a:t>select </a:t>
+            </a:r>
+            <a:r>
+              <a:rPr lang="en-US" sz="1200" b="0" i="0" u="none" strike="noStrike" kern="1200" baseline="0" dirty="0" err="1" smtClean="0">
+                <a:solidFill>
+                  <a:schemeClr val="tx1"/>
+                </a:solidFill>
+                <a:latin typeface="+mn-lt"/>
+                <a:ea typeface="+mn-ea"/>
+                <a:cs typeface="+mn-cs"/>
+              </a:rPr>
+              <a:t>blevel</a:t>
+            </a:r>
+            <a:r>
+              <a:rPr lang="en-US" sz="1200" b="0" i="0" u="none" strike="noStrike" kern="1200" baseline="0" dirty="0" smtClean="0">
+                <a:solidFill>
+                  <a:schemeClr val="tx1"/>
+                </a:solidFill>
+                <a:latin typeface="+mn-lt"/>
+                <a:ea typeface="+mn-ea"/>
+                <a:cs typeface="+mn-cs"/>
+              </a:rPr>
+              <a:t>, count(*) count</a:t>
+            </a:r>
+          </a:p>
+          <a:p>
+            <a:r>
+              <a:rPr lang="en-US" sz="1200" b="0" i="0" u="none" strike="noStrike" kern="1200" baseline="0" dirty="0" smtClean="0">
+                <a:solidFill>
+                  <a:schemeClr val="tx1"/>
+                </a:solidFill>
+                <a:latin typeface="+mn-lt"/>
+                <a:ea typeface="+mn-ea"/>
+                <a:cs typeface="+mn-cs"/>
+              </a:rPr>
+              <a:t>from </a:t>
+            </a:r>
+            <a:r>
+              <a:rPr lang="en-US" sz="1200" b="0" i="0" u="none" strike="noStrike" kern="1200" baseline="0" dirty="0" err="1" smtClean="0">
+                <a:solidFill>
+                  <a:schemeClr val="tx1"/>
+                </a:solidFill>
+                <a:latin typeface="+mn-lt"/>
+                <a:ea typeface="+mn-ea"/>
+                <a:cs typeface="+mn-cs"/>
+              </a:rPr>
+              <a:t>dba_indexes</a:t>
+            </a:r>
+            <a:endParaRPr lang="en-US" sz="1200" b="0" i="0" u="none" strike="noStrike" kern="1200" baseline="0" dirty="0" smtClean="0">
+              <a:solidFill>
+                <a:schemeClr val="tx1"/>
+              </a:solidFill>
+              <a:latin typeface="+mn-lt"/>
+              <a:ea typeface="+mn-ea"/>
+              <a:cs typeface="+mn-cs"/>
+            </a:endParaRPr>
+          </a:p>
+          <a:p>
+            <a:r>
+              <a:rPr lang="en-US" sz="1200" b="0" i="0" u="none" strike="noStrike" kern="1200" baseline="0" dirty="0" smtClean="0">
+                <a:solidFill>
+                  <a:schemeClr val="tx1"/>
+                </a:solidFill>
+                <a:latin typeface="+mn-lt"/>
+                <a:ea typeface="+mn-ea"/>
+                <a:cs typeface="+mn-cs"/>
+              </a:rPr>
+              <a:t>group by </a:t>
+            </a:r>
+            <a:r>
+              <a:rPr lang="en-US" sz="1200" b="0" i="0" u="none" strike="noStrike" kern="1200" baseline="0" dirty="0" err="1" smtClean="0">
+                <a:solidFill>
+                  <a:schemeClr val="tx1"/>
+                </a:solidFill>
+                <a:latin typeface="+mn-lt"/>
+                <a:ea typeface="+mn-ea"/>
+                <a:cs typeface="+mn-cs"/>
+              </a:rPr>
+              <a:t>blevel</a:t>
+            </a:r>
+            <a:endParaRPr lang="en-US" sz="1200" b="0" i="0" u="none" strike="noStrike" kern="1200" baseline="0" dirty="0" smtClean="0">
+              <a:solidFill>
+                <a:schemeClr val="tx1"/>
+              </a:solidFill>
+              <a:latin typeface="+mn-lt"/>
+              <a:ea typeface="+mn-ea"/>
+              <a:cs typeface="+mn-cs"/>
+            </a:endParaRPr>
+          </a:p>
+          <a:p>
+            <a:r>
+              <a:rPr lang="en-US" sz="1200" b="0" i="0" u="none" strike="noStrike" kern="1200" baseline="0" dirty="0" smtClean="0">
+                <a:solidFill>
+                  <a:schemeClr val="tx1"/>
+                </a:solidFill>
+                <a:latin typeface="+mn-lt"/>
+                <a:ea typeface="+mn-ea"/>
+                <a:cs typeface="+mn-cs"/>
+              </a:rPr>
+              <a:t>order by </a:t>
+            </a:r>
+            <a:r>
+              <a:rPr lang="en-US" sz="1200" b="0" i="0" u="none" strike="noStrike" kern="1200" baseline="0" dirty="0" err="1" smtClean="0">
+                <a:solidFill>
+                  <a:schemeClr val="tx1"/>
+                </a:solidFill>
+                <a:latin typeface="+mn-lt"/>
+                <a:ea typeface="+mn-ea"/>
+                <a:cs typeface="+mn-cs"/>
+              </a:rPr>
+              <a:t>blevel</a:t>
+            </a:r>
+            <a:r>
+              <a:rPr lang="en-US" sz="1200" b="0" i="0" u="none" strike="noStrike" kern="1200" baseline="0" dirty="0" smtClean="0">
+                <a:solidFill>
+                  <a:schemeClr val="tx1"/>
+                </a:solidFill>
+                <a:latin typeface="+mn-lt"/>
+                <a:ea typeface="+mn-ea"/>
+                <a:cs typeface="+mn-cs"/>
+              </a:rPr>
+              <a:t> nulls first;</a:t>
             </a:r>
             <a:endParaRPr lang="en-US" dirty="0"/>
           </a:p>
@@ -2609,7 +2740,7 @@
           <a:p>
             <a:fld id="{5A6616C6-9DE0-4865-BC75-EB7C5EE0BF49}" type="slidenum">
               <a:rPr lang="en-US" smtClean="0"/>
-              <a:t>31</a:t>
+              <a:t>34</a:t>
             </a:fld>
             <a:endParaRPr lang="en-US"/>
           </a:p>
@@ -2618,7 +2749,7 @@
     </p:spTree>
     <p:extLst>
       <p:ext uri="{BB962C8B-B14F-4D97-AF65-F5344CB8AC3E}">
-        <p14:creationId xmlns:p14="http://schemas.microsoft.com/office/powerpoint/2010/main" val="2087203130"/>
+        <p14:creationId xmlns:p14="http://schemas.microsoft.com/office/powerpoint/2010/main" val="1306290819"/>
       </p:ext>
     </p:extLst>
   </p:cSld>
@@ -2673,12 +2804,66 @@
           <a:lstStyle/>
           <a:p>
             <a:r>
-              <a:rPr lang="en-US" dirty="0" smtClean="0"/>
-              <a:t>Changes</a:t>
-            </a:r>
-            <a:r>
-              <a:rPr lang="en-US" baseline="0" dirty="0" smtClean="0"/>
-              <a:t> like using direct-path writes are "only" a 3x improvement, but that's still pretty awesome.</a:t>
+              <a:rPr lang="en-US" sz="1200" kern="1200" dirty="0" smtClean="0">
+                <a:solidFill>
+                  <a:schemeClr val="tx1"/>
+                </a:solidFill>
+                <a:effectLst/>
+                <a:latin typeface="+mn-lt"/>
+                <a:ea typeface="+mn-ea"/>
+                <a:cs typeface="+mn-cs"/>
+              </a:rPr>
+              <a:t>Amdahl’s law as a graph.  Based on </a:t>
+            </a:r>
+            <a:r>
+              <a:rPr lang="en-US" sz="1200" u="sng" kern="1200" dirty="0" smtClean="0">
+                <a:solidFill>
+                  <a:schemeClr val="tx1"/>
+                </a:solidFill>
+                <a:effectLst/>
+                <a:latin typeface="+mn-lt"/>
+                <a:ea typeface="+mn-ea"/>
+                <a:cs typeface="+mn-cs"/>
+                <a:hlinkClick r:id="rId3"/>
+              </a:rPr>
+              <a:t>“Amdahl’s Law”</a:t>
+            </a:r>
+            <a:r>
+              <a:rPr lang="en-US" sz="1200" kern="1200" dirty="0" smtClean="0">
+                <a:solidFill>
+                  <a:schemeClr val="tx1"/>
+                </a:solidFill>
+                <a:effectLst/>
+                <a:latin typeface="+mn-lt"/>
+                <a:ea typeface="+mn-ea"/>
+                <a:cs typeface="+mn-cs"/>
+              </a:rPr>
+              <a:t> by Daniels220, licensed under </a:t>
+            </a:r>
+            <a:r>
+              <a:rPr lang="en-US" sz="1200" u="sng" kern="1200" dirty="0" smtClean="0">
+                <a:solidFill>
+                  <a:schemeClr val="tx1"/>
+                </a:solidFill>
+                <a:effectLst/>
+                <a:latin typeface="+mn-lt"/>
+                <a:ea typeface="+mn-ea"/>
+                <a:cs typeface="+mn-cs"/>
+                <a:hlinkClick r:id="rId4"/>
+              </a:rPr>
+              <a:t>CC BY-SA</a:t>
+            </a:r>
+            <a:r>
+              <a:rPr lang="en-US" sz="1200" kern="1200" dirty="0" smtClean="0">
+                <a:solidFill>
+                  <a:schemeClr val="tx1"/>
+                </a:solidFill>
+                <a:effectLst/>
+                <a:latin typeface="+mn-lt"/>
+                <a:ea typeface="+mn-ea"/>
+                <a:cs typeface="+mn-cs"/>
+              </a:rPr>
+              <a:t>.</a:t>
             </a:r>
             <a:endParaRPr lang="en-US" dirty="0"/>
           </a:p>
@@ -2701,7 +2886,7 @@
           <a:p>
             <a:fld id="{5A6616C6-9DE0-4865-BC75-EB7C5EE0BF49}" type="slidenum">
               <a:rPr lang="en-US" smtClean="0"/>
-              <a:t>34</a:t>
+              <a:t>35</a:t>
             </a:fld>
             <a:endParaRPr lang="en-US"/>
           </a:p>
@@ -2710,7 +2895,7 @@
     </p:spTree>
     <p:extLst>
       <p:ext uri="{BB962C8B-B14F-4D97-AF65-F5344CB8AC3E}">
-        <p14:creationId xmlns:p14="http://schemas.microsoft.com/office/powerpoint/2010/main" val="2597115283"/>
+        <p14:creationId xmlns:p14="http://schemas.microsoft.com/office/powerpoint/2010/main" val="3996148136"/>
       </p:ext>
     </p:extLst>
   </p:cSld>
@@ -2765,46 +2950,30 @@
           <a:lstStyle/>
           <a:p>
             <a:r>
-              <a:rPr lang="en-US" b="1" dirty="0" smtClean="0"/>
-              <a:t>Difficult</a:t>
-            </a:r>
-            <a:r>
-              <a:rPr lang="en-US" b="1" baseline="0" dirty="0" smtClean="0"/>
-              <a:t> choice:</a:t>
+              <a:rPr lang="en-US" dirty="0" smtClean="0"/>
+              <a:t>These</a:t>
             </a:r>
             <a:r>
               <a:rPr lang="en-US" baseline="0" dirty="0" smtClean="0"/>
-              <a:t> It's not obvious when a full table scan is cheaper than an index read.  It depends on the percentage of the index and how big the data is.</a:t>
-            </a:r>
-          </a:p>
-          <a:p>
-            <a:r>
-              <a:rPr lang="en-US" b="1" baseline="0" dirty="0" smtClean="0"/>
-              <a:t>Other factors:</a:t>
-            </a:r>
+              <a:t> pictures compare different ways to read a table in parallel.  The top, colorful chart shows reading one-partition-at-a-time.  The bottom, boring chart shows reading a table with a single SQL statement.</a:t>
+            </a:r>
+          </a:p>
+          <a:p>
+            <a:endParaRPr lang="en-US" baseline="0" dirty="0" smtClean="0"/>
+          </a:p>
+          <a:p>
             <a:r>
               <a:rPr lang="en-US" baseline="0" dirty="0" smtClean="0"/>
-              <a:t> Clustering factor, multi-block versus single-block read time affect the choice.</a:t>
-            </a:r>
-          </a:p>
-          <a:p>
-            <a:r>
-              <a:rPr lang="en-US" b="1" baseline="0" dirty="0" smtClean="0"/>
-              <a:t>Theory versus practice:</a:t>
-            </a:r>
+              <a:t>In this case, boring is good.  The boring chart has very few edges, which means it's getting the most parallelism possible.  If we want to improve performance by X we need to have X threads running at every possible moment.</a:t>
+            </a:r>
+          </a:p>
+          <a:p>
+            <a:endParaRPr lang="en-US" baseline="0" dirty="0" smtClean="0"/>
+          </a:p>
+          <a:p>
             <a:r>
               <a:rPr lang="en-US" baseline="0" dirty="0" smtClean="0"/>
-              <a:t> Theory tells us the *shape*, but practice tells us the actual number where they diverge.</a:t>
-            </a:r>
-          </a:p>
-          <a:p>
-            <a:r>
-              <a:rPr lang="en-US" b="1" baseline="0" dirty="0" smtClean="0"/>
-              <a:t>Cardinality:</a:t>
-            </a:r>
-            <a:r>
-              <a:rPr lang="en-US" baseline="0" dirty="0" smtClean="0"/>
-              <a:t> This is why cardinality is important.  Oracle must know where on the X-axis we are, to know which choice is better.</a:t>
+              <a:t>We must have tools to measure and visualize utilization or we'd never know what's missing.</a:t>
             </a:r>
             <a:endParaRPr lang="en-US" dirty="0"/>
           </a:p>
@@ -2836,7 +3005,7 @@
     </p:spTree>
     <p:extLst>
       <p:ext uri="{BB962C8B-B14F-4D97-AF65-F5344CB8AC3E}">
-        <p14:creationId xmlns:p14="http://schemas.microsoft.com/office/powerpoint/2010/main" val="3435678858"/>
+        <p14:creationId xmlns:p14="http://schemas.microsoft.com/office/powerpoint/2010/main" val="2087203130"/>
       </p:ext>
     </p:extLst>
   </p:cSld>
@@ -2890,6 +3059,14 @@
           <a:bodyPr/>
           <a:lstStyle/>
           <a:p>
+            <a:r>
+              <a:rPr lang="en-US" dirty="0" smtClean="0"/>
+              <a:t>Changes</a:t>
+            </a:r>
+            <a:r>
+              <a:rPr lang="en-US" baseline="0" dirty="0" smtClean="0"/>
+              <a:t> like using direct-path writes are "only" a 3x improvement, but that's still pretty awesome.</a:t>
+            </a:r>
             <a:endParaRPr lang="en-US" dirty="0"/>
           </a:p>
         </p:txBody>
@@ -2911,7 +3088,7 @@
           <a:p>
             <a:fld id="{5A6616C6-9DE0-4865-BC75-EB7C5EE0BF49}" type="slidenum">
               <a:rPr lang="en-US" smtClean="0"/>
-              <a:t>39</a:t>
+              <a:t>40</a:t>
             </a:fld>
             <a:endParaRPr lang="en-US"/>
           </a:p>
@@ -2920,7 +3097,7 @@
     </p:spTree>
     <p:extLst>
       <p:ext uri="{BB962C8B-B14F-4D97-AF65-F5344CB8AC3E}">
-        <p14:creationId xmlns:p14="http://schemas.microsoft.com/office/powerpoint/2010/main" val="24726982"/>
+        <p14:creationId xmlns:p14="http://schemas.microsoft.com/office/powerpoint/2010/main" val="2597115283"/>
       </p:ext>
     </p:extLst>
   </p:cSld>
@@ -2975,12 +3152,46 @@
           <a:lstStyle/>
           <a:p>
             <a:r>
-              <a:rPr lang="en-US" dirty="0" smtClean="0"/>
-              <a:t>Chart is from my answer here:</a:t>
+              <a:rPr lang="en-US" b="1" dirty="0" smtClean="0"/>
+              <a:t>Difficult</a:t>
+            </a:r>
+            <a:r>
+              <a:rPr lang="en-US" b="1" baseline="0" dirty="0" smtClean="0"/>
+              <a:t> choice:</a:t>
             </a:r>
             <a:r>
               <a:rPr lang="en-US" baseline="0" dirty="0" smtClean="0"/>
-              <a:t> https://stackoverflow.com/questions/8188093/oracle-always-uses-hash-join-even-when-both-tables-are-huge</a:t>
+              <a:t> It's not obvious when a full table scan is cheaper than an index read.  It depends on the percentage of the index and how big the data is.</a:t>
+            </a:r>
+          </a:p>
+          <a:p>
+            <a:r>
+              <a:rPr lang="en-US" b="1" baseline="0" dirty="0" smtClean="0"/>
+              <a:t>Other factors:</a:t>
+            </a:r>
+            <a:r>
+              <a:rPr lang="en-US" baseline="0" dirty="0" smtClean="0"/>
+              <a:t> Clustering factor, multi-block versus single-block read time affect the choice.</a:t>
+            </a:r>
+          </a:p>
+          <a:p>
+            <a:r>
+              <a:rPr lang="en-US" b="1" baseline="0" dirty="0" smtClean="0"/>
+              <a:t>Theory versus practice:</a:t>
+            </a:r>
+            <a:r>
+              <a:rPr lang="en-US" baseline="0" dirty="0" smtClean="0"/>
+              <a:t> Theory tells us the *shape*, but practice tells us the actual number where they diverge.</a:t>
+            </a:r>
+          </a:p>
+          <a:p>
+            <a:r>
+              <a:rPr lang="en-US" b="1" baseline="0" dirty="0" smtClean="0"/>
+              <a:t>Cardinality:</a:t>
+            </a:r>
+            <a:r>
+              <a:rPr lang="en-US" baseline="0" dirty="0" smtClean="0"/>
+              <a:t> This is why cardinality is important.  Oracle must know where on the X-axis we are, to know which choice is better.</a:t>
             </a:r>
             <a:endParaRPr lang="en-US" dirty="0"/>
           </a:p>
@@ -3003,7 +3214,7 @@
           <a:p>
             <a:fld id="{5A6616C6-9DE0-4865-BC75-EB7C5EE0BF49}" type="slidenum">
               <a:rPr lang="en-US" smtClean="0"/>
-              <a:t>40</a:t>
+              <a:t>43</a:t>
             </a:fld>
             <a:endParaRPr lang="en-US"/>
           </a:p>
@@ -3012,7 +3223,7 @@
     </p:spTree>
     <p:extLst>
       <p:ext uri="{BB962C8B-B14F-4D97-AF65-F5344CB8AC3E}">
-        <p14:creationId xmlns:p14="http://schemas.microsoft.com/office/powerpoint/2010/main" val="23698583"/>
+        <p14:creationId xmlns:p14="http://schemas.microsoft.com/office/powerpoint/2010/main" val="3435678858"/>
       </p:ext>
     </p:extLst>
   </p:cSld>
@@ -3087,7 +3298,7 @@
           <a:p>
             <a:fld id="{5A6616C6-9DE0-4865-BC75-EB7C5EE0BF49}" type="slidenum">
               <a:rPr lang="en-US" smtClean="0"/>
-              <a:t>49</a:t>
+              <a:t>45</a:t>
             </a:fld>
             <a:endParaRPr lang="en-US"/>
           </a:p>
@@ -3096,7 +3307,99 @@
     </p:spTree>
     <p:extLst>
       <p:ext uri="{BB962C8B-B14F-4D97-AF65-F5344CB8AC3E}">
-        <p14:creationId xmlns:p14="http://schemas.microsoft.com/office/powerpoint/2010/main" val="2780744985"/>
+        <p14:creationId xmlns:p14="http://schemas.microsoft.com/office/powerpoint/2010/main" val="24726982"/>
+      </p:ext>
+    </p:extLst>
+  </p:cSld>
+  <p:clrMapOvr>
+    <a:masterClrMapping/>
+  </p:clrMapOvr>
+</p:notes>
+</file>
+
+<file path=ppt/notesSlides/notesSlide29.xml><?xml version="1.0" encoding="utf-8"?>
+<p:notes xmlns:a="http://schemas.openxmlformats.org/drawingml/2006/main" xmlns:r="http://schemas.openxmlformats.org/officeDocument/2006/relationships" xmlns:p="http://schemas.openxmlformats.org/presentationml/2006/main">
+  <p:cSld>
+    <p:spTree>
+      <p:nvGrpSpPr>
+        <p:cNvPr id="1" name=""/>
+        <p:cNvGrpSpPr/>
+        <p:nvPr/>
+      </p:nvGrpSpPr>
+      <p:grpSpPr>
+        <a:xfrm>
+          <a:off x="0" y="0"/>
+          <a:ext cx="0" cy="0"/>
+          <a:chOff x="0" y="0"/>
+          <a:chExt cx="0" cy="0"/>
+        </a:xfrm>
+      </p:grpSpPr>
+      <p:sp>
+        <p:nvSpPr>
+          <p:cNvPr id="2" name="Slide Image Placeholder 1"/>
+          <p:cNvSpPr>
+            <a:spLocks noGrp="1" noRot="1" noChangeAspect="1"/>
+          </p:cNvSpPr>
+          <p:nvPr>
+            <p:ph type="sldImg"/>
+          </p:nvPr>
+        </p:nvSpPr>
+        <p:spPr/>
+      </p:sp>
+      <p:sp>
+        <p:nvSpPr>
+          <p:cNvPr id="3" name="Notes Placeholder 2"/>
+          <p:cNvSpPr>
+            <a:spLocks noGrp="1"/>
+          </p:cNvSpPr>
+          <p:nvPr>
+            <p:ph type="body" idx="1"/>
+          </p:nvPr>
+        </p:nvSpPr>
+        <p:spPr/>
+        <p:txBody>
+          <a:bodyPr/>
+          <a:lstStyle/>
+          <a:p>
+            <a:r>
+              <a:rPr lang="en-US" dirty="0" smtClean="0"/>
+              <a:t>Chart is from my answer here:</a:t>
+            </a:r>
+            <a:r>
+              <a:rPr lang="en-US" baseline="0" dirty="0" smtClean="0"/>
+              <a:t> https://stackoverflow.com/questions/8188093/oracle-always-uses-hash-join-even-when-both-tables-are-huge</a:t>
+            </a:r>
+            <a:endParaRPr lang="en-US" dirty="0"/>
+          </a:p>
+        </p:txBody>
+      </p:sp>
+      <p:sp>
+        <p:nvSpPr>
+          <p:cNvPr id="4" name="Slide Number Placeholder 3"/>
+          <p:cNvSpPr>
+            <a:spLocks noGrp="1"/>
+          </p:cNvSpPr>
+          <p:nvPr>
+            <p:ph type="sldNum" sz="quarter" idx="10"/>
+          </p:nvPr>
+        </p:nvSpPr>
+        <p:spPr/>
+        <p:txBody>
+          <a:bodyPr/>
+          <a:lstStyle/>
+          <a:p>
+            <a:fld id="{5A6616C6-9DE0-4865-BC75-EB7C5EE0BF49}" type="slidenum">
+              <a:rPr lang="en-US" smtClean="0"/>
+              <a:t>46</a:t>
+            </a:fld>
+            <a:endParaRPr lang="en-US"/>
+          </a:p>
+        </p:txBody>
+      </p:sp>
+    </p:spTree>
+    <p:extLst>
+      <p:ext uri="{BB962C8B-B14F-4D97-AF65-F5344CB8AC3E}">
+        <p14:creationId xmlns:p14="http://schemas.microsoft.com/office/powerpoint/2010/main" val="23698583"/>
       </p:ext>
     </p:extLst>
   </p:cSld>
@@ -3224,6 +3527,90 @@
     <p:extLst>
       <p:ext uri="{BB962C8B-B14F-4D97-AF65-F5344CB8AC3E}">
         <p14:creationId xmlns:p14="http://schemas.microsoft.com/office/powerpoint/2010/main" val="379492785"/>
+      </p:ext>
+    </p:extLst>
+  </p:cSld>
+  <p:clrMapOvr>
+    <a:masterClrMapping/>
+  </p:clrMapOvr>
+</p:notes>
+</file>
+
+<file path=ppt/notesSlides/notesSlide30.xml><?xml version="1.0" encoding="utf-8"?>
+<p:notes xmlns:a="http://schemas.openxmlformats.org/drawingml/2006/main" xmlns:r="http://schemas.openxmlformats.org/officeDocument/2006/relationships" xmlns:p="http://schemas.openxmlformats.org/presentationml/2006/main">
+  <p:cSld>
+    <p:spTree>
+      <p:nvGrpSpPr>
+        <p:cNvPr id="1" name=""/>
+        <p:cNvGrpSpPr/>
+        <p:nvPr/>
+      </p:nvGrpSpPr>
+      <p:grpSpPr>
+        <a:xfrm>
+          <a:off x="0" y="0"/>
+          <a:ext cx="0" cy="0"/>
+          <a:chOff x="0" y="0"/>
+          <a:chExt cx="0" cy="0"/>
+        </a:xfrm>
+      </p:grpSpPr>
+      <p:sp>
+        <p:nvSpPr>
+          <p:cNvPr id="2" name="Slide Image Placeholder 1"/>
+          <p:cNvSpPr>
+            <a:spLocks noGrp="1" noRot="1" noChangeAspect="1"/>
+          </p:cNvSpPr>
+          <p:nvPr>
+            <p:ph type="sldImg"/>
+          </p:nvPr>
+        </p:nvSpPr>
+        <p:spPr/>
+      </p:sp>
+      <p:sp>
+        <p:nvSpPr>
+          <p:cNvPr id="3" name="Notes Placeholder 2"/>
+          <p:cNvSpPr>
+            <a:spLocks noGrp="1"/>
+          </p:cNvSpPr>
+          <p:nvPr>
+            <p:ph type="body" idx="1"/>
+          </p:nvPr>
+        </p:nvSpPr>
+        <p:spPr/>
+        <p:txBody>
+          <a:bodyPr/>
+          <a:lstStyle/>
+          <a:p>
+            <a:endParaRPr lang="en-US" dirty="0"/>
+          </a:p>
+        </p:txBody>
+      </p:sp>
+      <p:sp>
+        <p:nvSpPr>
+          <p:cNvPr id="4" name="Slide Number Placeholder 3"/>
+          <p:cNvSpPr>
+            <a:spLocks noGrp="1"/>
+          </p:cNvSpPr>
+          <p:nvPr>
+            <p:ph type="sldNum" sz="quarter" idx="10"/>
+          </p:nvPr>
+        </p:nvSpPr>
+        <p:spPr/>
+        <p:txBody>
+          <a:bodyPr/>
+          <a:lstStyle/>
+          <a:p>
+            <a:fld id="{5A6616C6-9DE0-4865-BC75-EB7C5EE0BF49}" type="slidenum">
+              <a:rPr lang="en-US" smtClean="0"/>
+              <a:t>55</a:t>
+            </a:fld>
+            <a:endParaRPr lang="en-US"/>
+          </a:p>
+        </p:txBody>
+      </p:sp>
+    </p:spTree>
+    <p:extLst>
+      <p:ext uri="{BB962C8B-B14F-4D97-AF65-F5344CB8AC3E}">
+        <p14:creationId xmlns:p14="http://schemas.microsoft.com/office/powerpoint/2010/main" val="2780744985"/>
       </p:ext>
     </p:extLst>
   </p:cSld>
@@ -3834,6 +4221,16 @@
             <a:r>
               <a:rPr lang="en-US" baseline="0" dirty="0" smtClean="0"/>
               <a:t>O(N) - If we're unlucky we have to search each of the N elements.  Worst case is the most realistic.  Unless we have a unique array or index, we have to continue searching through all N elements, even if we find a match.  For example, in the previous slide there were duplicate values, one near the beginning, and one near the end.</a:t>
+            </a:r>
+          </a:p>
+          <a:p>
+            <a:pPr marL="171450" indent="-171450">
+              <a:buFont typeface="Arial" charset="0"/>
+              <a:buChar char="•"/>
+            </a:pPr>
+            <a:r>
+              <a:rPr lang="en-US" baseline="0" dirty="0" smtClean="0"/>
+              <a:t>This is not a full introduction to algorithm analysis.  If you're interested in this topic I recommend you search for "algorithm analysis" and read one or two of the computer science lectures.  The topic usually does not require a heavy math background.</a:t>
             </a:r>
           </a:p>
         </p:txBody>
@@ -11492,7 +11889,7 @@
           </p:nvPr>
         </p:nvPicPr>
         <p:blipFill>
-          <a:blip r:embed="rId2" cstate="print">
+          <a:blip r:embed="rId3" cstate="print">
             <a:extLst>
               <a:ext uri="{28A0092B-C50C-407E-A947-70E740481C1C}">
                 <a14:useLocalDpi xmlns:a14="http://schemas.microsoft.com/office/drawing/2010/main" val="0"/>
@@ -11572,9 +11969,9 @@
       </p:sp>
       <p:pic>
         <p:nvPicPr>
-          <p:cNvPr id="4" name="Content Placeholder 3"/>
+          <p:cNvPr id="5123" name="Picture 3"/>
           <p:cNvPicPr>
-            <a:picLocks noGrp="1" noChangeAspect="1"/>
+            <a:picLocks noGrp="1" noChangeAspect="1" noChangeArrowheads="1"/>
           </p:cNvPicPr>
           <p:nvPr>
             <p:ph idx="1"/>
@@ -11588,15 +11985,52 @@
               </a:ext>
             </a:extLst>
           </a:blip>
+          <a:srcRect/>
           <a:stretch>
             <a:fillRect/>
           </a:stretch>
         </p:blipFill>
-        <p:spPr>
+        <p:spPr bwMode="auto">
           <a:xfrm>
-            <a:off x="2606040" y="895350"/>
+            <a:off x="2606040" y="1002030"/>
             <a:ext cx="3931920" cy="3931920"/>
           </a:xfrm>
+          <a:prstGeom prst="rect">
+            <a:avLst/>
+          </a:prstGeom>
+          <a:noFill/>
+          <a:ln>
+            <a:noFill/>
+          </a:ln>
+          <a:effectLst/>
+          <a:extLst>
+            <a:ext uri="{909E8E84-426E-40DD-AFC4-6F175D3DCCD1}">
+              <a14:hiddenFill xmlns:a14="http://schemas.microsoft.com/office/drawing/2010/main">
+                <a:solidFill>
+                  <a:schemeClr val="accent1"/>
+                </a:solidFill>
+              </a14:hiddenFill>
+            </a:ext>
+            <a:ext uri="{91240B29-F687-4F45-9708-019B960494DF}">
+              <a14:hiddenLine xmlns:a14="http://schemas.microsoft.com/office/drawing/2010/main" w="9525">
+                <a:solidFill>
+                  <a:schemeClr val="tx1"/>
+                </a:solidFill>
+                <a:miter lim="800000"/>
+                <a:headEnd/>
+                <a:tailEnd/>
+              </a14:hiddenLine>
+            </a:ext>
+            <a:ext uri="{AF507438-7753-43E0-B8FC-AC1667EBCBE1}">
+              <a14:hiddenEffects xmlns:a14="http://schemas.microsoft.com/office/drawing/2010/main">
+                <a:effectLst>
+                  <a:outerShdw dist="35921" dir="2700000" algn="ctr" rotWithShape="0">
+                    <a:schemeClr val="bg2"/>
+                  </a:outerShdw>
+                </a:effectLst>
+              </a14:hiddenEffects>
+            </a:ext>
+          </a:extLst>
         </p:spPr>
       </p:pic>
     </p:spTree>
@@ -11682,14 +12116,40 @@
           <a:p>
             <a:r>
               <a:rPr lang="en-US" dirty="0" smtClean="0"/>
-              <a:t>Hashing - partitioning, clusters, joins</a:t>
-            </a:r>
-          </a:p>
-          <a:p>
-            <a:r>
-              <a:rPr lang="en-US" dirty="0" smtClean="0"/>
-              <a:t>Other - INSERT, CREATE, DROP, etc.</a:t>
-            </a:r>
+              <a:t>INSERT VALUES*, </a:t>
+            </a:r>
+            <a:r>
+              <a:rPr lang="en-US" dirty="0"/>
+              <a:t>CREATE, DROP, </a:t>
+            </a:r>
+            <a:r>
+              <a:rPr lang="en-US" dirty="0" smtClean="0"/>
+              <a:t>TRUNCATE, ALTER SESSION, </a:t>
+            </a:r>
+            <a:r>
+              <a:rPr lang="en-US" dirty="0"/>
+              <a:t>etc.</a:t>
+            </a:r>
+          </a:p>
+          <a:p>
+            <a:r>
+              <a:rPr lang="en-US" dirty="0" smtClean="0"/>
+              <a:t>Hashing (one value) </a:t>
+            </a:r>
+            <a:r>
+              <a:rPr lang="en-US" dirty="0" smtClean="0"/>
+              <a:t>- partitioning, </a:t>
+            </a:r>
+            <a:r>
+              <a:rPr lang="en-US" dirty="0" smtClean="0"/>
+              <a:t>hash clusters</a:t>
+            </a:r>
+            <a:r>
+              <a:rPr lang="en-US" dirty="0" smtClean="0"/>
+              <a:t>, joins</a:t>
+            </a:r>
+          </a:p>
+          <a:p>
             <a:endParaRPr lang="en-US" dirty="0"/>
           </a:p>
         </p:txBody>
@@ -11748,45 +12208,402 @@
           <a:p>
             <a:r>
               <a:rPr lang="en-US" dirty="0" smtClean="0"/>
-              <a:t>1 - Hashing Types and Tradeoffs</a:t>
+              <a:t>1 - Hashing</a:t>
             </a:r>
             <a:endParaRPr lang="en-US" dirty="0"/>
           </a:p>
         </p:txBody>
       </p:sp>
-      <p:pic>
-        <p:nvPicPr>
-          <p:cNvPr id="4" name="Content Placeholder 3"/>
-          <p:cNvPicPr>
-            <a:picLocks noGrp="1" noChangeAspect="1"/>
-          </p:cNvPicPr>
+      <p:sp>
+        <p:nvSpPr>
+          <p:cNvPr id="3" name="Content Placeholder 2"/>
+          <p:cNvSpPr>
+            <a:spLocks noGrp="1"/>
+          </p:cNvSpPr>
           <p:nvPr>
             <p:ph idx="1"/>
           </p:nvPr>
-        </p:nvPicPr>
-        <p:blipFill>
-          <a:blip r:embed="rId3">
-            <a:extLst>
-              <a:ext uri="{28A0092B-C50C-407E-A947-70E740481C1C}">
-                <a14:useLocalDpi xmlns:a14="http://schemas.microsoft.com/office/drawing/2010/main" val="0"/>
-              </a:ext>
-            </a:extLst>
-          </a:blip>
-          <a:stretch>
-            <a:fillRect/>
-          </a:stretch>
-        </p:blipFill>
-        <p:spPr>
-          <a:xfrm>
-            <a:off x="457200" y="1209588"/>
-            <a:ext cx="8229600" cy="3375198"/>
-          </a:xfrm>
-        </p:spPr>
-      </p:pic>
+        </p:nvSpPr>
+        <p:spPr/>
+        <p:txBody>
+          <a:bodyPr>
+            <a:normAutofit fontScale="70000" lnSpcReduction="20000"/>
+          </a:bodyPr>
+          <a:lstStyle/>
+          <a:p>
+            <a:r>
+              <a:rPr lang="en-US" dirty="0" smtClean="0"/>
+              <a:t>Map a value to a set of buckets</a:t>
+            </a:r>
+            <a:endParaRPr lang="en-US" dirty="0"/>
+          </a:p>
+          <a:p>
+            <a:r>
+              <a:rPr lang="en-US" smtClean="0"/>
+              <a:t>Useful for grouping</a:t>
+            </a:r>
+            <a:r>
+              <a:rPr lang="en-US" dirty="0" smtClean="0"/>
+              <a:t>, comparing, cryptography, etc.</a:t>
+            </a:r>
+          </a:p>
+          <a:p>
+            <a:pPr marL="0" indent="0">
+              <a:buNone/>
+            </a:pPr>
+            <a:r>
+              <a:rPr lang="en-US" b="1" dirty="0" smtClean="0">
+                <a:latin typeface="Courier New" panose="02070309020205020404" pitchFamily="49" charset="0"/>
+                <a:cs typeface="Courier New" panose="02070309020205020404" pitchFamily="49" charset="0"/>
+              </a:rPr>
+              <a:t/>
+            </a:r>
+            <a:br>
+              <a:rPr lang="en-US" b="1" dirty="0" smtClean="0">
+                <a:latin typeface="Courier New" panose="02070309020205020404" pitchFamily="49" charset="0"/>
+                <a:cs typeface="Courier New" panose="02070309020205020404" pitchFamily="49" charset="0"/>
+              </a:rPr>
+            </a:br>
+            <a:r>
+              <a:rPr lang="en-US" b="1" dirty="0">
+                <a:solidFill>
+                  <a:srgbClr val="008080"/>
+                </a:solidFill>
+                <a:highlight>
+                  <a:srgbClr val="FFFFFF"/>
+                </a:highlight>
+                <a:latin typeface="Courier New"/>
+              </a:rPr>
+              <a:t>select</a:t>
+            </a:r>
+            <a:r>
+              <a:rPr lang="en-US" b="1" dirty="0">
+                <a:solidFill>
+                  <a:srgbClr val="000080"/>
+                </a:solidFill>
+                <a:highlight>
+                  <a:srgbClr val="FFFFFF"/>
+                </a:highlight>
+                <a:latin typeface="Courier New"/>
+              </a:rPr>
+              <a:t> </a:t>
+            </a:r>
+            <a:r>
+              <a:rPr lang="en-US" b="1" dirty="0" err="1">
+                <a:solidFill>
+                  <a:srgbClr val="000080"/>
+                </a:solidFill>
+                <a:highlight>
+                  <a:srgbClr val="FFFFFF"/>
+                </a:highlight>
+                <a:latin typeface="Courier New"/>
+              </a:rPr>
+              <a:t>ora_hash</a:t>
+            </a:r>
+            <a:r>
+              <a:rPr lang="en-US" b="1" dirty="0">
+                <a:solidFill>
+                  <a:srgbClr val="000080"/>
+                </a:solidFill>
+                <a:highlight>
+                  <a:srgbClr val="FFFFFF"/>
+                </a:highlight>
+                <a:latin typeface="Courier New"/>
+              </a:rPr>
+              <a:t>(</a:t>
+            </a:r>
+            <a:r>
+              <a:rPr lang="en-US" b="1" dirty="0">
+                <a:solidFill>
+                  <a:srgbClr val="0000FF"/>
+                </a:solidFill>
+                <a:highlight>
+                  <a:srgbClr val="FFFFFF"/>
+                </a:highlight>
+                <a:latin typeface="Courier New"/>
+              </a:rPr>
+              <a:t>'A'</a:t>
+            </a:r>
+            <a:r>
+              <a:rPr lang="en-US" b="1" dirty="0">
+                <a:solidFill>
+                  <a:srgbClr val="000080"/>
+                </a:solidFill>
+                <a:highlight>
+                  <a:srgbClr val="FFFFFF"/>
+                </a:highlight>
+                <a:latin typeface="Courier New"/>
+              </a:rPr>
+              <a:t>, </a:t>
+            </a:r>
+            <a:r>
+              <a:rPr lang="en-US" b="1" dirty="0">
+                <a:solidFill>
+                  <a:srgbClr val="0000FF"/>
+                </a:solidFill>
+                <a:highlight>
+                  <a:srgbClr val="FFFFFF"/>
+                </a:highlight>
+                <a:latin typeface="Courier New"/>
+              </a:rPr>
+              <a:t>100</a:t>
+            </a:r>
+            <a:r>
+              <a:rPr lang="en-US" b="1" dirty="0">
+                <a:solidFill>
+                  <a:srgbClr val="000080"/>
+                </a:solidFill>
+                <a:highlight>
+                  <a:srgbClr val="FFFFFF"/>
+                </a:highlight>
+                <a:latin typeface="Courier New"/>
+              </a:rPr>
+              <a:t>) </a:t>
+            </a:r>
+            <a:r>
+              <a:rPr lang="en-US" b="1" dirty="0">
+                <a:solidFill>
+                  <a:srgbClr val="008080"/>
+                </a:solidFill>
+                <a:highlight>
+                  <a:srgbClr val="FFFFFF"/>
+                </a:highlight>
+                <a:latin typeface="Courier New"/>
+              </a:rPr>
+              <a:t>from</a:t>
+            </a:r>
+            <a:r>
+              <a:rPr lang="en-US" b="1" dirty="0">
+                <a:solidFill>
+                  <a:srgbClr val="000080"/>
+                </a:solidFill>
+                <a:highlight>
+                  <a:srgbClr val="FFFFFF"/>
+                </a:highlight>
+                <a:latin typeface="Courier New"/>
+              </a:rPr>
+              <a:t> dual</a:t>
+            </a:r>
+            <a:r>
+              <a:rPr lang="en-US" b="1" dirty="0" smtClean="0">
+                <a:solidFill>
+                  <a:srgbClr val="000080"/>
+                </a:solidFill>
+                <a:highlight>
+                  <a:srgbClr val="FFFFFF"/>
+                </a:highlight>
+                <a:latin typeface="Courier New"/>
+              </a:rPr>
+              <a:t>;</a:t>
+            </a:r>
+            <a:endParaRPr lang="en-US" b="1" dirty="0">
+              <a:latin typeface="Courier New" panose="02070309020205020404" pitchFamily="49" charset="0"/>
+              <a:cs typeface="Courier New" panose="02070309020205020404" pitchFamily="49" charset="0"/>
+            </a:endParaRPr>
+          </a:p>
+          <a:p>
+            <a:pPr marL="0" indent="0">
+              <a:buNone/>
+            </a:pPr>
+            <a:r>
+              <a:rPr lang="en-US" b="1" dirty="0" smtClean="0">
+                <a:latin typeface="Courier New" panose="02070309020205020404" pitchFamily="49" charset="0"/>
+                <a:cs typeface="Courier New" panose="02070309020205020404" pitchFamily="49" charset="0"/>
+              </a:rPr>
+              <a:t/>
+            </a:r>
+            <a:br>
+              <a:rPr lang="en-US" b="1" dirty="0" smtClean="0">
+                <a:latin typeface="Courier New" panose="02070309020205020404" pitchFamily="49" charset="0"/>
+                <a:cs typeface="Courier New" panose="02070309020205020404" pitchFamily="49" charset="0"/>
+              </a:rPr>
+            </a:br>
+            <a:r>
+              <a:rPr lang="en-US" b="1" dirty="0" smtClean="0">
+                <a:latin typeface="Courier New" panose="02070309020205020404" pitchFamily="49" charset="0"/>
+                <a:cs typeface="Courier New" panose="02070309020205020404" pitchFamily="49" charset="0"/>
+              </a:rPr>
+              <a:t>80</a:t>
+            </a:r>
+            <a:endParaRPr lang="en-US" b="1" dirty="0">
+              <a:latin typeface="Courier New" panose="02070309020205020404" pitchFamily="49" charset="0"/>
+              <a:cs typeface="Courier New" panose="02070309020205020404" pitchFamily="49" charset="0"/>
+            </a:endParaRPr>
+          </a:p>
+          <a:p>
+            <a:pPr marL="0" indent="0">
+              <a:buNone/>
+            </a:pPr>
+            <a:r>
+              <a:rPr lang="en-US" b="1" dirty="0" smtClean="0">
+                <a:latin typeface="Courier New" panose="02070309020205020404" pitchFamily="49" charset="0"/>
+                <a:cs typeface="Courier New" panose="02070309020205020404" pitchFamily="49" charset="0"/>
+              </a:rPr>
+              <a:t/>
+            </a:r>
+            <a:br>
+              <a:rPr lang="en-US" b="1" dirty="0" smtClean="0">
+                <a:latin typeface="Courier New" panose="02070309020205020404" pitchFamily="49" charset="0"/>
+                <a:cs typeface="Courier New" panose="02070309020205020404" pitchFamily="49" charset="0"/>
+              </a:rPr>
+            </a:br>
+            <a:r>
+              <a:rPr lang="en-US" b="1" dirty="0">
+                <a:solidFill>
+                  <a:srgbClr val="008080"/>
+                </a:solidFill>
+                <a:highlight>
+                  <a:srgbClr val="FFFFFF"/>
+                </a:highlight>
+                <a:latin typeface="Courier New"/>
+              </a:rPr>
+              <a:t>select</a:t>
+            </a:r>
+            <a:r>
+              <a:rPr lang="en-US" b="1" dirty="0">
+                <a:solidFill>
+                  <a:srgbClr val="000080"/>
+                </a:solidFill>
+                <a:highlight>
+                  <a:srgbClr val="FFFFFF"/>
+                </a:highlight>
+                <a:latin typeface="Courier New"/>
+              </a:rPr>
+              <a:t> </a:t>
+            </a:r>
+            <a:r>
+              <a:rPr lang="en-US" b="1" dirty="0" err="1">
+                <a:solidFill>
+                  <a:srgbClr val="000080"/>
+                </a:solidFill>
+                <a:highlight>
+                  <a:srgbClr val="FFFFFF"/>
+                </a:highlight>
+                <a:latin typeface="Courier New"/>
+              </a:rPr>
+              <a:t>standard_hash</a:t>
+            </a:r>
+            <a:r>
+              <a:rPr lang="en-US" b="1" dirty="0">
+                <a:solidFill>
+                  <a:srgbClr val="000080"/>
+                </a:solidFill>
+                <a:highlight>
+                  <a:srgbClr val="FFFFFF"/>
+                </a:highlight>
+                <a:latin typeface="Courier New"/>
+              </a:rPr>
+              <a:t>(</a:t>
+            </a:r>
+            <a:r>
+              <a:rPr lang="en-US" b="1" dirty="0">
+                <a:solidFill>
+                  <a:srgbClr val="0000FF"/>
+                </a:solidFill>
+                <a:highlight>
+                  <a:srgbClr val="FFFFFF"/>
+                </a:highlight>
+                <a:latin typeface="Courier New"/>
+              </a:rPr>
+              <a:t>'A'</a:t>
+            </a:r>
+            <a:r>
+              <a:rPr lang="en-US" b="1" dirty="0">
+                <a:solidFill>
+                  <a:srgbClr val="000080"/>
+                </a:solidFill>
+                <a:highlight>
+                  <a:srgbClr val="FFFFFF"/>
+                </a:highlight>
+                <a:latin typeface="Courier New"/>
+              </a:rPr>
+              <a:t>, </a:t>
+            </a:r>
+            <a:r>
+              <a:rPr lang="en-US" b="1" dirty="0">
+                <a:solidFill>
+                  <a:srgbClr val="0000FF"/>
+                </a:solidFill>
+                <a:highlight>
+                  <a:srgbClr val="FFFFFF"/>
+                </a:highlight>
+                <a:latin typeface="Courier New"/>
+              </a:rPr>
+              <a:t>'SHA256'</a:t>
+            </a:r>
+            <a:r>
+              <a:rPr lang="en-US" b="1" dirty="0">
+                <a:solidFill>
+                  <a:srgbClr val="000080"/>
+                </a:solidFill>
+                <a:highlight>
+                  <a:srgbClr val="FFFFFF"/>
+                </a:highlight>
+                <a:latin typeface="Courier New"/>
+              </a:rPr>
+              <a:t>) </a:t>
+            </a:r>
+            <a:r>
+              <a:rPr lang="en-US" b="1" dirty="0">
+                <a:solidFill>
+                  <a:srgbClr val="008080"/>
+                </a:solidFill>
+                <a:highlight>
+                  <a:srgbClr val="FFFFFF"/>
+                </a:highlight>
+                <a:latin typeface="Courier New"/>
+              </a:rPr>
+              <a:t>from</a:t>
+            </a:r>
+            <a:r>
+              <a:rPr lang="en-US" b="1" dirty="0">
+                <a:solidFill>
+                  <a:srgbClr val="000080"/>
+                </a:solidFill>
+                <a:highlight>
+                  <a:srgbClr val="FFFFFF"/>
+                </a:highlight>
+                <a:latin typeface="Courier New"/>
+              </a:rPr>
+              <a:t> dual;</a:t>
+            </a:r>
+            <a:endParaRPr lang="en-US" b="1" dirty="0">
+              <a:latin typeface="Courier New" panose="02070309020205020404" pitchFamily="49" charset="0"/>
+              <a:cs typeface="Courier New" panose="02070309020205020404" pitchFamily="49" charset="0"/>
+            </a:endParaRPr>
+          </a:p>
+          <a:p>
+            <a:pPr marL="0" indent="0">
+              <a:buNone/>
+            </a:pPr>
+            <a:r>
+              <a:rPr lang="en-US" b="1" dirty="0" smtClean="0">
+                <a:latin typeface="Courier New" panose="02070309020205020404" pitchFamily="49" charset="0"/>
+                <a:cs typeface="Courier New" panose="02070309020205020404" pitchFamily="49" charset="0"/>
+              </a:rPr>
+              <a:t/>
+            </a:r>
+            <a:br>
+              <a:rPr lang="en-US" b="1" dirty="0" smtClean="0">
+                <a:latin typeface="Courier New" panose="02070309020205020404" pitchFamily="49" charset="0"/>
+                <a:cs typeface="Courier New" panose="02070309020205020404" pitchFamily="49" charset="0"/>
+              </a:rPr>
+            </a:br>
+            <a:r>
+              <a:rPr lang="en-US" b="1" dirty="0" smtClean="0">
+                <a:latin typeface="Courier New" panose="02070309020205020404" pitchFamily="49" charset="0"/>
+                <a:cs typeface="Courier New" panose="02070309020205020404" pitchFamily="49" charset="0"/>
+              </a:rPr>
+              <a:t>559AEAD08264D5795D3909718CDD05ABD49572E84FE55590EEF31A88A08FDFFD</a:t>
+            </a:r>
+            <a:endParaRPr lang="en-US" dirty="0"/>
+          </a:p>
+        </p:txBody>
+      </p:sp>
     </p:spTree>
     <p:extLst>
       <p:ext uri="{BB962C8B-B14F-4D97-AF65-F5344CB8AC3E}">
-        <p14:creationId xmlns:p14="http://schemas.microsoft.com/office/powerpoint/2010/main" val="1530866919"/>
+        <p14:creationId xmlns:p14="http://schemas.microsoft.com/office/powerpoint/2010/main" val="4222143554"/>
       </p:ext>
     </p:extLst>
   </p:cSld>
@@ -11992,11 +12809,7 @@
           <a:bodyPr/>
           <a:lstStyle/>
           <a:p>
-            <a:r>
-              <a:rPr lang="en-US" dirty="0" smtClean="0"/>
-              <a:t>1 - Hash Partitioning</a:t>
-            </a:r>
-            <a:endParaRPr lang="en-US" dirty="0"/>
+            <a:endParaRPr lang="en-US"/>
           </a:p>
         </p:txBody>
       </p:sp>
@@ -12012,47 +12825,17 @@
         </p:nvSpPr>
         <p:spPr/>
         <p:txBody>
-          <a:bodyPr>
-            <a:normAutofit/>
-          </a:bodyPr>
-          <a:lstStyle/>
-          <a:p>
-            <a:r>
-              <a:rPr lang="en-US" dirty="0" smtClean="0"/>
-              <a:t>ORA_HASH</a:t>
-            </a:r>
-          </a:p>
-          <a:p>
-            <a:r>
-              <a:rPr lang="en-US" dirty="0" smtClean="0"/>
-              <a:t>Good for retrieving large percentage of rows</a:t>
-            </a:r>
-          </a:p>
-          <a:p>
-            <a:r>
-              <a:rPr lang="en-US" dirty="0" smtClean="0"/>
-              <a:t>Minimal but not perfect</a:t>
-            </a:r>
-          </a:p>
-          <a:p>
-            <a:r>
-              <a:rPr lang="en-US" dirty="0" smtClean="0"/>
-              <a:t>Insert O(1), read is O(N/#_PARTITIONS)</a:t>
-            </a:r>
-          </a:p>
-          <a:p>
-            <a:r>
-              <a:rPr lang="en-US" dirty="0" smtClean="0"/>
-              <a:t>Don't use huge number of partitions</a:t>
-            </a:r>
-            <a:endParaRPr lang="en-US" dirty="0"/>
+          <a:bodyPr/>
+          <a:lstStyle/>
+          <a:p>
+            <a:endParaRPr lang="en-US"/>
           </a:p>
         </p:txBody>
       </p:sp>
     </p:spTree>
     <p:extLst>
       <p:ext uri="{BB962C8B-B14F-4D97-AF65-F5344CB8AC3E}">
-        <p14:creationId xmlns:p14="http://schemas.microsoft.com/office/powerpoint/2010/main" val="3843327604"/>
+        <p14:creationId xmlns:p14="http://schemas.microsoft.com/office/powerpoint/2010/main" val="302317314"/>
       </p:ext>
     </p:extLst>
   </p:cSld>
@@ -12101,11 +12884,7 @@
           <a:bodyPr/>
           <a:lstStyle/>
           <a:p>
-            <a:r>
-              <a:rPr lang="en-US" dirty="0" smtClean="0"/>
-              <a:t>1 - Hash Clusters</a:t>
-            </a:r>
-            <a:endParaRPr lang="en-US" dirty="0"/>
+            <a:endParaRPr lang="en-US"/>
           </a:p>
         </p:txBody>
       </p:sp>
@@ -12121,53 +12900,17 @@
         </p:nvSpPr>
         <p:spPr/>
         <p:txBody>
-          <a:bodyPr>
-            <a:normAutofit lnSpcReduction="10000"/>
-          </a:bodyPr>
-          <a:lstStyle/>
-          <a:p>
-            <a:r>
-              <a:rPr lang="en-US" dirty="0" smtClean="0"/>
-              <a:t>Unknown hash function</a:t>
-            </a:r>
-          </a:p>
-          <a:p>
-            <a:r>
-              <a:rPr lang="en-US" dirty="0" smtClean="0"/>
-              <a:t>Good for retrieving small percentage of rows</a:t>
-            </a:r>
-          </a:p>
-          <a:p>
-            <a:r>
-              <a:rPr lang="en-US" dirty="0" smtClean="0"/>
-              <a:t>Not minimal, may be perfect</a:t>
-            </a:r>
-          </a:p>
-          <a:p>
-            <a:r>
-              <a:rPr lang="en-US" dirty="0" smtClean="0"/>
-              <a:t>O(1) reads, theoretically better than indexes</a:t>
-            </a:r>
-          </a:p>
-          <a:p>
-            <a:r>
-              <a:rPr lang="en-US" dirty="0" smtClean="0"/>
-              <a:t>In practice it's slower (constants win)</a:t>
-            </a:r>
-          </a:p>
-          <a:p>
-            <a:r>
-              <a:rPr lang="en-US" dirty="0" smtClean="0"/>
-              <a:t>Creating perfect hash increases table size 3x</a:t>
-            </a:r>
-            <a:endParaRPr lang="en-US" dirty="0"/>
+          <a:bodyPr/>
+          <a:lstStyle/>
+          <a:p>
+            <a:endParaRPr lang="en-US"/>
           </a:p>
         </p:txBody>
       </p:sp>
     </p:spTree>
     <p:extLst>
       <p:ext uri="{BB962C8B-B14F-4D97-AF65-F5344CB8AC3E}">
-        <p14:creationId xmlns:p14="http://schemas.microsoft.com/office/powerpoint/2010/main" val="2403054375"/>
+        <p14:creationId xmlns:p14="http://schemas.microsoft.com/office/powerpoint/2010/main" val="1672596786"/>
       </p:ext>
     </p:extLst>
   </p:cSld>
@@ -12216,6 +12959,599 @@
           <a:bodyPr/>
           <a:lstStyle/>
           <a:p>
+            <a:endParaRPr lang="en-US"/>
+          </a:p>
+        </p:txBody>
+      </p:sp>
+      <p:sp>
+        <p:nvSpPr>
+          <p:cNvPr id="3" name="Content Placeholder 2"/>
+          <p:cNvSpPr>
+            <a:spLocks noGrp="1"/>
+          </p:cNvSpPr>
+          <p:nvPr>
+            <p:ph idx="1"/>
+          </p:nvPr>
+        </p:nvSpPr>
+        <p:spPr/>
+        <p:txBody>
+          <a:bodyPr/>
+          <a:lstStyle/>
+          <a:p>
+            <a:endParaRPr lang="en-US"/>
+          </a:p>
+        </p:txBody>
+      </p:sp>
+    </p:spTree>
+    <p:extLst>
+      <p:ext uri="{BB962C8B-B14F-4D97-AF65-F5344CB8AC3E}">
+        <p14:creationId xmlns:p14="http://schemas.microsoft.com/office/powerpoint/2010/main" val="3145582334"/>
+      </p:ext>
+    </p:extLst>
+  </p:cSld>
+  <p:clrMapOvr>
+    <a:masterClrMapping/>
+  </p:clrMapOvr>
+  <p:timing>
+    <p:tnLst>
+      <p:par>
+        <p:cTn id="1" dur="indefinite" restart="never" nodeType="tmRoot"/>
+      </p:par>
+    </p:tnLst>
+  </p:timing>
+</p:sld>
+</file>
+
+<file path=ppt/slides/slide23.xml><?xml version="1.0" encoding="utf-8"?>
+<p:sld xmlns:a="http://schemas.openxmlformats.org/drawingml/2006/main" xmlns:r="http://schemas.openxmlformats.org/officeDocument/2006/relationships" xmlns:p="http://schemas.openxmlformats.org/presentationml/2006/main">
+  <p:cSld>
+    <p:spTree>
+      <p:nvGrpSpPr>
+        <p:cNvPr id="1" name=""/>
+        <p:cNvGrpSpPr/>
+        <p:nvPr/>
+      </p:nvGrpSpPr>
+      <p:grpSpPr>
+        <a:xfrm>
+          <a:off x="0" y="0"/>
+          <a:ext cx="0" cy="0"/>
+          <a:chOff x="0" y="0"/>
+          <a:chExt cx="0" cy="0"/>
+        </a:xfrm>
+      </p:grpSpPr>
+      <p:sp>
+        <p:nvSpPr>
+          <p:cNvPr id="2" name="Title 1"/>
+          <p:cNvSpPr>
+            <a:spLocks noGrp="1"/>
+          </p:cNvSpPr>
+          <p:nvPr>
+            <p:ph type="title"/>
+          </p:nvPr>
+        </p:nvSpPr>
+        <p:spPr/>
+        <p:txBody>
+          <a:bodyPr/>
+          <a:lstStyle/>
+          <a:p>
+            <a:endParaRPr lang="en-US"/>
+          </a:p>
+        </p:txBody>
+      </p:sp>
+      <p:sp>
+        <p:nvSpPr>
+          <p:cNvPr id="3" name="Content Placeholder 2"/>
+          <p:cNvSpPr>
+            <a:spLocks noGrp="1"/>
+          </p:cNvSpPr>
+          <p:nvPr>
+            <p:ph idx="1"/>
+          </p:nvPr>
+        </p:nvSpPr>
+        <p:spPr/>
+        <p:txBody>
+          <a:bodyPr/>
+          <a:lstStyle/>
+          <a:p>
+            <a:endParaRPr lang="en-US"/>
+          </a:p>
+        </p:txBody>
+      </p:sp>
+    </p:spTree>
+    <p:extLst>
+      <p:ext uri="{BB962C8B-B14F-4D97-AF65-F5344CB8AC3E}">
+        <p14:creationId xmlns:p14="http://schemas.microsoft.com/office/powerpoint/2010/main" val="1892431892"/>
+      </p:ext>
+    </p:extLst>
+  </p:cSld>
+  <p:clrMapOvr>
+    <a:masterClrMapping/>
+  </p:clrMapOvr>
+  <p:timing>
+    <p:tnLst>
+      <p:par>
+        <p:cTn id="1" dur="indefinite" restart="never" nodeType="tmRoot"/>
+      </p:par>
+    </p:tnLst>
+  </p:timing>
+</p:sld>
+</file>
+
+<file path=ppt/slides/slide24.xml><?xml version="1.0" encoding="utf-8"?>
+<p:sld xmlns:a="http://schemas.openxmlformats.org/drawingml/2006/main" xmlns:r="http://schemas.openxmlformats.org/officeDocument/2006/relationships" xmlns:p="http://schemas.openxmlformats.org/presentationml/2006/main">
+  <p:cSld>
+    <p:spTree>
+      <p:nvGrpSpPr>
+        <p:cNvPr id="1" name=""/>
+        <p:cNvGrpSpPr/>
+        <p:nvPr/>
+      </p:nvGrpSpPr>
+      <p:grpSpPr>
+        <a:xfrm>
+          <a:off x="0" y="0"/>
+          <a:ext cx="0" cy="0"/>
+          <a:chOff x="0" y="0"/>
+          <a:chExt cx="0" cy="0"/>
+        </a:xfrm>
+      </p:grpSpPr>
+      <p:sp>
+        <p:nvSpPr>
+          <p:cNvPr id="2" name="Title 1"/>
+          <p:cNvSpPr>
+            <a:spLocks noGrp="1"/>
+          </p:cNvSpPr>
+          <p:nvPr>
+            <p:ph type="title"/>
+          </p:nvPr>
+        </p:nvSpPr>
+        <p:spPr/>
+        <p:txBody>
+          <a:bodyPr/>
+          <a:lstStyle/>
+          <a:p>
+            <a:r>
+              <a:rPr lang="en-US" dirty="0" smtClean="0"/>
+              <a:t>1 - Hashing Types and Tradeoffs</a:t>
+            </a:r>
+            <a:endParaRPr lang="en-US" dirty="0"/>
+          </a:p>
+        </p:txBody>
+      </p:sp>
+      <p:pic>
+        <p:nvPicPr>
+          <p:cNvPr id="4" name="Content Placeholder 3"/>
+          <p:cNvPicPr>
+            <a:picLocks noGrp="1" noChangeAspect="1"/>
+          </p:cNvPicPr>
+          <p:nvPr>
+            <p:ph idx="1"/>
+          </p:nvPr>
+        </p:nvPicPr>
+        <p:blipFill>
+          <a:blip r:embed="rId3">
+            <a:extLst>
+              <a:ext uri="{28A0092B-C50C-407E-A947-70E740481C1C}">
+                <a14:useLocalDpi xmlns:a14="http://schemas.microsoft.com/office/drawing/2010/main" val="0"/>
+              </a:ext>
+            </a:extLst>
+          </a:blip>
+          <a:stretch>
+            <a:fillRect/>
+          </a:stretch>
+        </p:blipFill>
+        <p:spPr>
+          <a:xfrm>
+            <a:off x="457200" y="1209588"/>
+            <a:ext cx="8229600" cy="3375198"/>
+          </a:xfrm>
+        </p:spPr>
+      </p:pic>
+    </p:spTree>
+    <p:extLst>
+      <p:ext uri="{BB962C8B-B14F-4D97-AF65-F5344CB8AC3E}">
+        <p14:creationId xmlns:p14="http://schemas.microsoft.com/office/powerpoint/2010/main" val="1530866919"/>
+      </p:ext>
+    </p:extLst>
+  </p:cSld>
+  <p:clrMapOvr>
+    <a:masterClrMapping/>
+  </p:clrMapOvr>
+  <p:timing>
+    <p:tnLst>
+      <p:par>
+        <p:cTn id="1" dur="indefinite" restart="never" nodeType="tmRoot"/>
+      </p:par>
+    </p:tnLst>
+  </p:timing>
+</p:sld>
+</file>
+
+<file path=ppt/slides/slide25.xml><?xml version="1.0" encoding="utf-8"?>
+<p:sld xmlns:a="http://schemas.openxmlformats.org/drawingml/2006/main" xmlns:r="http://schemas.openxmlformats.org/officeDocument/2006/relationships" xmlns:p="http://schemas.openxmlformats.org/presentationml/2006/main">
+  <p:cSld>
+    <p:spTree>
+      <p:nvGrpSpPr>
+        <p:cNvPr id="1" name=""/>
+        <p:cNvGrpSpPr/>
+        <p:nvPr/>
+      </p:nvGrpSpPr>
+      <p:grpSpPr>
+        <a:xfrm>
+          <a:off x="0" y="0"/>
+          <a:ext cx="0" cy="0"/>
+          <a:chOff x="0" y="0"/>
+          <a:chExt cx="0" cy="0"/>
+        </a:xfrm>
+      </p:grpSpPr>
+      <p:sp>
+        <p:nvSpPr>
+          <p:cNvPr id="2" name="Title 1"/>
+          <p:cNvSpPr>
+            <a:spLocks noGrp="1"/>
+          </p:cNvSpPr>
+          <p:nvPr>
+            <p:ph type="title"/>
+          </p:nvPr>
+        </p:nvSpPr>
+        <p:spPr/>
+        <p:txBody>
+          <a:bodyPr/>
+          <a:lstStyle/>
+          <a:p>
+            <a:endParaRPr lang="en-US"/>
+          </a:p>
+        </p:txBody>
+      </p:sp>
+      <p:sp>
+        <p:nvSpPr>
+          <p:cNvPr id="3" name="Content Placeholder 2"/>
+          <p:cNvSpPr>
+            <a:spLocks noGrp="1"/>
+          </p:cNvSpPr>
+          <p:nvPr>
+            <p:ph idx="1"/>
+          </p:nvPr>
+        </p:nvSpPr>
+        <p:spPr/>
+        <p:txBody>
+          <a:bodyPr/>
+          <a:lstStyle/>
+          <a:p>
+            <a:r>
+              <a:rPr lang="en-US" dirty="0" smtClean="0"/>
+              <a:t>Minimal perfect</a:t>
+            </a:r>
+          </a:p>
+          <a:p>
+            <a:r>
+              <a:rPr lang="en-US" dirty="0" smtClean="0"/>
+              <a:t>Minimal vs perfect - trade-offs</a:t>
+            </a:r>
+          </a:p>
+          <a:p>
+            <a:r>
+              <a:rPr lang="en-US" dirty="0" smtClean="0"/>
+              <a:t>typical</a:t>
+            </a:r>
+            <a:endParaRPr lang="en-US" dirty="0"/>
+          </a:p>
+        </p:txBody>
+      </p:sp>
+    </p:spTree>
+    <p:extLst>
+      <p:ext uri="{BB962C8B-B14F-4D97-AF65-F5344CB8AC3E}">
+        <p14:creationId xmlns:p14="http://schemas.microsoft.com/office/powerpoint/2010/main" val="1829847580"/>
+      </p:ext>
+    </p:extLst>
+  </p:cSld>
+  <p:clrMapOvr>
+    <a:masterClrMapping/>
+  </p:clrMapOvr>
+  <p:timing>
+    <p:tnLst>
+      <p:par>
+        <p:cTn id="1" dur="indefinite" restart="never" nodeType="tmRoot"/>
+      </p:par>
+    </p:tnLst>
+  </p:timing>
+</p:sld>
+</file>
+
+<file path=ppt/slides/slide26.xml><?xml version="1.0" encoding="utf-8"?>
+<p:sld xmlns:a="http://schemas.openxmlformats.org/drawingml/2006/main" xmlns:r="http://schemas.openxmlformats.org/officeDocument/2006/relationships" xmlns:p="http://schemas.openxmlformats.org/presentationml/2006/main">
+  <p:cSld>
+    <p:spTree>
+      <p:nvGrpSpPr>
+        <p:cNvPr id="1" name=""/>
+        <p:cNvGrpSpPr/>
+        <p:nvPr/>
+      </p:nvGrpSpPr>
+      <p:grpSpPr>
+        <a:xfrm>
+          <a:off x="0" y="0"/>
+          <a:ext cx="0" cy="0"/>
+          <a:chOff x="0" y="0"/>
+          <a:chExt cx="0" cy="0"/>
+        </a:xfrm>
+      </p:grpSpPr>
+      <p:sp>
+        <p:nvSpPr>
+          <p:cNvPr id="2" name="Title 1"/>
+          <p:cNvSpPr>
+            <a:spLocks noGrp="1"/>
+          </p:cNvSpPr>
+          <p:nvPr>
+            <p:ph type="title"/>
+          </p:nvPr>
+        </p:nvSpPr>
+        <p:spPr/>
+        <p:txBody>
+          <a:bodyPr/>
+          <a:lstStyle/>
+          <a:p>
+            <a:r>
+              <a:rPr lang="en-US" dirty="0" smtClean="0"/>
+              <a:t>1 - Hash Partitioning</a:t>
+            </a:r>
+            <a:endParaRPr lang="en-US" dirty="0"/>
+          </a:p>
+        </p:txBody>
+      </p:sp>
+      <p:sp>
+        <p:nvSpPr>
+          <p:cNvPr id="3" name="Content Placeholder 2"/>
+          <p:cNvSpPr>
+            <a:spLocks noGrp="1"/>
+          </p:cNvSpPr>
+          <p:nvPr>
+            <p:ph idx="1"/>
+          </p:nvPr>
+        </p:nvSpPr>
+        <p:spPr/>
+        <p:txBody>
+          <a:bodyPr>
+            <a:normAutofit lnSpcReduction="10000"/>
+          </a:bodyPr>
+          <a:lstStyle/>
+          <a:p>
+            <a:r>
+              <a:rPr lang="en-US" dirty="0" smtClean="0"/>
+              <a:t>Minimal: Probably, Perfect: No</a:t>
+            </a:r>
+          </a:p>
+          <a:p>
+            <a:r>
+              <a:rPr lang="en-US" dirty="0" smtClean="0"/>
+              <a:t>Trades time for space</a:t>
+            </a:r>
+            <a:endParaRPr lang="en-US" dirty="0" smtClean="0"/>
+          </a:p>
+          <a:p>
+            <a:r>
+              <a:rPr lang="en-US" dirty="0" smtClean="0"/>
+              <a:t>ORA_HASH</a:t>
+            </a:r>
+            <a:endParaRPr lang="en-US" dirty="0" smtClean="0"/>
+          </a:p>
+          <a:p>
+            <a:r>
+              <a:rPr lang="en-US" dirty="0" smtClean="0"/>
+              <a:t>Good for retrieving large percentage of rows</a:t>
+            </a:r>
+          </a:p>
+          <a:p>
+            <a:r>
+              <a:rPr lang="en-US" dirty="0" smtClean="0"/>
+              <a:t>Insert </a:t>
+            </a:r>
+            <a:r>
+              <a:rPr lang="en-US" dirty="0" smtClean="0"/>
+              <a:t>O(1), read is O(N/#_PARTITIONS)</a:t>
+            </a:r>
+          </a:p>
+          <a:p>
+            <a:r>
+              <a:rPr lang="en-US" dirty="0" smtClean="0"/>
+              <a:t>Don't use huge number of partitions</a:t>
+            </a:r>
+            <a:endParaRPr lang="en-US" dirty="0"/>
+          </a:p>
+        </p:txBody>
+      </p:sp>
+    </p:spTree>
+    <p:extLst>
+      <p:ext uri="{BB962C8B-B14F-4D97-AF65-F5344CB8AC3E}">
+        <p14:creationId xmlns:p14="http://schemas.microsoft.com/office/powerpoint/2010/main" val="3843327604"/>
+      </p:ext>
+    </p:extLst>
+  </p:cSld>
+  <p:clrMapOvr>
+    <a:masterClrMapping/>
+  </p:clrMapOvr>
+  <p:timing>
+    <p:tnLst>
+      <p:par>
+        <p:cTn id="1" dur="indefinite" restart="never" nodeType="tmRoot"/>
+      </p:par>
+    </p:tnLst>
+  </p:timing>
+</p:sld>
+</file>
+
+<file path=ppt/slides/slide27.xml><?xml version="1.0" encoding="utf-8"?>
+<p:sld xmlns:a="http://schemas.openxmlformats.org/drawingml/2006/main" xmlns:r="http://schemas.openxmlformats.org/officeDocument/2006/relationships" xmlns:p="http://schemas.openxmlformats.org/presentationml/2006/main">
+  <p:cSld>
+    <p:spTree>
+      <p:nvGrpSpPr>
+        <p:cNvPr id="1" name=""/>
+        <p:cNvGrpSpPr/>
+        <p:nvPr/>
+      </p:nvGrpSpPr>
+      <p:grpSpPr>
+        <a:xfrm>
+          <a:off x="0" y="0"/>
+          <a:ext cx="0" cy="0"/>
+          <a:chOff x="0" y="0"/>
+          <a:chExt cx="0" cy="0"/>
+        </a:xfrm>
+      </p:grpSpPr>
+      <p:sp>
+        <p:nvSpPr>
+          <p:cNvPr id="2" name="Title 1"/>
+          <p:cNvSpPr>
+            <a:spLocks noGrp="1"/>
+          </p:cNvSpPr>
+          <p:nvPr>
+            <p:ph type="title"/>
+          </p:nvPr>
+        </p:nvSpPr>
+        <p:spPr/>
+        <p:txBody>
+          <a:bodyPr/>
+          <a:lstStyle/>
+          <a:p>
+            <a:r>
+              <a:rPr lang="en-US" dirty="0" smtClean="0"/>
+              <a:t>1 - Hash Clusters</a:t>
+            </a:r>
+            <a:endParaRPr lang="en-US" dirty="0"/>
+          </a:p>
+        </p:txBody>
+      </p:sp>
+      <p:sp>
+        <p:nvSpPr>
+          <p:cNvPr id="3" name="Content Placeholder 2"/>
+          <p:cNvSpPr>
+            <a:spLocks noGrp="1"/>
+          </p:cNvSpPr>
+          <p:nvPr>
+            <p:ph idx="1"/>
+          </p:nvPr>
+        </p:nvSpPr>
+        <p:spPr/>
+        <p:txBody>
+          <a:bodyPr>
+            <a:normAutofit fontScale="92500" lnSpcReduction="20000"/>
+          </a:bodyPr>
+          <a:lstStyle/>
+          <a:p>
+            <a:r>
+              <a:rPr lang="en-US" dirty="0"/>
+              <a:t>Minimal: </a:t>
+            </a:r>
+            <a:r>
+              <a:rPr lang="en-US" dirty="0" smtClean="0"/>
+              <a:t>No, </a:t>
+            </a:r>
+            <a:r>
+              <a:rPr lang="en-US" dirty="0"/>
+              <a:t>Perfect: </a:t>
+            </a:r>
+            <a:r>
+              <a:rPr lang="en-US" dirty="0" smtClean="0"/>
+              <a:t>Maybe</a:t>
+            </a:r>
+          </a:p>
+          <a:p>
+            <a:r>
+              <a:rPr lang="en-US" dirty="0" smtClean="0"/>
+              <a:t>Trades space for time</a:t>
+            </a:r>
+            <a:endParaRPr lang="en-US" dirty="0"/>
+          </a:p>
+          <a:p>
+            <a:r>
+              <a:rPr lang="en-US" dirty="0" smtClean="0"/>
+              <a:t>Unknown </a:t>
+            </a:r>
+            <a:r>
+              <a:rPr lang="en-US" dirty="0" smtClean="0"/>
+              <a:t>hash function</a:t>
+            </a:r>
+          </a:p>
+          <a:p>
+            <a:r>
+              <a:rPr lang="en-US" dirty="0" smtClean="0"/>
+              <a:t>Good for retrieving small percentage of rows</a:t>
+            </a:r>
+          </a:p>
+          <a:p>
+            <a:r>
+              <a:rPr lang="en-US" dirty="0" smtClean="0"/>
+              <a:t>O(1</a:t>
+            </a:r>
+            <a:r>
+              <a:rPr lang="en-US" dirty="0" smtClean="0"/>
+              <a:t>) reads, theoretically better than indexes</a:t>
+            </a:r>
+          </a:p>
+          <a:p>
+            <a:r>
+              <a:rPr lang="en-US" dirty="0" smtClean="0"/>
+              <a:t>In practice it's slower (constants win)</a:t>
+            </a:r>
+          </a:p>
+          <a:p>
+            <a:r>
+              <a:rPr lang="en-US" dirty="0" smtClean="0"/>
+              <a:t>Creating perfect hash increases table size 3x</a:t>
+            </a:r>
+            <a:endParaRPr lang="en-US" dirty="0"/>
+          </a:p>
+        </p:txBody>
+      </p:sp>
+    </p:spTree>
+    <p:extLst>
+      <p:ext uri="{BB962C8B-B14F-4D97-AF65-F5344CB8AC3E}">
+        <p14:creationId xmlns:p14="http://schemas.microsoft.com/office/powerpoint/2010/main" val="2403054375"/>
+      </p:ext>
+    </p:extLst>
+  </p:cSld>
+  <p:clrMapOvr>
+    <a:masterClrMapping/>
+  </p:clrMapOvr>
+  <p:timing>
+    <p:tnLst>
+      <p:par>
+        <p:cTn id="1" dur="indefinite" restart="never" nodeType="tmRoot"/>
+      </p:par>
+    </p:tnLst>
+  </p:timing>
+</p:sld>
+</file>
+
+<file path=ppt/slides/slide28.xml><?xml version="1.0" encoding="utf-8"?>
+<p:sld xmlns:a="http://schemas.openxmlformats.org/drawingml/2006/main" xmlns:r="http://schemas.openxmlformats.org/officeDocument/2006/relationships" xmlns:p="http://schemas.openxmlformats.org/presentationml/2006/main">
+  <p:cSld>
+    <p:spTree>
+      <p:nvGrpSpPr>
+        <p:cNvPr id="1" name=""/>
+        <p:cNvGrpSpPr/>
+        <p:nvPr/>
+      </p:nvGrpSpPr>
+      <p:grpSpPr>
+        <a:xfrm>
+          <a:off x="0" y="0"/>
+          <a:ext cx="0" cy="0"/>
+          <a:chOff x="0" y="0"/>
+          <a:chExt cx="0" cy="0"/>
+        </a:xfrm>
+      </p:grpSpPr>
+      <p:sp>
+        <p:nvSpPr>
+          <p:cNvPr id="2" name="Title 1"/>
+          <p:cNvSpPr>
+            <a:spLocks noGrp="1"/>
+          </p:cNvSpPr>
+          <p:nvPr>
+            <p:ph type="title"/>
+          </p:nvPr>
+        </p:nvSpPr>
+        <p:spPr/>
+        <p:txBody>
+          <a:bodyPr/>
+          <a:lstStyle/>
+          <a:p>
             <a:r>
               <a:rPr lang="en-US" dirty="0" smtClean="0"/>
               <a:t>1 - Hash Joins</a:t>
@@ -12240,8 +13576,22 @@
           <a:lstStyle/>
           <a:p>
             <a:r>
-              <a:rPr lang="en-US" dirty="0" smtClean="0"/>
-              <a:t>Somewhere between O(1) and O(N)</a:t>
+              <a:rPr lang="en-US" dirty="0"/>
+              <a:t>Minimal: No, Perfect: </a:t>
+            </a:r>
+            <a:r>
+              <a:rPr lang="en-US" dirty="0" smtClean="0"/>
+              <a:t>No</a:t>
+            </a:r>
+          </a:p>
+          <a:p>
+            <a:r>
+              <a:rPr lang="en-US" dirty="0" smtClean="0"/>
+              <a:t>Somewhere </a:t>
+            </a:r>
+            <a:r>
+              <a:rPr lang="en-US" dirty="0" smtClean="0"/>
+              <a:t>between O(1) and O(N)</a:t>
             </a:r>
           </a:p>
           <a:p>
@@ -12273,7 +13623,7 @@
 </p:sld>
 </file>
 
-<file path=ppt/slides/slide23.xml><?xml version="1.0" encoding="utf-8"?>
+<file path=ppt/slides/slide29.xml><?xml version="1.0" encoding="utf-8"?>
 <p:sld xmlns:a="http://schemas.openxmlformats.org/drawingml/2006/main" xmlns:r="http://schemas.openxmlformats.org/officeDocument/2006/relationships" xmlns:p="http://schemas.openxmlformats.org/presentationml/2006/main">
   <p:cSld>
     <p:spTree>
@@ -12370,7 +13720,106 @@
 </p:sld>
 </file>
 
-<file path=ppt/slides/slide24.xml><?xml version="1.0" encoding="utf-8"?>
+<file path=ppt/slides/slide3.xml><?xml version="1.0" encoding="utf-8"?>
+<p:sld xmlns:a="http://schemas.openxmlformats.org/drawingml/2006/main" xmlns:r="http://schemas.openxmlformats.org/officeDocument/2006/relationships" xmlns:p="http://schemas.openxmlformats.org/presentationml/2006/main">
+  <p:cSld>
+    <p:spTree>
+      <p:nvGrpSpPr>
+        <p:cNvPr id="1" name=""/>
+        <p:cNvGrpSpPr/>
+        <p:nvPr/>
+      </p:nvGrpSpPr>
+      <p:grpSpPr>
+        <a:xfrm>
+          <a:off x="0" y="0"/>
+          <a:ext cx="0" cy="0"/>
+          <a:chOff x="0" y="0"/>
+          <a:chExt cx="0" cy="0"/>
+        </a:xfrm>
+      </p:grpSpPr>
+      <p:sp>
+        <p:nvSpPr>
+          <p:cNvPr id="2" name="Title 1"/>
+          <p:cNvSpPr>
+            <a:spLocks noGrp="1"/>
+          </p:cNvSpPr>
+          <p:nvPr>
+            <p:ph type="title"/>
+          </p:nvPr>
+        </p:nvSpPr>
+        <p:spPr/>
+        <p:txBody>
+          <a:bodyPr>
+            <a:normAutofit/>
+          </a:bodyPr>
+          <a:lstStyle/>
+          <a:p>
+            <a:r>
+              <a:rPr lang="en-US" dirty="0" smtClean="0"/>
+              <a:t>Disclaimers</a:t>
+            </a:r>
+            <a:endParaRPr lang="en-US" dirty="0"/>
+          </a:p>
+        </p:txBody>
+      </p:sp>
+      <p:sp>
+        <p:nvSpPr>
+          <p:cNvPr id="3" name="Content Placeholder 2"/>
+          <p:cNvSpPr>
+            <a:spLocks noGrp="1"/>
+          </p:cNvSpPr>
+          <p:nvPr>
+            <p:ph idx="1"/>
+          </p:nvPr>
+        </p:nvSpPr>
+        <p:spPr/>
+        <p:txBody>
+          <a:bodyPr>
+            <a:normAutofit/>
+          </a:bodyPr>
+          <a:lstStyle/>
+          <a:p>
+            <a:r>
+              <a:rPr lang="en-US" dirty="0" smtClean="0"/>
+              <a:t>This is not a computer science lecture</a:t>
+            </a:r>
+          </a:p>
+          <a:p>
+            <a:r>
+              <a:rPr lang="en-US" dirty="0" smtClean="0"/>
+              <a:t>No proofs or complicated math</a:t>
+            </a:r>
+          </a:p>
+          <a:p>
+            <a:r>
+              <a:rPr lang="en-US" dirty="0" smtClean="0"/>
+              <a:t>Imprecise terminology: computational complexity, algorithm analysis, time complexity, asymptotic complexity, run-time analysis</a:t>
+            </a:r>
+            <a:endParaRPr lang="en-US" dirty="0"/>
+          </a:p>
+        </p:txBody>
+      </p:sp>
+    </p:spTree>
+    <p:extLst>
+      <p:ext uri="{BB962C8B-B14F-4D97-AF65-F5344CB8AC3E}">
+        <p14:creationId xmlns:p14="http://schemas.microsoft.com/office/powerpoint/2010/main" val="2287281436"/>
+      </p:ext>
+    </p:extLst>
+  </p:cSld>
+  <p:clrMapOvr>
+    <a:masterClrMapping/>
+  </p:clrMapOvr>
+  <p:timing>
+    <p:tnLst>
+      <p:par>
+        <p:cTn id="1" dur="indefinite" restart="never" nodeType="tmRoot"/>
+      </p:par>
+    </p:tnLst>
+  </p:timing>
+</p:sld>
+</file>
+
+<file path=ppt/slides/slide30.xml><?xml version="1.0" encoding="utf-8"?>
 <p:sld xmlns:a="http://schemas.openxmlformats.org/drawingml/2006/main" xmlns:r="http://schemas.openxmlformats.org/officeDocument/2006/relationships" xmlns:p="http://schemas.openxmlformats.org/presentationml/2006/main">
   <p:cSld>
     <p:spTree>
@@ -12492,7 +13941,7 @@
 </p:sld>
 </file>
 
-<file path=ppt/slides/slide25.xml><?xml version="1.0" encoding="utf-8"?>
+<file path=ppt/slides/slide31.xml><?xml version="1.0" encoding="utf-8"?>
 <p:sld xmlns:a="http://schemas.openxmlformats.org/drawingml/2006/main" xmlns:r="http://schemas.openxmlformats.org/officeDocument/2006/relationships" xmlns:p="http://schemas.openxmlformats.org/presentationml/2006/main">
   <p:cSld>
     <p:spTree>
@@ -12599,7 +14048,7 @@
 </p:sld>
 </file>
 
-<file path=ppt/slides/slide26.xml><?xml version="1.0" encoding="utf-8"?>
+<file path=ppt/slides/slide32.xml><?xml version="1.0" encoding="utf-8"?>
 <p:sld xmlns:a="http://schemas.openxmlformats.org/drawingml/2006/main" xmlns:r="http://schemas.openxmlformats.org/officeDocument/2006/relationships" xmlns:p="http://schemas.openxmlformats.org/presentationml/2006/main">
   <p:cSld>
     <p:spTree>
@@ -12688,7 +14137,7 @@
 </p:sld>
 </file>
 
-<file path=ppt/slides/slide27.xml><?xml version="1.0" encoding="utf-8"?>
+<file path=ppt/slides/slide33.xml><?xml version="1.0" encoding="utf-8"?>
 <p:sld xmlns:a="http://schemas.openxmlformats.org/drawingml/2006/main" xmlns:r="http://schemas.openxmlformats.org/officeDocument/2006/relationships" xmlns:p="http://schemas.openxmlformats.org/presentationml/2006/main">
   <p:cSld>
     <p:spTree>
@@ -12784,7 +14233,7 @@
 </p:sld>
 </file>
 
-<file path=ppt/slides/slide28.xml><?xml version="1.0" encoding="utf-8"?>
+<file path=ppt/slides/slide34.xml><?xml version="1.0" encoding="utf-8"?>
 <p:sld xmlns:a="http://schemas.openxmlformats.org/drawingml/2006/main" xmlns:r="http://schemas.openxmlformats.org/officeDocument/2006/relationships" xmlns:p="http://schemas.openxmlformats.org/presentationml/2006/main">
   <p:cSld>
     <p:spTree>
@@ -13472,7 +14921,7 @@
 </p:sld>
 </file>
 
-<file path=ppt/slides/slide29.xml><?xml version="1.0" encoding="utf-8"?>
+<file path=ppt/slides/slide35.xml><?xml version="1.0" encoding="utf-8"?>
 <p:sld xmlns:a="http://schemas.openxmlformats.org/drawingml/2006/main" xmlns:r="http://schemas.openxmlformats.org/officeDocument/2006/relationships" xmlns:p="http://schemas.openxmlformats.org/presentationml/2006/main">
   <p:cSld>
     <p:spTree>
@@ -13567,106 +15016,7 @@
 </p:sld>
 </file>
 
-<file path=ppt/slides/slide3.xml><?xml version="1.0" encoding="utf-8"?>
-<p:sld xmlns:a="http://schemas.openxmlformats.org/drawingml/2006/main" xmlns:r="http://schemas.openxmlformats.org/officeDocument/2006/relationships" xmlns:p="http://schemas.openxmlformats.org/presentationml/2006/main">
-  <p:cSld>
-    <p:spTree>
-      <p:nvGrpSpPr>
-        <p:cNvPr id="1" name=""/>
-        <p:cNvGrpSpPr/>
-        <p:nvPr/>
-      </p:nvGrpSpPr>
-      <p:grpSpPr>
-        <a:xfrm>
-          <a:off x="0" y="0"/>
-          <a:ext cx="0" cy="0"/>
-          <a:chOff x="0" y="0"/>
-          <a:chExt cx="0" cy="0"/>
-        </a:xfrm>
-      </p:grpSpPr>
-      <p:sp>
-        <p:nvSpPr>
-          <p:cNvPr id="2" name="Title 1"/>
-          <p:cNvSpPr>
-            <a:spLocks noGrp="1"/>
-          </p:cNvSpPr>
-          <p:nvPr>
-            <p:ph type="title"/>
-          </p:nvPr>
-        </p:nvSpPr>
-        <p:spPr/>
-        <p:txBody>
-          <a:bodyPr>
-            <a:normAutofit/>
-          </a:bodyPr>
-          <a:lstStyle/>
-          <a:p>
-            <a:r>
-              <a:rPr lang="en-US" dirty="0" smtClean="0"/>
-              <a:t>Disclaimers</a:t>
-            </a:r>
-            <a:endParaRPr lang="en-US" dirty="0"/>
-          </a:p>
-        </p:txBody>
-      </p:sp>
-      <p:sp>
-        <p:nvSpPr>
-          <p:cNvPr id="3" name="Content Placeholder 2"/>
-          <p:cNvSpPr>
-            <a:spLocks noGrp="1"/>
-          </p:cNvSpPr>
-          <p:nvPr>
-            <p:ph idx="1"/>
-          </p:nvPr>
-        </p:nvSpPr>
-        <p:spPr/>
-        <p:txBody>
-          <a:bodyPr>
-            <a:normAutofit/>
-          </a:bodyPr>
-          <a:lstStyle/>
-          <a:p>
-            <a:r>
-              <a:rPr lang="en-US" dirty="0" smtClean="0"/>
-              <a:t>This is not a computer science lecture</a:t>
-            </a:r>
-          </a:p>
-          <a:p>
-            <a:r>
-              <a:rPr lang="en-US" dirty="0" smtClean="0"/>
-              <a:t>No proofs or complicated math</a:t>
-            </a:r>
-          </a:p>
-          <a:p>
-            <a:r>
-              <a:rPr lang="en-US" dirty="0" smtClean="0"/>
-              <a:t>Imprecise terminology: computational complexity, algorithm analysis, time complexity, asymptotic complexity, run-time analysis</a:t>
-            </a:r>
-            <a:endParaRPr lang="en-US" dirty="0"/>
-          </a:p>
-        </p:txBody>
-      </p:sp>
-    </p:spTree>
-    <p:extLst>
-      <p:ext uri="{BB962C8B-B14F-4D97-AF65-F5344CB8AC3E}">
-        <p14:creationId xmlns:p14="http://schemas.microsoft.com/office/powerpoint/2010/main" val="2287281436"/>
-      </p:ext>
-    </p:extLst>
-  </p:cSld>
-  <p:clrMapOvr>
-    <a:masterClrMapping/>
-  </p:clrMapOvr>
-  <p:timing>
-    <p:tnLst>
-      <p:par>
-        <p:cTn id="1" dur="indefinite" restart="never" nodeType="tmRoot"/>
-      </p:par>
-    </p:tnLst>
-  </p:timing>
-</p:sld>
-</file>
-
-<file path=ppt/slides/slide30.xml><?xml version="1.0" encoding="utf-8"?>
+<file path=ppt/slides/slide36.xml><?xml version="1.0" encoding="utf-8"?>
 <p:sld xmlns:a="http://schemas.openxmlformats.org/drawingml/2006/main" xmlns:r="http://schemas.openxmlformats.org/officeDocument/2006/relationships" xmlns:p="http://schemas.openxmlformats.org/presentationml/2006/main">
   <p:cSld>
     <p:spTree>
@@ -13786,7 +15136,7 @@
 </p:sld>
 </file>
 
-<file path=ppt/slides/slide31.xml><?xml version="1.0" encoding="utf-8"?>
+<file path=ppt/slides/slide37.xml><?xml version="1.0" encoding="utf-8"?>
 <p:sld xmlns:a="http://schemas.openxmlformats.org/drawingml/2006/main" xmlns:r="http://schemas.openxmlformats.org/officeDocument/2006/relationships" xmlns:p="http://schemas.openxmlformats.org/presentationml/2006/main">
   <p:cSld>
     <p:spTree>
@@ -13909,7 +15259,7 @@
 </p:sld>
 </file>
 
-<file path=ppt/slides/slide32.xml><?xml version="1.0" encoding="utf-8"?>
+<file path=ppt/slides/slide38.xml><?xml version="1.0" encoding="utf-8"?>
 <p:sld xmlns:a="http://schemas.openxmlformats.org/drawingml/2006/main" xmlns:r="http://schemas.openxmlformats.org/officeDocument/2006/relationships" xmlns:p="http://schemas.openxmlformats.org/presentationml/2006/main">
   <p:cSld>
     <p:spTree>
@@ -14012,7 +15362,7 @@
 </p:sld>
 </file>
 
-<file path=ppt/slides/slide33.xml><?xml version="1.0" encoding="utf-8"?>
+<file path=ppt/slides/slide39.xml><?xml version="1.0" encoding="utf-8"?>
 <p:sld xmlns:a="http://schemas.openxmlformats.org/drawingml/2006/main" xmlns:r="http://schemas.openxmlformats.org/officeDocument/2006/relationships" xmlns:p="http://schemas.openxmlformats.org/presentationml/2006/main">
   <p:cSld>
     <p:spTree>
@@ -14106,580 +15456,6 @@
       </p:par>
     </p:tnLst>
   </p:timing>
-</p:sld>
-</file>
-
-<file path=ppt/slides/slide34.xml><?xml version="1.0" encoding="utf-8"?>
-<p:sld xmlns:a="http://schemas.openxmlformats.org/drawingml/2006/main" xmlns:r="http://schemas.openxmlformats.org/officeDocument/2006/relationships" xmlns:p="http://schemas.openxmlformats.org/presentationml/2006/main">
-  <p:cSld>
-    <p:spTree>
-      <p:nvGrpSpPr>
-        <p:cNvPr id="1" name=""/>
-        <p:cNvGrpSpPr/>
-        <p:nvPr/>
-      </p:nvGrpSpPr>
-      <p:grpSpPr>
-        <a:xfrm>
-          <a:off x="0" y="0"/>
-          <a:ext cx="0" cy="0"/>
-          <a:chOff x="0" y="0"/>
-          <a:chExt cx="0" cy="0"/>
-        </a:xfrm>
-      </p:grpSpPr>
-      <p:sp>
-        <p:nvSpPr>
-          <p:cNvPr id="2" name="Title 1"/>
-          <p:cNvSpPr>
-            <a:spLocks noGrp="1"/>
-          </p:cNvSpPr>
-          <p:nvPr>
-            <p:ph type="title"/>
-          </p:nvPr>
-        </p:nvSpPr>
-        <p:spPr/>
-        <p:txBody>
-          <a:bodyPr>
-            <a:normAutofit/>
-          </a:bodyPr>
-          <a:lstStyle/>
-          <a:p>
-            <a:r>
-              <a:rPr lang="en-US" dirty="0" smtClean="0"/>
-              <a:t>N - Linear Growth</a:t>
-            </a:r>
-            <a:endParaRPr lang="en-US" dirty="0"/>
-          </a:p>
-        </p:txBody>
-      </p:sp>
-      <p:sp>
-        <p:nvSpPr>
-          <p:cNvPr id="3" name="Content Placeholder 2"/>
-          <p:cNvSpPr>
-            <a:spLocks noGrp="1"/>
-          </p:cNvSpPr>
-          <p:nvPr>
-            <p:ph idx="1"/>
-          </p:nvPr>
-        </p:nvSpPr>
-        <p:spPr/>
-        <p:txBody>
-          <a:bodyPr>
-            <a:normAutofit lnSpcReduction="10000"/>
-          </a:bodyPr>
-          <a:lstStyle/>
-          <a:p>
-            <a:r>
-              <a:rPr lang="en-US" dirty="0"/>
-              <a:t>Full table scan, fast full scan, parsing, basic compression, </a:t>
-            </a:r>
-            <a:r>
-              <a:rPr lang="en-US" dirty="0" smtClean="0"/>
-              <a:t>DML, etc.</a:t>
-            </a:r>
-            <a:endParaRPr lang="en-US" dirty="0"/>
-          </a:p>
-          <a:p>
-            <a:r>
-              <a:rPr lang="en-US" dirty="0" smtClean="0"/>
-              <a:t>In practice, most common function</a:t>
-            </a:r>
-          </a:p>
-          <a:p>
-            <a:r>
-              <a:rPr lang="en-US" dirty="0" smtClean="0"/>
-              <a:t>Most effort is spent here</a:t>
-            </a:r>
-          </a:p>
-          <a:p>
-            <a:r>
-              <a:rPr lang="en-US" dirty="0" smtClean="0"/>
-              <a:t>2x improvement is nice</a:t>
-            </a:r>
-          </a:p>
-          <a:p>
-            <a:r>
-              <a:rPr lang="en-US" dirty="0" smtClean="0"/>
-              <a:t>Now it's time to compare functions</a:t>
-            </a:r>
-            <a:endParaRPr lang="en-US" dirty="0"/>
-          </a:p>
-        </p:txBody>
-      </p:sp>
-    </p:spTree>
-    <p:extLst>
-      <p:ext uri="{BB962C8B-B14F-4D97-AF65-F5344CB8AC3E}">
-        <p14:creationId xmlns:p14="http://schemas.microsoft.com/office/powerpoint/2010/main" val="1623018266"/>
-      </p:ext>
-    </p:extLst>
-  </p:cSld>
-  <p:clrMapOvr>
-    <a:masterClrMapping/>
-  </p:clrMapOvr>
-  <p:timing>
-    <p:tnLst>
-      <p:par>
-        <p:cTn id="1" dur="indefinite" restart="never" nodeType="tmRoot"/>
-      </p:par>
-    </p:tnLst>
-  </p:timing>
-</p:sld>
-</file>
-
-<file path=ppt/slides/slide35.xml><?xml version="1.0" encoding="utf-8"?>
-<p:sld xmlns:a="http://schemas.openxmlformats.org/drawingml/2006/main" xmlns:r="http://schemas.openxmlformats.org/officeDocument/2006/relationships" xmlns:p="http://schemas.openxmlformats.org/presentationml/2006/main">
-  <p:cSld>
-    <p:spTree>
-      <p:nvGrpSpPr>
-        <p:cNvPr id="1" name=""/>
-        <p:cNvGrpSpPr/>
-        <p:nvPr/>
-      </p:nvGrpSpPr>
-      <p:grpSpPr>
-        <a:xfrm>
-          <a:off x="0" y="0"/>
-          <a:ext cx="0" cy="0"/>
-          <a:chOff x="0" y="0"/>
-          <a:chExt cx="0" cy="0"/>
-        </a:xfrm>
-      </p:grpSpPr>
-      <p:sp>
-        <p:nvSpPr>
-          <p:cNvPr id="2" name="Title 1"/>
-          <p:cNvSpPr>
-            <a:spLocks noGrp="1"/>
-          </p:cNvSpPr>
-          <p:nvPr>
-            <p:ph type="title"/>
-          </p:nvPr>
-        </p:nvSpPr>
-        <p:spPr/>
-        <p:txBody>
-          <a:bodyPr/>
-          <a:lstStyle/>
-          <a:p>
-            <a:r>
-              <a:rPr lang="en-US" dirty="0" smtClean="0"/>
-              <a:t>N * LOG(N)</a:t>
-            </a:r>
-            <a:endParaRPr lang="en-US" dirty="0"/>
-          </a:p>
-        </p:txBody>
-      </p:sp>
-      <p:pic>
-        <p:nvPicPr>
-          <p:cNvPr id="4" name="Content Placeholder 3" descr="C:\Users\jonearles\Amazon Drive\Book\Practical Computer Science for SQL Developers\N LOG(N).png"/>
-          <p:cNvPicPr>
-            <a:picLocks noGrp="1" noChangeAspect="1"/>
-          </p:cNvPicPr>
-          <p:nvPr>
-            <p:ph idx="1"/>
-          </p:nvPr>
-        </p:nvPicPr>
-        <p:blipFill>
-          <a:blip r:embed="rId2">
-            <a:extLst>
-              <a:ext uri="{28A0092B-C50C-407E-A947-70E740481C1C}">
-                <a14:useLocalDpi xmlns:a14="http://schemas.microsoft.com/office/drawing/2010/main" val="0"/>
-              </a:ext>
-            </a:extLst>
-          </a:blip>
-          <a:srcRect/>
-          <a:stretch>
-            <a:fillRect/>
-          </a:stretch>
-        </p:blipFill>
-        <p:spPr bwMode="auto">
-          <a:xfrm>
-            <a:off x="2514600" y="895350"/>
-            <a:ext cx="4114800" cy="4114800"/>
-          </a:xfrm>
-          <a:prstGeom prst="rect">
-            <a:avLst/>
-          </a:prstGeom>
-          <a:noFill/>
-          <a:ln>
-            <a:noFill/>
-          </a:ln>
-        </p:spPr>
-      </p:pic>
-    </p:spTree>
-    <p:extLst>
-      <p:ext uri="{BB962C8B-B14F-4D97-AF65-F5344CB8AC3E}">
-        <p14:creationId xmlns:p14="http://schemas.microsoft.com/office/powerpoint/2010/main" val="1431611761"/>
-      </p:ext>
-    </p:extLst>
-  </p:cSld>
-  <p:clrMapOvr>
-    <a:masterClrMapping/>
-  </p:clrMapOvr>
-  <p:timing>
-    <p:tnLst>
-      <p:par>
-        <p:cTn id="1" dur="indefinite" restart="never" nodeType="tmRoot"/>
-      </p:par>
-    </p:tnLst>
-  </p:timing>
-</p:sld>
-</file>
-
-<file path=ppt/slides/slide36.xml><?xml version="1.0" encoding="utf-8"?>
-<p:sld xmlns:a="http://schemas.openxmlformats.org/drawingml/2006/main" xmlns:r="http://schemas.openxmlformats.org/officeDocument/2006/relationships" xmlns:p="http://schemas.openxmlformats.org/presentationml/2006/main">
-  <p:cSld>
-    <p:spTree>
-      <p:nvGrpSpPr>
-        <p:cNvPr id="1" name=""/>
-        <p:cNvGrpSpPr/>
-        <p:nvPr/>
-      </p:nvGrpSpPr>
-      <p:grpSpPr>
-        <a:xfrm>
-          <a:off x="0" y="0"/>
-          <a:ext cx="0" cy="0"/>
-          <a:chOff x="0" y="0"/>
-          <a:chExt cx="0" cy="0"/>
-        </a:xfrm>
-      </p:grpSpPr>
-      <p:sp>
-        <p:nvSpPr>
-          <p:cNvPr id="2" name="Title 1"/>
-          <p:cNvSpPr>
-            <a:spLocks noGrp="1"/>
-          </p:cNvSpPr>
-          <p:nvPr>
-            <p:ph type="title"/>
-          </p:nvPr>
-        </p:nvSpPr>
-        <p:spPr/>
-        <p:txBody>
-          <a:bodyPr/>
-          <a:lstStyle/>
-          <a:p>
-            <a:r>
-              <a:rPr lang="en-US" dirty="0" smtClean="0"/>
-              <a:t>N * LOG(N) - What and Where</a:t>
-            </a:r>
-            <a:endParaRPr lang="en-US" dirty="0"/>
-          </a:p>
-        </p:txBody>
-      </p:sp>
-      <p:sp>
-        <p:nvSpPr>
-          <p:cNvPr id="3" name="Content Placeholder 2"/>
-          <p:cNvSpPr>
-            <a:spLocks noGrp="1"/>
-          </p:cNvSpPr>
-          <p:nvPr>
-            <p:ph idx="1"/>
-          </p:nvPr>
-        </p:nvSpPr>
-        <p:spPr/>
-        <p:txBody>
-          <a:bodyPr>
-            <a:normAutofit/>
-          </a:bodyPr>
-          <a:lstStyle/>
-          <a:p>
-            <a:r>
-              <a:rPr lang="en-US" dirty="0"/>
-              <a:t>Sorting</a:t>
-            </a:r>
-            <a:endParaRPr lang="en-US" dirty="0" smtClean="0"/>
-          </a:p>
-          <a:p>
-            <a:r>
-              <a:rPr lang="en-US" dirty="0" smtClean="0"/>
-              <a:t>Iterated </a:t>
-            </a:r>
-            <a:r>
-              <a:rPr lang="en-US" dirty="0"/>
-              <a:t>index access</a:t>
-            </a:r>
-          </a:p>
-          <a:p>
-            <a:r>
-              <a:rPr lang="en-US" dirty="0"/>
-              <a:t>Local index (partitioned indexes</a:t>
-            </a:r>
-            <a:r>
-              <a:rPr lang="en-US" dirty="0" smtClean="0"/>
-              <a:t>)</a:t>
-            </a:r>
-          </a:p>
-        </p:txBody>
-      </p:sp>
-    </p:spTree>
-    <p:extLst>
-      <p:ext uri="{BB962C8B-B14F-4D97-AF65-F5344CB8AC3E}">
-        <p14:creationId xmlns:p14="http://schemas.microsoft.com/office/powerpoint/2010/main" val="1139039848"/>
-      </p:ext>
-    </p:extLst>
-  </p:cSld>
-  <p:clrMapOvr>
-    <a:masterClrMapping/>
-  </p:clrMapOvr>
-  <p:timing>
-    <p:tnLst>
-      <p:par>
-        <p:cTn id="1" dur="indefinite" restart="never" nodeType="tmRoot"/>
-      </p:par>
-    </p:tnLst>
-  </p:timing>
-</p:sld>
-</file>
-
-<file path=ppt/slides/slide37.xml><?xml version="1.0" encoding="utf-8"?>
-<p:sld xmlns:a="http://schemas.openxmlformats.org/drawingml/2006/main" xmlns:r="http://schemas.openxmlformats.org/officeDocument/2006/relationships" xmlns:p="http://schemas.openxmlformats.org/presentationml/2006/main">
-  <p:cSld>
-    <p:spTree>
-      <p:nvGrpSpPr>
-        <p:cNvPr id="1" name=""/>
-        <p:cNvGrpSpPr/>
-        <p:nvPr/>
-      </p:nvGrpSpPr>
-      <p:grpSpPr>
-        <a:xfrm>
-          <a:off x="0" y="0"/>
-          <a:ext cx="0" cy="0"/>
-          <a:chOff x="0" y="0"/>
-          <a:chExt cx="0" cy="0"/>
-        </a:xfrm>
-      </p:grpSpPr>
-      <p:sp>
-        <p:nvSpPr>
-          <p:cNvPr id="2" name="Title 1"/>
-          <p:cNvSpPr>
-            <a:spLocks noGrp="1"/>
-          </p:cNvSpPr>
-          <p:nvPr>
-            <p:ph type="title"/>
-          </p:nvPr>
-        </p:nvSpPr>
-        <p:spPr/>
-        <p:txBody>
-          <a:bodyPr>
-            <a:normAutofit fontScale="90000"/>
-          </a:bodyPr>
-          <a:lstStyle/>
-          <a:p>
-            <a:r>
-              <a:rPr lang="en-US" dirty="0" smtClean="0"/>
-              <a:t>N * LOG(N) - Full Table Scan vs. Index</a:t>
-            </a:r>
-            <a:endParaRPr lang="en-US" dirty="0"/>
-          </a:p>
-        </p:txBody>
-      </p:sp>
-      <p:pic>
-        <p:nvPicPr>
-          <p:cNvPr id="4" name="Content Placeholder 3"/>
-          <p:cNvPicPr>
-            <a:picLocks noGrp="1" noChangeAspect="1"/>
-          </p:cNvPicPr>
-          <p:nvPr>
-            <p:ph idx="1"/>
-          </p:nvPr>
-        </p:nvPicPr>
-        <p:blipFill>
-          <a:blip r:embed="rId3" cstate="print">
-            <a:extLst>
-              <a:ext uri="{28A0092B-C50C-407E-A947-70E740481C1C}">
-                <a14:useLocalDpi xmlns:a14="http://schemas.microsoft.com/office/drawing/2010/main" val="0"/>
-              </a:ext>
-            </a:extLst>
-          </a:blip>
-          <a:stretch>
-            <a:fillRect/>
-          </a:stretch>
-        </p:blipFill>
-        <p:spPr>
-          <a:xfrm>
-            <a:off x="2286000" y="961899"/>
-            <a:ext cx="4572000" cy="3997842"/>
-          </a:xfrm>
-        </p:spPr>
-      </p:pic>
-    </p:spTree>
-    <p:extLst>
-      <p:ext uri="{BB962C8B-B14F-4D97-AF65-F5344CB8AC3E}">
-        <p14:creationId xmlns:p14="http://schemas.microsoft.com/office/powerpoint/2010/main" val="353384941"/>
-      </p:ext>
-    </p:extLst>
-  </p:cSld>
-  <p:clrMapOvr>
-    <a:masterClrMapping/>
-  </p:clrMapOvr>
-</p:sld>
-</file>
-
-<file path=ppt/slides/slide38.xml><?xml version="1.0" encoding="utf-8"?>
-<p:sld xmlns:a="http://schemas.openxmlformats.org/drawingml/2006/main" xmlns:r="http://schemas.openxmlformats.org/officeDocument/2006/relationships" xmlns:p="http://schemas.openxmlformats.org/presentationml/2006/main">
-  <p:cSld>
-    <p:spTree>
-      <p:nvGrpSpPr>
-        <p:cNvPr id="1" name=""/>
-        <p:cNvGrpSpPr/>
-        <p:nvPr/>
-      </p:nvGrpSpPr>
-      <p:grpSpPr>
-        <a:xfrm>
-          <a:off x="0" y="0"/>
-          <a:ext cx="0" cy="0"/>
-          <a:chOff x="0" y="0"/>
-          <a:chExt cx="0" cy="0"/>
-        </a:xfrm>
-      </p:grpSpPr>
-      <p:sp>
-        <p:nvSpPr>
-          <p:cNvPr id="2" name="Title 1"/>
-          <p:cNvSpPr>
-            <a:spLocks noGrp="1"/>
-          </p:cNvSpPr>
-          <p:nvPr>
-            <p:ph type="title"/>
-          </p:nvPr>
-        </p:nvSpPr>
-        <p:spPr/>
-        <p:txBody>
-          <a:bodyPr/>
-          <a:lstStyle/>
-          <a:p>
-            <a:r>
-              <a:rPr lang="en-US" dirty="0" smtClean="0"/>
-              <a:t>N * LOG(N) - Sorting</a:t>
-            </a:r>
-            <a:endParaRPr lang="en-US" dirty="0"/>
-          </a:p>
-        </p:txBody>
-      </p:sp>
-      <p:sp>
-        <p:nvSpPr>
-          <p:cNvPr id="3" name="Content Placeholder 2"/>
-          <p:cNvSpPr>
-            <a:spLocks noGrp="1"/>
-          </p:cNvSpPr>
-          <p:nvPr>
-            <p:ph idx="1"/>
-          </p:nvPr>
-        </p:nvSpPr>
-        <p:spPr/>
-        <p:txBody>
-          <a:bodyPr/>
-          <a:lstStyle/>
-          <a:p>
-            <a:r>
-              <a:rPr lang="en-US" dirty="0" smtClean="0"/>
-              <a:t>ORDER BY time does not grow linearly</a:t>
-            </a:r>
-          </a:p>
-          <a:p>
-            <a:r>
-              <a:rPr lang="en-US" dirty="0" smtClean="0"/>
-              <a:t>Space grows linearly</a:t>
-            </a:r>
-          </a:p>
-          <a:p>
-            <a:r>
-              <a:rPr lang="en-US" dirty="0" smtClean="0"/>
-              <a:t>Index full scan - do sorting ahead of time</a:t>
-            </a:r>
-          </a:p>
-          <a:p>
-            <a:endParaRPr lang="en-US" dirty="0"/>
-          </a:p>
-        </p:txBody>
-      </p:sp>
-    </p:spTree>
-    <p:extLst>
-      <p:ext uri="{BB962C8B-B14F-4D97-AF65-F5344CB8AC3E}">
-        <p14:creationId xmlns:p14="http://schemas.microsoft.com/office/powerpoint/2010/main" val="4161855322"/>
-      </p:ext>
-    </p:extLst>
-  </p:cSld>
-  <p:clrMapOvr>
-    <a:masterClrMapping/>
-  </p:clrMapOvr>
-</p:sld>
-</file>
-
-<file path=ppt/slides/slide39.xml><?xml version="1.0" encoding="utf-8"?>
-<p:sld xmlns:a="http://schemas.openxmlformats.org/drawingml/2006/main" xmlns:r="http://schemas.openxmlformats.org/officeDocument/2006/relationships" xmlns:p="http://schemas.openxmlformats.org/presentationml/2006/main">
-  <p:cSld>
-    <p:spTree>
-      <p:nvGrpSpPr>
-        <p:cNvPr id="1" name=""/>
-        <p:cNvGrpSpPr/>
-        <p:nvPr/>
-      </p:nvGrpSpPr>
-      <p:grpSpPr>
-        <a:xfrm>
-          <a:off x="0" y="0"/>
-          <a:ext cx="0" cy="0"/>
-          <a:chOff x="0" y="0"/>
-          <a:chExt cx="0" cy="0"/>
-        </a:xfrm>
-      </p:grpSpPr>
-      <p:sp>
-        <p:nvSpPr>
-          <p:cNvPr id="2" name="Title 1"/>
-          <p:cNvSpPr>
-            <a:spLocks noGrp="1"/>
-          </p:cNvSpPr>
-          <p:nvPr>
-            <p:ph type="title"/>
-          </p:nvPr>
-        </p:nvSpPr>
-        <p:spPr/>
-        <p:txBody>
-          <a:bodyPr/>
-          <a:lstStyle/>
-          <a:p>
-            <a:r>
-              <a:rPr lang="en-US" dirty="0" smtClean="0"/>
-              <a:t>N * LOG(N) - Joining</a:t>
-            </a:r>
-            <a:endParaRPr lang="en-US" dirty="0"/>
-          </a:p>
-        </p:txBody>
-      </p:sp>
-      <p:pic>
-        <p:nvPicPr>
-          <p:cNvPr id="4" name="Content Placeholder 3"/>
-          <p:cNvPicPr>
-            <a:picLocks noGrp="1" noChangeAspect="1"/>
-          </p:cNvPicPr>
-          <p:nvPr>
-            <p:ph idx="1"/>
-          </p:nvPr>
-        </p:nvPicPr>
-        <p:blipFill>
-          <a:blip r:embed="rId3" cstate="print">
-            <a:extLst>
-              <a:ext uri="{28A0092B-C50C-407E-A947-70E740481C1C}">
-                <a14:useLocalDpi xmlns:a14="http://schemas.microsoft.com/office/drawing/2010/main" val="0"/>
-              </a:ext>
-            </a:extLst>
-          </a:blip>
-          <a:stretch>
-            <a:fillRect/>
-          </a:stretch>
-        </p:blipFill>
-        <p:spPr>
-          <a:xfrm>
-            <a:off x="2667000" y="1047750"/>
-            <a:ext cx="3962400" cy="3923266"/>
-          </a:xfrm>
-        </p:spPr>
-      </p:pic>
-    </p:spTree>
-    <p:extLst>
-      <p:ext uri="{BB962C8B-B14F-4D97-AF65-F5344CB8AC3E}">
-        <p14:creationId xmlns:p14="http://schemas.microsoft.com/office/powerpoint/2010/main" val="1019791011"/>
-      </p:ext>
-    </p:extLst>
-  </p:cSld>
-  <p:clrMapOvr>
-    <a:masterClrMapping/>
-  </p:clrMapOvr>
 </p:sld>
 </file>
 
@@ -14803,6 +15579,580 @@
         </p:nvSpPr>
         <p:spPr/>
         <p:txBody>
+          <a:bodyPr>
+            <a:normAutofit/>
+          </a:bodyPr>
+          <a:lstStyle/>
+          <a:p>
+            <a:r>
+              <a:rPr lang="en-US" dirty="0" smtClean="0"/>
+              <a:t>N - Linear Growth</a:t>
+            </a:r>
+            <a:endParaRPr lang="en-US" dirty="0"/>
+          </a:p>
+        </p:txBody>
+      </p:sp>
+      <p:sp>
+        <p:nvSpPr>
+          <p:cNvPr id="3" name="Content Placeholder 2"/>
+          <p:cNvSpPr>
+            <a:spLocks noGrp="1"/>
+          </p:cNvSpPr>
+          <p:nvPr>
+            <p:ph idx="1"/>
+          </p:nvPr>
+        </p:nvSpPr>
+        <p:spPr/>
+        <p:txBody>
+          <a:bodyPr>
+            <a:normAutofit lnSpcReduction="10000"/>
+          </a:bodyPr>
+          <a:lstStyle/>
+          <a:p>
+            <a:r>
+              <a:rPr lang="en-US" dirty="0"/>
+              <a:t>Full table scan, fast full scan, parsing, basic compression, </a:t>
+            </a:r>
+            <a:r>
+              <a:rPr lang="en-US" dirty="0" smtClean="0"/>
+              <a:t>DML, etc.</a:t>
+            </a:r>
+            <a:endParaRPr lang="en-US" dirty="0"/>
+          </a:p>
+          <a:p>
+            <a:r>
+              <a:rPr lang="en-US" dirty="0" smtClean="0"/>
+              <a:t>In practice, most common function</a:t>
+            </a:r>
+          </a:p>
+          <a:p>
+            <a:r>
+              <a:rPr lang="en-US" dirty="0" smtClean="0"/>
+              <a:t>Most effort is spent here</a:t>
+            </a:r>
+          </a:p>
+          <a:p>
+            <a:r>
+              <a:rPr lang="en-US" dirty="0" smtClean="0"/>
+              <a:t>2x improvement is nice</a:t>
+            </a:r>
+          </a:p>
+          <a:p>
+            <a:r>
+              <a:rPr lang="en-US" dirty="0" smtClean="0"/>
+              <a:t>Now it's time to compare functions</a:t>
+            </a:r>
+            <a:endParaRPr lang="en-US" dirty="0"/>
+          </a:p>
+        </p:txBody>
+      </p:sp>
+    </p:spTree>
+    <p:extLst>
+      <p:ext uri="{BB962C8B-B14F-4D97-AF65-F5344CB8AC3E}">
+        <p14:creationId xmlns:p14="http://schemas.microsoft.com/office/powerpoint/2010/main" val="1623018266"/>
+      </p:ext>
+    </p:extLst>
+  </p:cSld>
+  <p:clrMapOvr>
+    <a:masterClrMapping/>
+  </p:clrMapOvr>
+  <p:timing>
+    <p:tnLst>
+      <p:par>
+        <p:cTn id="1" dur="indefinite" restart="never" nodeType="tmRoot"/>
+      </p:par>
+    </p:tnLst>
+  </p:timing>
+</p:sld>
+</file>
+
+<file path=ppt/slides/slide41.xml><?xml version="1.0" encoding="utf-8"?>
+<p:sld xmlns:a="http://schemas.openxmlformats.org/drawingml/2006/main" xmlns:r="http://schemas.openxmlformats.org/officeDocument/2006/relationships" xmlns:p="http://schemas.openxmlformats.org/presentationml/2006/main">
+  <p:cSld>
+    <p:spTree>
+      <p:nvGrpSpPr>
+        <p:cNvPr id="1" name=""/>
+        <p:cNvGrpSpPr/>
+        <p:nvPr/>
+      </p:nvGrpSpPr>
+      <p:grpSpPr>
+        <a:xfrm>
+          <a:off x="0" y="0"/>
+          <a:ext cx="0" cy="0"/>
+          <a:chOff x="0" y="0"/>
+          <a:chExt cx="0" cy="0"/>
+        </a:xfrm>
+      </p:grpSpPr>
+      <p:sp>
+        <p:nvSpPr>
+          <p:cNvPr id="2" name="Title 1"/>
+          <p:cNvSpPr>
+            <a:spLocks noGrp="1"/>
+          </p:cNvSpPr>
+          <p:nvPr>
+            <p:ph type="title"/>
+          </p:nvPr>
+        </p:nvSpPr>
+        <p:spPr/>
+        <p:txBody>
+          <a:bodyPr/>
+          <a:lstStyle/>
+          <a:p>
+            <a:r>
+              <a:rPr lang="en-US" dirty="0" smtClean="0"/>
+              <a:t>N * LOG(N)</a:t>
+            </a:r>
+            <a:endParaRPr lang="en-US" dirty="0"/>
+          </a:p>
+        </p:txBody>
+      </p:sp>
+      <p:pic>
+        <p:nvPicPr>
+          <p:cNvPr id="4" name="Content Placeholder 3" descr="C:\Users\jonearles\Amazon Drive\Book\Practical Computer Science for SQL Developers\N LOG(N).png"/>
+          <p:cNvPicPr>
+            <a:picLocks noGrp="1" noChangeAspect="1"/>
+          </p:cNvPicPr>
+          <p:nvPr>
+            <p:ph idx="1"/>
+          </p:nvPr>
+        </p:nvPicPr>
+        <p:blipFill>
+          <a:blip r:embed="rId2">
+            <a:extLst>
+              <a:ext uri="{28A0092B-C50C-407E-A947-70E740481C1C}">
+                <a14:useLocalDpi xmlns:a14="http://schemas.microsoft.com/office/drawing/2010/main" val="0"/>
+              </a:ext>
+            </a:extLst>
+          </a:blip>
+          <a:srcRect/>
+          <a:stretch>
+            <a:fillRect/>
+          </a:stretch>
+        </p:blipFill>
+        <p:spPr bwMode="auto">
+          <a:xfrm>
+            <a:off x="2514600" y="895350"/>
+            <a:ext cx="4114800" cy="4114800"/>
+          </a:xfrm>
+          <a:prstGeom prst="rect">
+            <a:avLst/>
+          </a:prstGeom>
+          <a:noFill/>
+          <a:ln>
+            <a:noFill/>
+          </a:ln>
+        </p:spPr>
+      </p:pic>
+    </p:spTree>
+    <p:extLst>
+      <p:ext uri="{BB962C8B-B14F-4D97-AF65-F5344CB8AC3E}">
+        <p14:creationId xmlns:p14="http://schemas.microsoft.com/office/powerpoint/2010/main" val="1431611761"/>
+      </p:ext>
+    </p:extLst>
+  </p:cSld>
+  <p:clrMapOvr>
+    <a:masterClrMapping/>
+  </p:clrMapOvr>
+  <p:timing>
+    <p:tnLst>
+      <p:par>
+        <p:cTn id="1" dur="indefinite" restart="never" nodeType="tmRoot"/>
+      </p:par>
+    </p:tnLst>
+  </p:timing>
+</p:sld>
+</file>
+
+<file path=ppt/slides/slide42.xml><?xml version="1.0" encoding="utf-8"?>
+<p:sld xmlns:a="http://schemas.openxmlformats.org/drawingml/2006/main" xmlns:r="http://schemas.openxmlformats.org/officeDocument/2006/relationships" xmlns:p="http://schemas.openxmlformats.org/presentationml/2006/main">
+  <p:cSld>
+    <p:spTree>
+      <p:nvGrpSpPr>
+        <p:cNvPr id="1" name=""/>
+        <p:cNvGrpSpPr/>
+        <p:nvPr/>
+      </p:nvGrpSpPr>
+      <p:grpSpPr>
+        <a:xfrm>
+          <a:off x="0" y="0"/>
+          <a:ext cx="0" cy="0"/>
+          <a:chOff x="0" y="0"/>
+          <a:chExt cx="0" cy="0"/>
+        </a:xfrm>
+      </p:grpSpPr>
+      <p:sp>
+        <p:nvSpPr>
+          <p:cNvPr id="2" name="Title 1"/>
+          <p:cNvSpPr>
+            <a:spLocks noGrp="1"/>
+          </p:cNvSpPr>
+          <p:nvPr>
+            <p:ph type="title"/>
+          </p:nvPr>
+        </p:nvSpPr>
+        <p:spPr/>
+        <p:txBody>
+          <a:bodyPr/>
+          <a:lstStyle/>
+          <a:p>
+            <a:r>
+              <a:rPr lang="en-US" dirty="0" smtClean="0"/>
+              <a:t>N * LOG(N) - What and Where</a:t>
+            </a:r>
+            <a:endParaRPr lang="en-US" dirty="0"/>
+          </a:p>
+        </p:txBody>
+      </p:sp>
+      <p:sp>
+        <p:nvSpPr>
+          <p:cNvPr id="3" name="Content Placeholder 2"/>
+          <p:cNvSpPr>
+            <a:spLocks noGrp="1"/>
+          </p:cNvSpPr>
+          <p:nvPr>
+            <p:ph idx="1"/>
+          </p:nvPr>
+        </p:nvSpPr>
+        <p:spPr/>
+        <p:txBody>
+          <a:bodyPr>
+            <a:normAutofit/>
+          </a:bodyPr>
+          <a:lstStyle/>
+          <a:p>
+            <a:r>
+              <a:rPr lang="en-US" dirty="0"/>
+              <a:t>Sorting</a:t>
+            </a:r>
+            <a:endParaRPr lang="en-US" dirty="0" smtClean="0"/>
+          </a:p>
+          <a:p>
+            <a:r>
+              <a:rPr lang="en-US" dirty="0" smtClean="0"/>
+              <a:t>Iterated </a:t>
+            </a:r>
+            <a:r>
+              <a:rPr lang="en-US" dirty="0"/>
+              <a:t>index access</a:t>
+            </a:r>
+          </a:p>
+          <a:p>
+            <a:r>
+              <a:rPr lang="en-US" dirty="0"/>
+              <a:t>Local index (partitioned indexes</a:t>
+            </a:r>
+            <a:r>
+              <a:rPr lang="en-US" dirty="0" smtClean="0"/>
+              <a:t>)</a:t>
+            </a:r>
+          </a:p>
+        </p:txBody>
+      </p:sp>
+    </p:spTree>
+    <p:extLst>
+      <p:ext uri="{BB962C8B-B14F-4D97-AF65-F5344CB8AC3E}">
+        <p14:creationId xmlns:p14="http://schemas.microsoft.com/office/powerpoint/2010/main" val="1139039848"/>
+      </p:ext>
+    </p:extLst>
+  </p:cSld>
+  <p:clrMapOvr>
+    <a:masterClrMapping/>
+  </p:clrMapOvr>
+  <p:timing>
+    <p:tnLst>
+      <p:par>
+        <p:cTn id="1" dur="indefinite" restart="never" nodeType="tmRoot"/>
+      </p:par>
+    </p:tnLst>
+  </p:timing>
+</p:sld>
+</file>
+
+<file path=ppt/slides/slide43.xml><?xml version="1.0" encoding="utf-8"?>
+<p:sld xmlns:a="http://schemas.openxmlformats.org/drawingml/2006/main" xmlns:r="http://schemas.openxmlformats.org/officeDocument/2006/relationships" xmlns:p="http://schemas.openxmlformats.org/presentationml/2006/main">
+  <p:cSld>
+    <p:spTree>
+      <p:nvGrpSpPr>
+        <p:cNvPr id="1" name=""/>
+        <p:cNvGrpSpPr/>
+        <p:nvPr/>
+      </p:nvGrpSpPr>
+      <p:grpSpPr>
+        <a:xfrm>
+          <a:off x="0" y="0"/>
+          <a:ext cx="0" cy="0"/>
+          <a:chOff x="0" y="0"/>
+          <a:chExt cx="0" cy="0"/>
+        </a:xfrm>
+      </p:grpSpPr>
+      <p:sp>
+        <p:nvSpPr>
+          <p:cNvPr id="2" name="Title 1"/>
+          <p:cNvSpPr>
+            <a:spLocks noGrp="1"/>
+          </p:cNvSpPr>
+          <p:nvPr>
+            <p:ph type="title"/>
+          </p:nvPr>
+        </p:nvSpPr>
+        <p:spPr/>
+        <p:txBody>
+          <a:bodyPr>
+            <a:normAutofit fontScale="90000"/>
+          </a:bodyPr>
+          <a:lstStyle/>
+          <a:p>
+            <a:r>
+              <a:rPr lang="en-US" dirty="0" smtClean="0"/>
+              <a:t>N * LOG(N) - Full Table Scan vs. Index</a:t>
+            </a:r>
+            <a:endParaRPr lang="en-US" dirty="0"/>
+          </a:p>
+        </p:txBody>
+      </p:sp>
+      <p:pic>
+        <p:nvPicPr>
+          <p:cNvPr id="4" name="Content Placeholder 3"/>
+          <p:cNvPicPr>
+            <a:picLocks noGrp="1" noChangeAspect="1"/>
+          </p:cNvPicPr>
+          <p:nvPr>
+            <p:ph idx="1"/>
+          </p:nvPr>
+        </p:nvPicPr>
+        <p:blipFill>
+          <a:blip r:embed="rId3" cstate="print">
+            <a:extLst>
+              <a:ext uri="{28A0092B-C50C-407E-A947-70E740481C1C}">
+                <a14:useLocalDpi xmlns:a14="http://schemas.microsoft.com/office/drawing/2010/main" val="0"/>
+              </a:ext>
+            </a:extLst>
+          </a:blip>
+          <a:stretch>
+            <a:fillRect/>
+          </a:stretch>
+        </p:blipFill>
+        <p:spPr>
+          <a:xfrm>
+            <a:off x="2286000" y="961899"/>
+            <a:ext cx="4572000" cy="3997842"/>
+          </a:xfrm>
+        </p:spPr>
+      </p:pic>
+    </p:spTree>
+    <p:extLst>
+      <p:ext uri="{BB962C8B-B14F-4D97-AF65-F5344CB8AC3E}">
+        <p14:creationId xmlns:p14="http://schemas.microsoft.com/office/powerpoint/2010/main" val="353384941"/>
+      </p:ext>
+    </p:extLst>
+  </p:cSld>
+  <p:clrMapOvr>
+    <a:masterClrMapping/>
+  </p:clrMapOvr>
+</p:sld>
+</file>
+
+<file path=ppt/slides/slide44.xml><?xml version="1.0" encoding="utf-8"?>
+<p:sld xmlns:a="http://schemas.openxmlformats.org/drawingml/2006/main" xmlns:r="http://schemas.openxmlformats.org/officeDocument/2006/relationships" xmlns:p="http://schemas.openxmlformats.org/presentationml/2006/main">
+  <p:cSld>
+    <p:spTree>
+      <p:nvGrpSpPr>
+        <p:cNvPr id="1" name=""/>
+        <p:cNvGrpSpPr/>
+        <p:nvPr/>
+      </p:nvGrpSpPr>
+      <p:grpSpPr>
+        <a:xfrm>
+          <a:off x="0" y="0"/>
+          <a:ext cx="0" cy="0"/>
+          <a:chOff x="0" y="0"/>
+          <a:chExt cx="0" cy="0"/>
+        </a:xfrm>
+      </p:grpSpPr>
+      <p:sp>
+        <p:nvSpPr>
+          <p:cNvPr id="2" name="Title 1"/>
+          <p:cNvSpPr>
+            <a:spLocks noGrp="1"/>
+          </p:cNvSpPr>
+          <p:nvPr>
+            <p:ph type="title"/>
+          </p:nvPr>
+        </p:nvSpPr>
+        <p:spPr/>
+        <p:txBody>
+          <a:bodyPr/>
+          <a:lstStyle/>
+          <a:p>
+            <a:r>
+              <a:rPr lang="en-US" dirty="0" smtClean="0"/>
+              <a:t>N * LOG(N) - Sorting</a:t>
+            </a:r>
+            <a:endParaRPr lang="en-US" dirty="0"/>
+          </a:p>
+        </p:txBody>
+      </p:sp>
+      <p:sp>
+        <p:nvSpPr>
+          <p:cNvPr id="3" name="Content Placeholder 2"/>
+          <p:cNvSpPr>
+            <a:spLocks noGrp="1"/>
+          </p:cNvSpPr>
+          <p:nvPr>
+            <p:ph idx="1"/>
+          </p:nvPr>
+        </p:nvSpPr>
+        <p:spPr/>
+        <p:txBody>
+          <a:bodyPr/>
+          <a:lstStyle/>
+          <a:p>
+            <a:r>
+              <a:rPr lang="en-US" dirty="0" smtClean="0"/>
+              <a:t>ORDER BY time does not grow linearly</a:t>
+            </a:r>
+          </a:p>
+          <a:p>
+            <a:r>
+              <a:rPr lang="en-US" dirty="0" smtClean="0"/>
+              <a:t>Space grows linearly</a:t>
+            </a:r>
+          </a:p>
+          <a:p>
+            <a:r>
+              <a:rPr lang="en-US" dirty="0" smtClean="0"/>
+              <a:t>Index full scan - do sorting ahead of time</a:t>
+            </a:r>
+          </a:p>
+          <a:p>
+            <a:endParaRPr lang="en-US" dirty="0"/>
+          </a:p>
+        </p:txBody>
+      </p:sp>
+    </p:spTree>
+    <p:extLst>
+      <p:ext uri="{BB962C8B-B14F-4D97-AF65-F5344CB8AC3E}">
+        <p14:creationId xmlns:p14="http://schemas.microsoft.com/office/powerpoint/2010/main" val="4161855322"/>
+      </p:ext>
+    </p:extLst>
+  </p:cSld>
+  <p:clrMapOvr>
+    <a:masterClrMapping/>
+  </p:clrMapOvr>
+</p:sld>
+</file>
+
+<file path=ppt/slides/slide45.xml><?xml version="1.0" encoding="utf-8"?>
+<p:sld xmlns:a="http://schemas.openxmlformats.org/drawingml/2006/main" xmlns:r="http://schemas.openxmlformats.org/officeDocument/2006/relationships" xmlns:p="http://schemas.openxmlformats.org/presentationml/2006/main">
+  <p:cSld>
+    <p:spTree>
+      <p:nvGrpSpPr>
+        <p:cNvPr id="1" name=""/>
+        <p:cNvGrpSpPr/>
+        <p:nvPr/>
+      </p:nvGrpSpPr>
+      <p:grpSpPr>
+        <a:xfrm>
+          <a:off x="0" y="0"/>
+          <a:ext cx="0" cy="0"/>
+          <a:chOff x="0" y="0"/>
+          <a:chExt cx="0" cy="0"/>
+        </a:xfrm>
+      </p:grpSpPr>
+      <p:sp>
+        <p:nvSpPr>
+          <p:cNvPr id="2" name="Title 1"/>
+          <p:cNvSpPr>
+            <a:spLocks noGrp="1"/>
+          </p:cNvSpPr>
+          <p:nvPr>
+            <p:ph type="title"/>
+          </p:nvPr>
+        </p:nvSpPr>
+        <p:spPr/>
+        <p:txBody>
+          <a:bodyPr/>
+          <a:lstStyle/>
+          <a:p>
+            <a:r>
+              <a:rPr lang="en-US" dirty="0" smtClean="0"/>
+              <a:t>N * LOG(N) - Joining</a:t>
+            </a:r>
+            <a:endParaRPr lang="en-US" dirty="0"/>
+          </a:p>
+        </p:txBody>
+      </p:sp>
+      <p:pic>
+        <p:nvPicPr>
+          <p:cNvPr id="4" name="Content Placeholder 3"/>
+          <p:cNvPicPr>
+            <a:picLocks noGrp="1" noChangeAspect="1"/>
+          </p:cNvPicPr>
+          <p:nvPr>
+            <p:ph idx="1"/>
+          </p:nvPr>
+        </p:nvPicPr>
+        <p:blipFill>
+          <a:blip r:embed="rId3" cstate="print">
+            <a:extLst>
+              <a:ext uri="{28A0092B-C50C-407E-A947-70E740481C1C}">
+                <a14:useLocalDpi xmlns:a14="http://schemas.microsoft.com/office/drawing/2010/main" val="0"/>
+              </a:ext>
+            </a:extLst>
+          </a:blip>
+          <a:stretch>
+            <a:fillRect/>
+          </a:stretch>
+        </p:blipFill>
+        <p:spPr>
+          <a:xfrm>
+            <a:off x="2667000" y="1047750"/>
+            <a:ext cx="3962400" cy="3923266"/>
+          </a:xfrm>
+        </p:spPr>
+      </p:pic>
+    </p:spTree>
+    <p:extLst>
+      <p:ext uri="{BB962C8B-B14F-4D97-AF65-F5344CB8AC3E}">
+        <p14:creationId xmlns:p14="http://schemas.microsoft.com/office/powerpoint/2010/main" val="1019791011"/>
+      </p:ext>
+    </p:extLst>
+  </p:cSld>
+  <p:clrMapOvr>
+    <a:masterClrMapping/>
+  </p:clrMapOvr>
+</p:sld>
+</file>
+
+<file path=ppt/slides/slide46.xml><?xml version="1.0" encoding="utf-8"?>
+<p:sld xmlns:a="http://schemas.openxmlformats.org/drawingml/2006/main" xmlns:r="http://schemas.openxmlformats.org/officeDocument/2006/relationships" xmlns:p="http://schemas.openxmlformats.org/presentationml/2006/main">
+  <p:cSld>
+    <p:spTree>
+      <p:nvGrpSpPr>
+        <p:cNvPr id="1" name=""/>
+        <p:cNvGrpSpPr/>
+        <p:nvPr/>
+      </p:nvGrpSpPr>
+      <p:grpSpPr>
+        <a:xfrm>
+          <a:off x="0" y="0"/>
+          <a:ext cx="0" cy="0"/>
+          <a:chOff x="0" y="0"/>
+          <a:chExt cx="0" cy="0"/>
+        </a:xfrm>
+      </p:grpSpPr>
+      <p:sp>
+        <p:nvSpPr>
+          <p:cNvPr id="2" name="Title 1"/>
+          <p:cNvSpPr>
+            <a:spLocks noGrp="1"/>
+          </p:cNvSpPr>
+          <p:nvPr>
+            <p:ph type="title"/>
+          </p:nvPr>
+        </p:nvSpPr>
+        <p:spPr/>
+        <p:txBody>
           <a:bodyPr/>
           <a:lstStyle/>
           <a:p>
@@ -14913,7 +16263,7 @@
 </p:sld>
 </file>
 
-<file path=ppt/slides/slide41.xml><?xml version="1.0" encoding="utf-8"?>
+<file path=ppt/slides/slide47.xml><?xml version="1.0" encoding="utf-8"?>
 <p:sld xmlns:a="http://schemas.openxmlformats.org/drawingml/2006/main" xmlns:r="http://schemas.openxmlformats.org/officeDocument/2006/relationships" xmlns:p="http://schemas.openxmlformats.org/presentationml/2006/main">
   <p:cSld>
     <p:spTree>
@@ -14997,7 +16347,7 @@
 </p:sld>
 </file>
 
-<file path=ppt/slides/slide42.xml><?xml version="1.0" encoding="utf-8"?>
+<file path=ppt/slides/slide48.xml><?xml version="1.0" encoding="utf-8"?>
 <p:sld xmlns:a="http://schemas.openxmlformats.org/drawingml/2006/main" xmlns:r="http://schemas.openxmlformats.org/officeDocument/2006/relationships" xmlns:p="http://schemas.openxmlformats.org/presentationml/2006/main">
   <p:cSld>
     <p:spTree>
@@ -15091,7 +16441,7 @@
 </p:sld>
 </file>
 
-<file path=ppt/slides/slide43.xml><?xml version="1.0" encoding="utf-8"?>
+<file path=ppt/slides/slide49.xml><?xml version="1.0" encoding="utf-8"?>
 <p:sld xmlns:a="http://schemas.openxmlformats.org/drawingml/2006/main" xmlns:r="http://schemas.openxmlformats.org/officeDocument/2006/relationships" xmlns:p="http://schemas.openxmlformats.org/presentationml/2006/main">
   <p:cSld>
     <p:spTree>
@@ -15188,7 +16538,129 @@
 </p:sld>
 </file>
 
-<file path=ppt/slides/slide44.xml><?xml version="1.0" encoding="utf-8"?>
+<file path=ppt/slides/slide5.xml><?xml version="1.0" encoding="utf-8"?>
+<p:sld xmlns:a="http://schemas.openxmlformats.org/drawingml/2006/main" xmlns:r="http://schemas.openxmlformats.org/officeDocument/2006/relationships" xmlns:p="http://schemas.openxmlformats.org/presentationml/2006/main">
+  <p:cSld>
+    <p:spTree>
+      <p:nvGrpSpPr>
+        <p:cNvPr id="1" name=""/>
+        <p:cNvGrpSpPr/>
+        <p:nvPr/>
+      </p:nvGrpSpPr>
+      <p:grpSpPr>
+        <a:xfrm>
+          <a:off x="0" y="0"/>
+          <a:ext cx="0" cy="0"/>
+          <a:chOff x="0" y="0"/>
+          <a:chExt cx="0" cy="0"/>
+        </a:xfrm>
+      </p:grpSpPr>
+      <p:sp>
+        <p:nvSpPr>
+          <p:cNvPr id="2" name="Title 1"/>
+          <p:cNvSpPr>
+            <a:spLocks noGrp="1"/>
+          </p:cNvSpPr>
+          <p:nvPr>
+            <p:ph type="title"/>
+          </p:nvPr>
+        </p:nvSpPr>
+        <p:spPr/>
+        <p:txBody>
+          <a:bodyPr/>
+          <a:lstStyle/>
+          <a:p>
+            <a:r>
+              <a:rPr lang="en-US" dirty="0" smtClean="0"/>
+              <a:t>Tuning is Hard</a:t>
+            </a:r>
+            <a:endParaRPr lang="en-US" dirty="0"/>
+          </a:p>
+        </p:txBody>
+      </p:sp>
+      <p:sp>
+        <p:nvSpPr>
+          <p:cNvPr id="3" name="Content Placeholder 2"/>
+          <p:cNvSpPr>
+            <a:spLocks noGrp="1"/>
+          </p:cNvSpPr>
+          <p:nvPr>
+            <p:ph idx="1"/>
+          </p:nvPr>
+        </p:nvSpPr>
+        <p:spPr/>
+        <p:txBody>
+          <a:bodyPr>
+            <a:normAutofit fontScale="92500" lnSpcReduction="10000"/>
+          </a:bodyPr>
+          <a:lstStyle/>
+          <a:p>
+            <a:r>
+              <a:rPr lang="en-US" dirty="0" smtClean="0"/>
+              <a:t>Most tuning is based on business logic, dev process, advanced features, and styles</a:t>
+            </a:r>
+          </a:p>
+          <a:p>
+            <a:r>
+              <a:rPr lang="en-US" dirty="0" smtClean="0"/>
+              <a:t>Breadth-first approach </a:t>
+            </a:r>
+            <a:r>
+              <a:rPr lang="en-US" dirty="0" smtClean="0"/>
+              <a:t>needed</a:t>
+            </a:r>
+          </a:p>
+          <a:p>
+            <a:r>
+              <a:rPr lang="en-US" dirty="0" smtClean="0"/>
+              <a:t>Find first </a:t>
+            </a:r>
+            <a:r>
+              <a:rPr lang="en-US" i="1" dirty="0" smtClean="0"/>
+              <a:t>significant</a:t>
+            </a:r>
+            <a:r>
+              <a:rPr lang="en-US" dirty="0" smtClean="0"/>
+              <a:t> problem (measure, don't guess)</a:t>
+            </a:r>
+            <a:endParaRPr lang="en-US" dirty="0" smtClean="0"/>
+          </a:p>
+          <a:p>
+            <a:r>
+              <a:rPr lang="en-US" dirty="0" smtClean="0"/>
+              <a:t>Many tuning styles are necessary</a:t>
+            </a:r>
+          </a:p>
+          <a:p>
+            <a:r>
+              <a:rPr lang="en-US" dirty="0" smtClean="0"/>
+              <a:t>Algorithm analysis is foundational</a:t>
+            </a:r>
+            <a:endParaRPr lang="en-US" dirty="0"/>
+          </a:p>
+        </p:txBody>
+      </p:sp>
+    </p:spTree>
+    <p:extLst>
+      <p:ext uri="{BB962C8B-B14F-4D97-AF65-F5344CB8AC3E}">
+        <p14:creationId xmlns:p14="http://schemas.microsoft.com/office/powerpoint/2010/main" val="1469964481"/>
+      </p:ext>
+    </p:extLst>
+  </p:cSld>
+  <p:clrMapOvr>
+    <a:masterClrMapping/>
+  </p:clrMapOvr>
+  <p:timing>
+    <p:tnLst>
+      <p:par>
+        <p:cTn id="1" dur="indefinite" restart="never" nodeType="tmRoot"/>
+      </p:par>
+    </p:tnLst>
+  </p:timing>
+</p:sld>
+</file>
+
+<file path=ppt/slides/slide50.xml><?xml version="1.0" encoding="utf-8"?>
 <p:sld xmlns:a="http://schemas.openxmlformats.org/drawingml/2006/main" xmlns:r="http://schemas.openxmlformats.org/officeDocument/2006/relationships" xmlns:p="http://schemas.openxmlformats.org/presentationml/2006/main">
   <p:cSld>
     <p:spTree>
@@ -15427,7 +16899,7 @@
 </p:sld>
 </file>
 
-<file path=ppt/slides/slide45.xml><?xml version="1.0" encoding="utf-8"?>
+<file path=ppt/slides/slide51.xml><?xml version="1.0" encoding="utf-8"?>
 <p:sld xmlns:a="http://schemas.openxmlformats.org/drawingml/2006/main" xmlns:r="http://schemas.openxmlformats.org/officeDocument/2006/relationships" xmlns:p="http://schemas.openxmlformats.org/presentationml/2006/main">
   <p:cSld>
     <p:spTree>
@@ -15515,7 +16987,7 @@
 </p:sld>
 </file>
 
-<file path=ppt/slides/slide46.xml><?xml version="1.0" encoding="utf-8"?>
+<file path=ppt/slides/slide52.xml><?xml version="1.0" encoding="utf-8"?>
 <p:sld xmlns:a="http://schemas.openxmlformats.org/drawingml/2006/main" xmlns:r="http://schemas.openxmlformats.org/officeDocument/2006/relationships" xmlns:p="http://schemas.openxmlformats.org/presentationml/2006/main">
   <p:cSld>
     <p:spTree>
@@ -15612,7 +17084,7 @@
 </p:sld>
 </file>
 
-<file path=ppt/slides/slide47.xml><?xml version="1.0" encoding="utf-8"?>
+<file path=ppt/slides/slide53.xml><?xml version="1.0" encoding="utf-8"?>
 <p:sld xmlns:a="http://schemas.openxmlformats.org/drawingml/2006/main" xmlns:r="http://schemas.openxmlformats.org/officeDocument/2006/relationships" xmlns:p="http://schemas.openxmlformats.org/presentationml/2006/main">
   <p:cSld>
     <p:spTree>
@@ -15735,7 +17207,7 @@
 </p:sld>
 </file>
 
-<file path=ppt/slides/slide48.xml><?xml version="1.0" encoding="utf-8"?>
+<file path=ppt/slides/slide54.xml><?xml version="1.0" encoding="utf-8"?>
 <p:sld xmlns:a="http://schemas.openxmlformats.org/drawingml/2006/main" xmlns:r="http://schemas.openxmlformats.org/officeDocument/2006/relationships" xmlns:p="http://schemas.openxmlformats.org/presentationml/2006/main">
   <p:cSld>
     <p:spTree>
@@ -16006,7 +17478,7 @@
 </p:sld>
 </file>
 
-<file path=ppt/slides/slide49.xml><?xml version="1.0" encoding="utf-8"?>
+<file path=ppt/slides/slide55.xml><?xml version="1.0" encoding="utf-8"?>
 <p:sld xmlns:a="http://schemas.openxmlformats.org/drawingml/2006/main" xmlns:r="http://schemas.openxmlformats.org/officeDocument/2006/relationships" xmlns:p="http://schemas.openxmlformats.org/presentationml/2006/main">
   <p:cSld>
     <p:spTree>
@@ -16124,7 +17596,7 @@
 </p:sld>
 </file>
 
-<file path=ppt/slides/slide5.xml><?xml version="1.0" encoding="utf-8"?>
+<file path=ppt/slides/slide56.xml><?xml version="1.0" encoding="utf-8"?>
 <p:sld xmlns:a="http://schemas.openxmlformats.org/drawingml/2006/main" xmlns:r="http://schemas.openxmlformats.org/officeDocument/2006/relationships" xmlns:p="http://schemas.openxmlformats.org/presentationml/2006/main">
   <p:cSld>
     <p:spTree>
@@ -16158,128 +17630,6 @@
           <a:p>
             <a:r>
               <a:rPr lang="en-US" dirty="0" smtClean="0"/>
-              <a:t>Tuning is Hard</a:t>
-            </a:r>
-            <a:endParaRPr lang="en-US" dirty="0"/>
-          </a:p>
-        </p:txBody>
-      </p:sp>
-      <p:sp>
-        <p:nvSpPr>
-          <p:cNvPr id="3" name="Content Placeholder 2"/>
-          <p:cNvSpPr>
-            <a:spLocks noGrp="1"/>
-          </p:cNvSpPr>
-          <p:nvPr>
-            <p:ph idx="1"/>
-          </p:nvPr>
-        </p:nvSpPr>
-        <p:spPr/>
-        <p:txBody>
-          <a:bodyPr>
-            <a:normAutofit fontScale="92500" lnSpcReduction="10000"/>
-          </a:bodyPr>
-          <a:lstStyle/>
-          <a:p>
-            <a:r>
-              <a:rPr lang="en-US" dirty="0" smtClean="0"/>
-              <a:t>Most tuning is based on business logic, dev process, advanced features, and styles</a:t>
-            </a:r>
-          </a:p>
-          <a:p>
-            <a:r>
-              <a:rPr lang="en-US" dirty="0" smtClean="0"/>
-              <a:t>Breadth-first approach </a:t>
-            </a:r>
-            <a:r>
-              <a:rPr lang="en-US" dirty="0" smtClean="0"/>
-              <a:t>needed</a:t>
-            </a:r>
-          </a:p>
-          <a:p>
-            <a:r>
-              <a:rPr lang="en-US" dirty="0" smtClean="0"/>
-              <a:t>Find first </a:t>
-            </a:r>
-            <a:r>
-              <a:rPr lang="en-US" i="1" dirty="0" smtClean="0"/>
-              <a:t>significant</a:t>
-            </a:r>
-            <a:r>
-              <a:rPr lang="en-US" dirty="0" smtClean="0"/>
-              <a:t> problem (measure, don't guess)</a:t>
-            </a:r>
-            <a:endParaRPr lang="en-US" dirty="0" smtClean="0"/>
-          </a:p>
-          <a:p>
-            <a:r>
-              <a:rPr lang="en-US" dirty="0" smtClean="0"/>
-              <a:t>Many tuning styles are necessary</a:t>
-            </a:r>
-          </a:p>
-          <a:p>
-            <a:r>
-              <a:rPr lang="en-US" dirty="0" smtClean="0"/>
-              <a:t>Algorithm analysis is foundational</a:t>
-            </a:r>
-            <a:endParaRPr lang="en-US" dirty="0"/>
-          </a:p>
-        </p:txBody>
-      </p:sp>
-    </p:spTree>
-    <p:extLst>
-      <p:ext uri="{BB962C8B-B14F-4D97-AF65-F5344CB8AC3E}">
-        <p14:creationId xmlns:p14="http://schemas.microsoft.com/office/powerpoint/2010/main" val="1469964481"/>
-      </p:ext>
-    </p:extLst>
-  </p:cSld>
-  <p:clrMapOvr>
-    <a:masterClrMapping/>
-  </p:clrMapOvr>
-  <p:timing>
-    <p:tnLst>
-      <p:par>
-        <p:cTn id="1" dur="indefinite" restart="never" nodeType="tmRoot"/>
-      </p:par>
-    </p:tnLst>
-  </p:timing>
-</p:sld>
-</file>
-
-<file path=ppt/slides/slide50.xml><?xml version="1.0" encoding="utf-8"?>
-<p:sld xmlns:a="http://schemas.openxmlformats.org/drawingml/2006/main" xmlns:r="http://schemas.openxmlformats.org/officeDocument/2006/relationships" xmlns:p="http://schemas.openxmlformats.org/presentationml/2006/main">
-  <p:cSld>
-    <p:spTree>
-      <p:nvGrpSpPr>
-        <p:cNvPr id="1" name=""/>
-        <p:cNvGrpSpPr/>
-        <p:nvPr/>
-      </p:nvGrpSpPr>
-      <p:grpSpPr>
-        <a:xfrm>
-          <a:off x="0" y="0"/>
-          <a:ext cx="0" cy="0"/>
-          <a:chOff x="0" y="0"/>
-          <a:chExt cx="0" cy="0"/>
-        </a:xfrm>
-      </p:grpSpPr>
-      <p:sp>
-        <p:nvSpPr>
-          <p:cNvPr id="2" name="Title 1"/>
-          <p:cNvSpPr>
-            <a:spLocks noGrp="1"/>
-          </p:cNvSpPr>
-          <p:nvPr>
-            <p:ph type="title"/>
-          </p:nvPr>
-        </p:nvSpPr>
-        <p:spPr/>
-        <p:txBody>
-          <a:bodyPr/>
-          <a:lstStyle/>
-          <a:p>
-            <a:r>
-              <a:rPr lang="en-US" dirty="0" smtClean="0"/>
               <a:t>Summary</a:t>
             </a:r>
             <a:endParaRPr lang="en-US" dirty="0"/>
@@ -16349,7 +17699,7 @@
 </p:sld>
 </file>
 
-<file path=ppt/slides/slide51.xml><?xml version="1.0" encoding="utf-8"?>
+<file path=ppt/slides/slide57.xml><?xml version="1.0" encoding="utf-8"?>
 <p:sld xmlns:a="http://schemas.openxmlformats.org/drawingml/2006/main" xmlns:r="http://schemas.openxmlformats.org/officeDocument/2006/relationships" xmlns:p="http://schemas.openxmlformats.org/presentationml/2006/main">
   <p:cSld>
     <p:spTree>
@@ -16545,7 +17895,7 @@
         </p:nvSpPr>
         <p:spPr>
           <a:xfrm>
-            <a:off x="3898392" y="3562350"/>
+            <a:off x="3930396" y="3562350"/>
             <a:ext cx="978408" cy="484632"/>
           </a:xfrm>
           <a:prstGeom prst="rightArrow">
@@ -17931,6 +19281,12 @@
             <a:r>
               <a:rPr lang="en-US" dirty="0" smtClean="0"/>
               <a:t>)*</a:t>
+            </a:r>
+          </a:p>
+          <a:p>
+            <a:r>
+              <a:rPr lang="en-US" dirty="0" smtClean="0"/>
+              <a:t>Many lectures available online</a:t>
             </a:r>
           </a:p>
         </p:txBody>

</xml_diff>